<commit_message>
Presentation finished, project ready for defense.
</commit_message>
<xml_diff>
--- a/Barrelet_Xavier_5_presentation_092024.pptx
+++ b/Barrelet_Xavier_5_presentation_092024.pptx
@@ -345,7 +345,7 @@
         <p:spPr>
           <a:xfrm>
             <a:off x="0" y="4114800"/>
-            <a:ext cx="10067040" cy="1542240"/>
+            <a:ext cx="10066680" cy="1541880"/>
           </a:xfrm>
           <a:prstGeom prst="rect">
             <a:avLst/>
@@ -392,9 +392,9 @@
         <p:grpSpPr>
           <a:xfrm>
             <a:off x="0" y="0"/>
-            <a:ext cx="10067760" cy="4101840"/>
+            <a:ext cx="10067400" cy="4101480"/>
             <a:chOff x="0" y="0"/>
-            <a:chExt cx="10067760" cy="4101840"/>
+            <a:chExt cx="10067400" cy="4101480"/>
           </a:xfrm>
         </p:grpSpPr>
         <p:sp>
@@ -406,7 +406,7 @@
           <p:spPr>
             <a:xfrm>
               <a:off x="0" y="0"/>
-              <a:ext cx="10067760" cy="4101840"/>
+              <a:ext cx="10067400" cy="4101480"/>
             </a:xfrm>
             <a:prstGeom prst="rect">
               <a:avLst/>
@@ -453,7 +453,7 @@
           <p:spPr>
             <a:xfrm>
               <a:off x="0" y="1280160"/>
-              <a:ext cx="1541520" cy="627120"/>
+              <a:ext cx="1541160" cy="626760"/>
             </a:xfrm>
             <a:prstGeom prst="rect">
               <a:avLst/>
@@ -502,7 +502,7 @@
           <p:spPr>
             <a:xfrm>
               <a:off x="914400" y="1920240"/>
-              <a:ext cx="1267200" cy="1815840"/>
+              <a:ext cx="1266840" cy="1815480"/>
             </a:xfrm>
             <a:prstGeom prst="rect">
               <a:avLst/>
@@ -549,7 +549,7 @@
           <p:spPr>
             <a:xfrm>
               <a:off x="2194560" y="548640"/>
-              <a:ext cx="1267200" cy="1815840"/>
+              <a:ext cx="1266840" cy="1815480"/>
             </a:xfrm>
             <a:prstGeom prst="rect">
               <a:avLst/>
@@ -596,7 +596,7 @@
           <p:spPr>
             <a:xfrm>
               <a:off x="3474720" y="1188720"/>
-              <a:ext cx="352800" cy="352800"/>
+              <a:ext cx="352440" cy="352440"/>
             </a:xfrm>
             <a:prstGeom prst="rect">
               <a:avLst/>
@@ -643,7 +643,7 @@
           <p:spPr>
             <a:xfrm>
               <a:off x="4206240" y="0"/>
-              <a:ext cx="1450080" cy="901440"/>
+              <a:ext cx="1449720" cy="901080"/>
             </a:xfrm>
             <a:prstGeom prst="rect">
               <a:avLst/>
@@ -690,7 +690,7 @@
           <p:spPr>
             <a:xfrm>
               <a:off x="4663440" y="914400"/>
-              <a:ext cx="992880" cy="444240"/>
+              <a:ext cx="992520" cy="443880"/>
             </a:xfrm>
             <a:prstGeom prst="rect">
               <a:avLst/>
@@ -737,7 +737,7 @@
           <p:spPr>
             <a:xfrm>
               <a:off x="3474720" y="1737360"/>
-              <a:ext cx="3096000" cy="992880"/>
+              <a:ext cx="3095640" cy="992520"/>
             </a:xfrm>
             <a:prstGeom prst="rect">
               <a:avLst/>
@@ -784,7 +784,7 @@
           <p:spPr>
             <a:xfrm>
               <a:off x="4114800" y="2743200"/>
-              <a:ext cx="1450080" cy="992880"/>
+              <a:ext cx="1449720" cy="992520"/>
             </a:xfrm>
             <a:prstGeom prst="rect">
               <a:avLst/>
@@ -831,7 +831,7 @@
           <p:spPr>
             <a:xfrm>
               <a:off x="6583680" y="1463040"/>
-              <a:ext cx="1541520" cy="444240"/>
+              <a:ext cx="1541160" cy="443880"/>
             </a:xfrm>
             <a:prstGeom prst="rect">
               <a:avLst/>
@@ -880,7 +880,7 @@
           <p:spPr>
             <a:xfrm>
               <a:off x="7315200" y="1920240"/>
-              <a:ext cx="1450080" cy="1632960"/>
+              <a:ext cx="1449720" cy="1632600"/>
             </a:xfrm>
             <a:prstGeom prst="rect">
               <a:avLst/>
@@ -929,7 +929,7 @@
           <p:spPr>
             <a:xfrm>
               <a:off x="2743200" y="2377440"/>
-              <a:ext cx="535680" cy="810000"/>
+              <a:ext cx="535320" cy="809640"/>
             </a:xfrm>
             <a:prstGeom prst="rect">
               <a:avLst/>
@@ -976,7 +976,7 @@
           <p:spPr>
             <a:xfrm>
               <a:off x="8595360" y="0"/>
-              <a:ext cx="1472400" cy="1450080"/>
+              <a:ext cx="1472040" cy="1449720"/>
             </a:xfrm>
             <a:prstGeom prst="rect">
               <a:avLst/>
@@ -1023,7 +1023,7 @@
           <p:spPr>
             <a:xfrm>
               <a:off x="6766560" y="0"/>
-              <a:ext cx="261360" cy="992880"/>
+              <a:ext cx="261000" cy="992520"/>
             </a:xfrm>
             <a:prstGeom prst="rect">
               <a:avLst/>
@@ -1072,7 +1072,7 @@
           <p:spPr>
             <a:xfrm>
               <a:off x="1554480" y="0"/>
-              <a:ext cx="169920" cy="901440"/>
+              <a:ext cx="169560" cy="901080"/>
             </a:xfrm>
             <a:prstGeom prst="rect">
               <a:avLst/>
@@ -1119,7 +1119,7 @@
           <p:spPr>
             <a:xfrm>
               <a:off x="0" y="3017520"/>
-              <a:ext cx="352800" cy="1084320"/>
+              <a:ext cx="352440" cy="1083960"/>
             </a:xfrm>
             <a:prstGeom prst="rect">
               <a:avLst/>
@@ -1166,7 +1166,7 @@
           <p:spPr>
             <a:xfrm>
               <a:off x="9601200" y="2560320"/>
-              <a:ext cx="352800" cy="1541520"/>
+              <a:ext cx="352440" cy="1541160"/>
             </a:xfrm>
             <a:prstGeom prst="rect">
               <a:avLst/>
@@ -1213,7 +1213,7 @@
           <p:spPr>
             <a:xfrm>
               <a:off x="8778240" y="1828800"/>
-              <a:ext cx="352800" cy="352800"/>
+              <a:ext cx="352440" cy="352440"/>
             </a:xfrm>
             <a:prstGeom prst="rect">
               <a:avLst/>
@@ -1560,10 +1560,10 @@
         </p:nvGrpSpPr>
         <p:grpSpPr>
           <a:xfrm>
-            <a:off x="8540280" y="5052960"/>
-            <a:ext cx="1267560" cy="901800"/>
-            <a:chOff x="8540280" y="5052960"/>
-            <a:chExt cx="1267560" cy="901800"/>
+            <a:off x="8540280" y="5052600"/>
+            <a:ext cx="1267200" cy="901440"/>
+            <a:chOff x="8540280" y="5052600"/>
+            <a:chExt cx="1267200" cy="901440"/>
           </a:xfrm>
         </p:grpSpPr>
         <p:grpSp>
@@ -1574,10 +1574,10 @@
           </p:nvGrpSpPr>
           <p:grpSpPr>
             <a:xfrm>
-              <a:off x="8540280" y="5052960"/>
-              <a:ext cx="1267560" cy="901800"/>
-              <a:chOff x="8540280" y="5052960"/>
-              <a:chExt cx="1267560" cy="901800"/>
+              <a:off x="8540280" y="5052600"/>
+              <a:ext cx="1267200" cy="901440"/>
+              <a:chOff x="8540280" y="5052600"/>
+              <a:chExt cx="1267200" cy="901440"/>
             </a:xfrm>
           </p:grpSpPr>
           <p:sp>
@@ -1588,8 +1588,8 @@
             </p:nvSpPr>
             <p:spPr>
               <a:xfrm flipV="1" rot="21598800">
-                <a:off x="9637560" y="5418720"/>
-                <a:ext cx="169920" cy="169920"/>
+                <a:off x="9637560" y="5418000"/>
+                <a:ext cx="169560" cy="169560"/>
               </a:xfrm>
               <a:prstGeom prst="ellipse">
                 <a:avLst/>
@@ -1597,7 +1597,7 @@
               <a:blipFill rotWithShape="0">
                 <a:blip r:embed="rId2"/>
                 <a:srcRect/>
-                <a:tile tx="0" ty="0" sx="62056" sy="62056" algn="ctr"/>
+                <a:tile tx="0" ty="0" sx="61702" sy="61702" algn="ctr"/>
               </a:blipFill>
               <a:ln w="0">
                 <a:noFill/>
@@ -1644,8 +1644,8 @@
             </p:nvSpPr>
             <p:spPr>
               <a:xfrm flipV="1" rot="21598800">
-                <a:off x="9271800" y="5418720"/>
-                <a:ext cx="169920" cy="169920"/>
+                <a:off x="9271800" y="5418000"/>
+                <a:ext cx="169560" cy="169560"/>
               </a:xfrm>
               <a:prstGeom prst="ellipse">
                 <a:avLst/>
@@ -1653,7 +1653,7 @@
               <a:blipFill rotWithShape="0">
                 <a:blip r:embed="rId3"/>
                 <a:srcRect/>
-                <a:tile tx="0" ty="0" sx="62056" sy="62056" algn="ctr"/>
+                <a:tile tx="0" ty="0" sx="61702" sy="61702" algn="ctr"/>
               </a:blipFill>
               <a:ln w="0">
                 <a:noFill/>
@@ -1700,8 +1700,8 @@
             </p:nvSpPr>
             <p:spPr>
               <a:xfrm flipV="1" rot="21598800">
-                <a:off x="8906400" y="5418720"/>
-                <a:ext cx="169920" cy="169920"/>
+                <a:off x="8906400" y="5418000"/>
+                <a:ext cx="169560" cy="169560"/>
               </a:xfrm>
               <a:prstGeom prst="ellipse">
                 <a:avLst/>
@@ -1709,7 +1709,7 @@
               <a:blipFill rotWithShape="0">
                 <a:blip r:embed="rId4"/>
                 <a:srcRect/>
-                <a:tile tx="0" ty="0" sx="62056" sy="62056" algn="ctr"/>
+                <a:tile tx="0" ty="0" sx="61702" sy="61702" algn="ctr"/>
               </a:blipFill>
               <a:ln w="0">
                 <a:noFill/>
@@ -1756,8 +1756,8 @@
             </p:nvSpPr>
             <p:spPr>
               <a:xfrm flipV="1" rot="21598800">
-                <a:off x="8540280" y="5419080"/>
-                <a:ext cx="169920" cy="169920"/>
+                <a:off x="8540280" y="5418360"/>
+                <a:ext cx="169560" cy="169560"/>
               </a:xfrm>
               <a:prstGeom prst="ellipse">
                 <a:avLst/>
@@ -1765,7 +1765,7 @@
               <a:blipFill rotWithShape="0">
                 <a:blip r:embed="rId5"/>
                 <a:srcRect/>
-                <a:tile tx="0" ty="0" sx="62056" sy="62056" algn="ctr"/>
+                <a:tile tx="0" ty="0" sx="61702" sy="61702" algn="ctr"/>
               </a:blipFill>
               <a:ln w="0">
                 <a:noFill/>
@@ -1812,8 +1812,8 @@
             </p:nvSpPr>
             <p:spPr>
               <a:xfrm flipV="1" rot="21598800">
-                <a:off x="8540280" y="5052960"/>
-                <a:ext cx="169920" cy="169920"/>
+                <a:off x="8540280" y="5052240"/>
+                <a:ext cx="169560" cy="169560"/>
               </a:xfrm>
               <a:prstGeom prst="ellipse">
                 <a:avLst/>
@@ -1821,7 +1821,7 @@
               <a:blipFill rotWithShape="0">
                 <a:blip r:embed="rId6"/>
                 <a:srcRect/>
-                <a:tile tx="0" ty="0" sx="62056" sy="62056" algn="ctr"/>
+                <a:tile tx="0" ty="0" sx="61702" sy="61702" algn="ctr"/>
               </a:blipFill>
               <a:ln w="0">
                 <a:noFill/>
@@ -1868,8 +1868,8 @@
             </p:nvSpPr>
             <p:spPr>
               <a:xfrm flipV="1" rot="21598800">
-                <a:off x="8906040" y="5052960"/>
-                <a:ext cx="169920" cy="169920"/>
+                <a:off x="8906040" y="5052240"/>
+                <a:ext cx="169560" cy="169560"/>
               </a:xfrm>
               <a:prstGeom prst="ellipse">
                 <a:avLst/>
@@ -1877,7 +1877,7 @@
               <a:blipFill rotWithShape="0">
                 <a:blip r:embed="rId7"/>
                 <a:srcRect/>
-                <a:tile tx="0" ty="0" sx="62056" sy="62056" algn="ctr"/>
+                <a:tile tx="0" ty="0" sx="61702" sy="61702" algn="ctr"/>
               </a:blipFill>
               <a:ln w="0">
                 <a:noFill/>
@@ -1924,8 +1924,8 @@
             </p:nvSpPr>
             <p:spPr>
               <a:xfrm flipV="1" rot="21598800">
-                <a:off x="9271800" y="5053320"/>
-                <a:ext cx="169920" cy="169920"/>
+                <a:off x="9271800" y="5052600"/>
+                <a:ext cx="169560" cy="169560"/>
               </a:xfrm>
               <a:prstGeom prst="ellipse">
                 <a:avLst/>
@@ -1933,7 +1933,7 @@
               <a:blipFill rotWithShape="0">
                 <a:blip r:embed="rId8"/>
                 <a:srcRect/>
-                <a:tile tx="0" ty="0" sx="62056" sy="62056" algn="ctr"/>
+                <a:tile tx="0" ty="0" sx="61702" sy="61702" algn="ctr"/>
               </a:blipFill>
               <a:ln w="0">
                 <a:noFill/>
@@ -1980,8 +1980,8 @@
             </p:nvSpPr>
             <p:spPr>
               <a:xfrm flipV="1" rot="21598800">
-                <a:off x="9637920" y="5052960"/>
-                <a:ext cx="169920" cy="169920"/>
+                <a:off x="9637920" y="5052240"/>
+                <a:ext cx="169560" cy="169560"/>
               </a:xfrm>
               <a:prstGeom prst="ellipse">
                 <a:avLst/>
@@ -1989,7 +1989,7 @@
               <a:blipFill rotWithShape="0">
                 <a:blip r:embed="rId9"/>
                 <a:srcRect/>
-                <a:tile tx="0" ty="0" sx="62056" sy="62056" algn="ctr"/>
+                <a:tile tx="0" ty="0" sx="61702" sy="61702" algn="ctr"/>
               </a:blipFill>
               <a:ln w="0">
                 <a:noFill/>
@@ -2036,8 +2036,8 @@
             </p:nvSpPr>
             <p:spPr>
               <a:xfrm flipV="1" rot="21598800">
-                <a:off x="9637560" y="5784480"/>
-                <a:ext cx="169920" cy="169920"/>
+                <a:off x="9637560" y="5783760"/>
+                <a:ext cx="169560" cy="169560"/>
               </a:xfrm>
               <a:prstGeom prst="ellipse">
                 <a:avLst/>
@@ -2045,7 +2045,7 @@
               <a:blipFill rotWithShape="0">
                 <a:blip r:embed="rId10"/>
                 <a:srcRect/>
-                <a:tile tx="0" ty="0" sx="62056" sy="62056" algn="ctr"/>
+                <a:tile tx="0" ty="0" sx="61702" sy="61702" algn="ctr"/>
               </a:blipFill>
               <a:ln w="0">
                 <a:noFill/>
@@ -2092,8 +2092,8 @@
             </p:nvSpPr>
             <p:spPr>
               <a:xfrm flipV="1" rot="21598800">
-                <a:off x="9272160" y="5784840"/>
-                <a:ext cx="169920" cy="169920"/>
+                <a:off x="9272160" y="5784120"/>
+                <a:ext cx="169560" cy="169560"/>
               </a:xfrm>
               <a:prstGeom prst="ellipse">
                 <a:avLst/>
@@ -2101,7 +2101,7 @@
               <a:blipFill rotWithShape="0">
                 <a:blip r:embed="rId11"/>
                 <a:srcRect/>
-                <a:tile tx="0" ty="0" sx="62056" sy="62056" algn="ctr"/>
+                <a:tile tx="0" ty="0" sx="61702" sy="61702" algn="ctr"/>
               </a:blipFill>
               <a:ln w="0">
                 <a:noFill/>
@@ -2148,8 +2148,8 @@
             </p:nvSpPr>
             <p:spPr>
               <a:xfrm flipV="1" rot="21598800">
-                <a:off x="8906040" y="5784480"/>
-                <a:ext cx="169920" cy="169920"/>
+                <a:off x="8906040" y="5783760"/>
+                <a:ext cx="169560" cy="169560"/>
               </a:xfrm>
               <a:prstGeom prst="ellipse">
                 <a:avLst/>
@@ -2157,7 +2157,7 @@
               <a:blipFill rotWithShape="0">
                 <a:blip r:embed="rId12"/>
                 <a:srcRect/>
-                <a:tile tx="0" ty="0" sx="62056" sy="62056" algn="ctr"/>
+                <a:tile tx="0" ty="0" sx="61702" sy="61702" algn="ctr"/>
               </a:blipFill>
               <a:ln w="0">
                 <a:noFill/>
@@ -2204,8 +2204,8 @@
             </p:nvSpPr>
             <p:spPr>
               <a:xfrm flipV="1" rot="21598800">
-                <a:off x="8540280" y="5784480"/>
-                <a:ext cx="169920" cy="169920"/>
+                <a:off x="8540280" y="5783760"/>
+                <a:ext cx="169560" cy="169560"/>
               </a:xfrm>
               <a:prstGeom prst="ellipse">
                 <a:avLst/>
@@ -2213,7 +2213,7 @@
               <a:blipFill rotWithShape="0">
                 <a:blip r:embed="rId13"/>
                 <a:srcRect/>
-                <a:tile tx="0" ty="0" sx="62056" sy="62056" algn="ctr"/>
+                <a:tile tx="0" ty="0" sx="61702" sy="61702" algn="ctr"/>
               </a:blipFill>
               <a:ln w="0">
                 <a:noFill/>
@@ -2263,7 +2263,7 @@
         <p:spPr>
           <a:xfrm>
             <a:off x="1499760" y="1774080"/>
-            <a:ext cx="2913120" cy="2913120"/>
+            <a:ext cx="2912760" cy="2912760"/>
           </a:xfrm>
           <a:prstGeom prst="ellipse">
             <a:avLst/>
@@ -2312,7 +2312,7 @@
         <p:spPr>
           <a:xfrm>
             <a:off x="1225080" y="1134360"/>
-            <a:ext cx="1176120" cy="1175400"/>
+            <a:ext cx="1175760" cy="1175040"/>
           </a:xfrm>
           <a:prstGeom prst="ellipse">
             <a:avLst/>
@@ -2361,7 +2361,7 @@
         <p:spPr>
           <a:xfrm>
             <a:off x="3420000" y="4242960"/>
-            <a:ext cx="627120" cy="627120"/>
+            <a:ext cx="626760" cy="626760"/>
           </a:xfrm>
           <a:prstGeom prst="ellipse">
             <a:avLst/>
@@ -2414,7 +2414,7 @@
         <p:spPr>
           <a:xfrm>
             <a:off x="4349520" y="792360"/>
-            <a:ext cx="5513040" cy="4132440"/>
+            <a:ext cx="5512680" cy="4132080"/>
           </a:xfrm>
           <a:prstGeom prst="rect">
             <a:avLst/>
@@ -2433,7 +2433,7 @@
         <p:spPr>
           <a:xfrm>
             <a:off x="4846320" y="4846320"/>
-            <a:ext cx="2120040" cy="229680"/>
+            <a:ext cx="2119680" cy="229320"/>
           </a:xfrm>
           <a:prstGeom prst="rect">
             <a:avLst/>
@@ -2553,9 +2553,9 @@
         <p:grpSpPr>
           <a:xfrm>
             <a:off x="7406640" y="3566160"/>
-            <a:ext cx="2364480" cy="4284720"/>
+            <a:ext cx="2364120" cy="4284360"/>
             <a:chOff x="7406640" y="3566160"/>
-            <a:chExt cx="2364480" cy="4284720"/>
+            <a:chExt cx="2364120" cy="4284360"/>
           </a:xfrm>
         </p:grpSpPr>
         <p:sp>
@@ -2567,7 +2567,7 @@
           <p:spPr>
             <a:xfrm>
               <a:off x="8138160" y="4754880"/>
-              <a:ext cx="444240" cy="2547360"/>
+              <a:ext cx="443880" cy="2547000"/>
             </a:xfrm>
             <a:prstGeom prst="rect">
               <a:avLst/>
@@ -2575,7 +2575,7 @@
             <a:blipFill rotWithShape="0">
               <a:blip r:embed="rId2"/>
               <a:srcRect/>
-              <a:tile tx="0" ty="0" sx="62056" sy="62056" algn="ctr"/>
+              <a:tile tx="0" ty="0" sx="61702" sy="61702" algn="ctr"/>
             </a:blipFill>
             <a:ln w="0">
               <a:noFill/>
@@ -2616,7 +2616,7 @@
           <p:spPr>
             <a:xfrm>
               <a:off x="8961120" y="3566160"/>
-              <a:ext cx="444240" cy="2547360"/>
+              <a:ext cx="443880" cy="2547000"/>
             </a:xfrm>
             <a:prstGeom prst="rect">
               <a:avLst/>
@@ -2624,7 +2624,7 @@
             <a:blipFill rotWithShape="0">
               <a:blip r:embed="rId3"/>
               <a:srcRect/>
-              <a:tile tx="0" ty="0" sx="62056" sy="62056" algn="ctr"/>
+              <a:tile tx="0" ty="0" sx="61702" sy="61702" algn="ctr"/>
             </a:blipFill>
             <a:ln w="0">
               <a:noFill/>
@@ -2665,7 +2665,7 @@
           <p:spPr>
             <a:xfrm>
               <a:off x="8503920" y="5120640"/>
-              <a:ext cx="1267200" cy="78480"/>
+              <a:ext cx="1266840" cy="78120"/>
             </a:xfrm>
             <a:prstGeom prst="rect">
               <a:avLst/>
@@ -2714,7 +2714,7 @@
           <p:spPr>
             <a:xfrm>
               <a:off x="8321040" y="5303520"/>
-              <a:ext cx="901440" cy="78480"/>
+              <a:ext cx="901080" cy="78120"/>
             </a:xfrm>
             <a:prstGeom prst="rect">
               <a:avLst/>
@@ -2763,7 +2763,7 @@
           <p:spPr>
             <a:xfrm>
               <a:off x="8869680" y="5486400"/>
-              <a:ext cx="901440" cy="78480"/>
+              <a:ext cx="901080" cy="78120"/>
             </a:xfrm>
             <a:prstGeom prst="rect">
               <a:avLst/>
@@ -2812,7 +2812,7 @@
           <p:spPr>
             <a:xfrm>
               <a:off x="7406640" y="5303520"/>
-              <a:ext cx="444240" cy="2547360"/>
+              <a:ext cx="443880" cy="2547000"/>
             </a:xfrm>
             <a:prstGeom prst="rect">
               <a:avLst/>
@@ -2820,7 +2820,7 @@
             <a:blipFill rotWithShape="0">
               <a:blip r:embed="rId4"/>
               <a:srcRect/>
-              <a:tile tx="0" ty="0" sx="62056" sy="62056" algn="ctr"/>
+              <a:tile tx="0" ty="0" sx="61702" sy="61702" algn="ctr"/>
             </a:blipFill>
             <a:ln w="0">
               <a:noFill/>
@@ -2861,8 +2861,8 @@
         </p:nvSpPr>
         <p:spPr>
           <a:xfrm flipH="1" flipV="1">
-            <a:off x="1436760" y="-1567440"/>
-            <a:ext cx="444240" cy="2547360"/>
+            <a:off x="1435680" y="-1568160"/>
+            <a:ext cx="443880" cy="2547000"/>
           </a:xfrm>
           <a:prstGeom prst="rect">
             <a:avLst/>
@@ -2870,7 +2870,7 @@
           <a:blipFill rotWithShape="0">
             <a:blip r:embed="rId5"/>
             <a:srcRect/>
-            <a:tile tx="0" ty="0" sx="62056" sy="62056" algn="ctr"/>
+            <a:tile tx="0" ty="0" sx="61702" sy="61702" algn="ctr"/>
           </a:blipFill>
           <a:ln w="0">
             <a:noFill/>
@@ -2910,8 +2910,8 @@
         </p:nvSpPr>
         <p:spPr>
           <a:xfrm flipH="1" flipV="1">
-            <a:off x="613800" y="-365400"/>
-            <a:ext cx="444240" cy="2547360"/>
+            <a:off x="612720" y="-365760"/>
+            <a:ext cx="443880" cy="2547000"/>
           </a:xfrm>
           <a:prstGeom prst="rect">
             <a:avLst/>
@@ -2919,7 +2919,7 @@
           <a:blipFill rotWithShape="0">
             <a:blip r:embed="rId6"/>
             <a:srcRect/>
-            <a:tile tx="0" ty="0" sx="62056" sy="62056" algn="ctr"/>
+            <a:tile tx="0" ty="0" sx="61702" sy="61702" algn="ctr"/>
           </a:blipFill>
           <a:ln w="0">
             <a:noFill/>
@@ -2959,8 +2959,8 @@
         </p:nvSpPr>
         <p:spPr>
           <a:xfrm flipH="1" flipV="1">
-            <a:off x="261360" y="535680"/>
-            <a:ext cx="1267200" cy="78480"/>
+            <a:off x="260640" y="534960"/>
+            <a:ext cx="1266840" cy="78120"/>
           </a:xfrm>
           <a:prstGeom prst="rect">
             <a:avLst/>
@@ -3008,8 +3008,8 @@
         </p:nvSpPr>
         <p:spPr>
           <a:xfrm flipH="1" flipV="1">
-            <a:off x="810000" y="352800"/>
-            <a:ext cx="901440" cy="78480"/>
+            <a:off x="809280" y="352080"/>
+            <a:ext cx="901080" cy="78120"/>
           </a:xfrm>
           <a:prstGeom prst="rect">
             <a:avLst/>
@@ -3057,8 +3057,8 @@
         </p:nvSpPr>
         <p:spPr>
           <a:xfrm flipH="1" flipV="1">
-            <a:off x="261360" y="169920"/>
-            <a:ext cx="901440" cy="78480"/>
+            <a:off x="260640" y="169200"/>
+            <a:ext cx="901080" cy="78120"/>
           </a:xfrm>
           <a:prstGeom prst="rect">
             <a:avLst/>
@@ -3106,8 +3106,8 @@
         </p:nvSpPr>
         <p:spPr>
           <a:xfrm flipH="1" flipV="1">
-            <a:off x="2181600" y="-2116080"/>
-            <a:ext cx="444240" cy="2547360"/>
+            <a:off x="2180880" y="-2116800"/>
+            <a:ext cx="443880" cy="2547000"/>
           </a:xfrm>
           <a:prstGeom prst="rect">
             <a:avLst/>
@@ -3115,7 +3115,7 @@
           <a:blipFill rotWithShape="0">
             <a:blip r:embed="rId7"/>
             <a:srcRect/>
-            <a:tile tx="0" ty="0" sx="62056" sy="62056" algn="ctr"/>
+            <a:tile tx="0" ty="0" sx="61702" sy="61702" algn="ctr"/>
           </a:blipFill>
           <a:ln w="0">
             <a:noFill/>
@@ -3156,7 +3156,7 @@
         <p:spPr>
           <a:xfrm>
             <a:off x="3474720" y="2560320"/>
-            <a:ext cx="2730240" cy="2730240"/>
+            <a:ext cx="2729880" cy="2729880"/>
           </a:xfrm>
           <a:prstGeom prst="ellipse">
             <a:avLst/>
@@ -3505,7 +3505,7 @@
         <p:spPr>
           <a:xfrm>
             <a:off x="822960" y="2468880"/>
-            <a:ext cx="1450080" cy="1450080"/>
+            <a:ext cx="1449720" cy="1449720"/>
           </a:xfrm>
           <a:prstGeom prst="ellipse">
             <a:avLst/>
@@ -3559,7 +3559,7 @@
         <p:spPr>
           <a:xfrm>
             <a:off x="4480560" y="1554480"/>
-            <a:ext cx="1450080" cy="1450080"/>
+            <a:ext cx="1449720" cy="1449720"/>
           </a:xfrm>
           <a:prstGeom prst="ellipse">
             <a:avLst/>
@@ -3613,7 +3613,7 @@
         <p:spPr>
           <a:xfrm>
             <a:off x="6583680" y="3108960"/>
-            <a:ext cx="1450080" cy="1450080"/>
+            <a:ext cx="1449720" cy="1449720"/>
           </a:xfrm>
           <a:prstGeom prst="ellipse">
             <a:avLst/>
@@ -3667,15 +3667,15 @@
         <p:spPr>
           <a:xfrm>
             <a:off x="1554480" y="4114800"/>
-            <a:ext cx="901440" cy="644400"/>
+            <a:ext cx="901080" cy="644040"/>
           </a:xfrm>
           <a:custGeom>
             <a:avLst/>
             <a:gdLst>
-              <a:gd name="textAreaLeft" fmla="*/ 0 w 901440"/>
-              <a:gd name="textAreaRight" fmla="*/ 914400 w 901440"/>
-              <a:gd name="textAreaTop" fmla="*/ 0 h 644400"/>
-              <a:gd name="textAreaBottom" fmla="*/ 657360 h 644400"/>
+              <a:gd name="textAreaLeft" fmla="*/ 0 w 901080"/>
+              <a:gd name="textAreaRight" fmla="*/ 914400 w 901080"/>
+              <a:gd name="textAreaTop" fmla="*/ 0 h 644040"/>
+              <a:gd name="textAreaBottom" fmla="*/ 657360 h 644040"/>
             </a:gdLst>
             <a:ahLst/>
             <a:rect l="textAreaLeft" t="textAreaTop" r="textAreaRight" b="textAreaBottom"/>
@@ -3738,15 +3738,15 @@
         <p:spPr>
           <a:xfrm>
             <a:off x="3657600" y="1188720"/>
-            <a:ext cx="810000" cy="627120"/>
+            <a:ext cx="809640" cy="626760"/>
           </a:xfrm>
           <a:custGeom>
             <a:avLst/>
             <a:gdLst>
-              <a:gd name="textAreaLeft" fmla="*/ 0 w 810000"/>
-              <a:gd name="textAreaRight" fmla="*/ 822960 w 810000"/>
-              <a:gd name="textAreaTop" fmla="*/ 0 h 627120"/>
-              <a:gd name="textAreaBottom" fmla="*/ 640080 h 627120"/>
+              <a:gd name="textAreaLeft" fmla="*/ 0 w 809640"/>
+              <a:gd name="textAreaRight" fmla="*/ 822960 w 809640"/>
+              <a:gd name="textAreaTop" fmla="*/ 0 h 626760"/>
+              <a:gd name="textAreaBottom" fmla="*/ 640080 h 626760"/>
             </a:gdLst>
             <a:ahLst/>
             <a:rect l="textAreaLeft" t="textAreaTop" r="textAreaRight" b="textAreaBottom"/>
@@ -3809,15 +3809,15 @@
         <p:spPr>
           <a:xfrm>
             <a:off x="7955280" y="2011680"/>
-            <a:ext cx="1451160" cy="1175760"/>
+            <a:ext cx="1450800" cy="1175400"/>
           </a:xfrm>
           <a:custGeom>
             <a:avLst/>
             <a:gdLst>
-              <a:gd name="textAreaLeft" fmla="*/ 0 w 1451160"/>
-              <a:gd name="textAreaRight" fmla="*/ 1464120 w 1451160"/>
-              <a:gd name="textAreaTop" fmla="*/ 0 h 1175760"/>
-              <a:gd name="textAreaBottom" fmla="*/ 1188720 h 1175760"/>
+              <a:gd name="textAreaLeft" fmla="*/ 0 w 1450800"/>
+              <a:gd name="textAreaRight" fmla="*/ 1464120 w 1450800"/>
+              <a:gd name="textAreaTop" fmla="*/ 0 h 1175400"/>
+              <a:gd name="textAreaBottom" fmla="*/ 1188720 h 1175400"/>
             </a:gdLst>
             <a:ahLst/>
             <a:rect l="textAreaLeft" t="textAreaTop" r="textAreaRight" b="textAreaBottom"/>
@@ -3885,7 +3885,7 @@
         <p:spPr>
           <a:xfrm>
             <a:off x="2468880" y="822960"/>
-            <a:ext cx="1397520" cy="1358640"/>
+            <a:ext cx="1397160" cy="1358280"/>
           </a:xfrm>
           <a:prstGeom prst="ellipse">
             <a:avLst/>
@@ -3934,7 +3934,7 @@
         <p:spPr>
           <a:xfrm>
             <a:off x="3931920" y="4663440"/>
-            <a:ext cx="1671840" cy="1632960"/>
+            <a:ext cx="1671480" cy="1632600"/>
           </a:xfrm>
           <a:prstGeom prst="ellipse">
             <a:avLst/>
@@ -3983,7 +3983,7 @@
         <p:spPr>
           <a:xfrm>
             <a:off x="8412480" y="1280160"/>
-            <a:ext cx="1084320" cy="992880"/>
+            <a:ext cx="1083960" cy="992520"/>
           </a:xfrm>
           <a:prstGeom prst="ellipse">
             <a:avLst/>
@@ -4058,7 +4058,7 @@
         <p:spPr>
           <a:xfrm>
             <a:off x="2103480" y="3658320"/>
-            <a:ext cx="1632960" cy="1632960"/>
+            <a:ext cx="1632600" cy="1632600"/>
           </a:xfrm>
           <a:prstGeom prst="ellipse">
             <a:avLst/>
@@ -4107,7 +4107,7 @@
         <p:spPr>
           <a:xfrm>
             <a:off x="823320" y="-273240"/>
-            <a:ext cx="2181600" cy="2181600"/>
+            <a:ext cx="2181240" cy="2181240"/>
           </a:xfrm>
           <a:prstGeom prst="ellipse">
             <a:avLst/>
@@ -4156,7 +4156,7 @@
         <p:spPr>
           <a:xfrm>
             <a:off x="7955640" y="3109680"/>
-            <a:ext cx="2181600" cy="2181600"/>
+            <a:ext cx="2181240" cy="2181240"/>
           </a:xfrm>
           <a:prstGeom prst="ellipse">
             <a:avLst/>
@@ -4205,7 +4205,7 @@
         <p:spPr>
           <a:xfrm>
             <a:off x="9601560" y="915120"/>
-            <a:ext cx="1632960" cy="1632960"/>
+            <a:ext cx="1632600" cy="1632600"/>
           </a:xfrm>
           <a:prstGeom prst="ellipse">
             <a:avLst/>
@@ -4253,10 +4253,10 @@
         </p:nvGrpSpPr>
         <p:grpSpPr>
           <a:xfrm>
-            <a:off x="3908880" y="750600"/>
-            <a:ext cx="2423520" cy="4325760"/>
-            <a:chOff x="3908880" y="750600"/>
-            <a:chExt cx="2423520" cy="4325760"/>
+            <a:off x="3908520" y="750600"/>
+            <a:ext cx="2423160" cy="4325400"/>
+            <a:chOff x="3908520" y="750600"/>
+            <a:chExt cx="2423160" cy="4325400"/>
           </a:xfrm>
         </p:grpSpPr>
         <p:sp>
@@ -4267,8 +4267,8 @@
           </p:nvSpPr>
           <p:spPr>
             <a:xfrm flipH="1" flipV="1" rot="5330400">
-              <a:off x="4845960" y="3351600"/>
-              <a:ext cx="1358640" cy="1453320"/>
+              <a:off x="4845240" y="3351240"/>
+              <a:ext cx="1358280" cy="1452960"/>
             </a:xfrm>
             <a:prstGeom prst="parallelogram">
               <a:avLst>
@@ -4316,8 +4316,8 @@
           </p:nvSpPr>
           <p:spPr>
             <a:xfrm flipH="1" flipV="1" rot="5330400">
-              <a:off x="4015440" y="2313360"/>
-              <a:ext cx="1358640" cy="1453320"/>
+              <a:off x="4014720" y="2313000"/>
+              <a:ext cx="1358280" cy="1452960"/>
             </a:xfrm>
             <a:prstGeom prst="parallelogram">
               <a:avLst>
@@ -4365,8 +4365,8 @@
           </p:nvSpPr>
           <p:spPr>
             <a:xfrm flipH="1" flipV="1" rot="5330400">
-              <a:off x="4912560" y="2049120"/>
-              <a:ext cx="1358640" cy="1453320"/>
+              <a:off x="4911840" y="2048760"/>
+              <a:ext cx="1358280" cy="1452960"/>
             </a:xfrm>
             <a:prstGeom prst="parallelogram">
               <a:avLst>
@@ -4414,8 +4414,8 @@
           </p:nvSpPr>
           <p:spPr>
             <a:xfrm flipH="1" flipV="1" rot="5330400">
-              <a:off x="3969360" y="955440"/>
-              <a:ext cx="1358640" cy="1453320"/>
+              <a:off x="3968640" y="955080"/>
+              <a:ext cx="1358280" cy="1452960"/>
             </a:xfrm>
             <a:prstGeom prst="parallelogram">
               <a:avLst>
@@ -4463,8 +4463,8 @@
           </p:nvSpPr>
           <p:spPr>
             <a:xfrm flipH="1" flipV="1" rot="5330400">
-              <a:off x="4903560" y="717480"/>
-              <a:ext cx="1358640" cy="1453320"/>
+              <a:off x="4902840" y="717120"/>
+              <a:ext cx="1358280" cy="1452960"/>
             </a:xfrm>
             <a:prstGeom prst="parallelogram">
               <a:avLst>
@@ -4512,8 +4512,8 @@
           </p:nvSpPr>
           <p:spPr>
             <a:xfrm flipH="1" flipV="1" rot="5330400">
-              <a:off x="4024080" y="3655800"/>
-              <a:ext cx="1358640" cy="1453320"/>
+              <a:off x="4023360" y="3655440"/>
+              <a:ext cx="1358280" cy="1452960"/>
             </a:xfrm>
             <a:prstGeom prst="parallelogram">
               <a:avLst>
@@ -4589,7 +4589,7 @@
         <p:spPr>
           <a:xfrm>
             <a:off x="6411960" y="1300320"/>
-            <a:ext cx="848880" cy="169920"/>
+            <a:ext cx="848520" cy="169560"/>
           </a:xfrm>
           <a:prstGeom prst="rect">
             <a:avLst/>
@@ -4643,7 +4643,7 @@
         <p:spPr>
           <a:xfrm>
             <a:off x="5813280" y="3854880"/>
-            <a:ext cx="848880" cy="169920"/>
+            <a:ext cx="848520" cy="169560"/>
           </a:xfrm>
           <a:prstGeom prst="rect">
             <a:avLst/>
@@ -4697,7 +4697,7 @@
         <p:spPr>
           <a:xfrm>
             <a:off x="7589520" y="2560320"/>
-            <a:ext cx="2181600" cy="2181600"/>
+            <a:ext cx="2181240" cy="2181240"/>
           </a:xfrm>
           <a:prstGeom prst="ellipse">
             <a:avLst/>
@@ -4746,7 +4746,7 @@
         <p:spPr>
           <a:xfrm>
             <a:off x="3200400" y="731520"/>
-            <a:ext cx="1671840" cy="1632960"/>
+            <a:ext cx="1671480" cy="1632600"/>
           </a:xfrm>
           <a:prstGeom prst="ellipse">
             <a:avLst/>
@@ -4795,7 +4795,7 @@
         <p:spPr>
           <a:xfrm>
             <a:off x="1424160" y="3489120"/>
-            <a:ext cx="1671840" cy="1632960"/>
+            <a:ext cx="1671480" cy="1632600"/>
           </a:xfrm>
           <a:prstGeom prst="ellipse">
             <a:avLst/>
@@ -4844,15 +4844,15 @@
         <p:spPr>
           <a:xfrm>
             <a:off x="700920" y="1900080"/>
-            <a:ext cx="1389240" cy="1836000"/>
+            <a:ext cx="1388880" cy="1835640"/>
           </a:xfrm>
           <a:custGeom>
             <a:avLst/>
             <a:gdLst>
-              <a:gd name="textAreaLeft" fmla="*/ 0 w 1389240"/>
-              <a:gd name="textAreaRight" fmla="*/ 1402200 w 1389240"/>
-              <a:gd name="textAreaTop" fmla="*/ 0 h 1836000"/>
-              <a:gd name="textAreaBottom" fmla="*/ 1848960 h 1836000"/>
+              <a:gd name="textAreaLeft" fmla="*/ 0 w 1388880"/>
+              <a:gd name="textAreaRight" fmla="*/ 1402200 w 1388880"/>
+              <a:gd name="textAreaTop" fmla="*/ 0 h 1835640"/>
+              <a:gd name="textAreaBottom" fmla="*/ 1848960 h 1835640"/>
             </a:gdLst>
             <a:ahLst/>
             <a:rect l="textAreaLeft" t="textAreaTop" r="textAreaRight" b="textAreaBottom"/>
@@ -4917,15 +4917,15 @@
         <p:spPr>
           <a:xfrm>
             <a:off x="3931920" y="2011680"/>
-            <a:ext cx="963000" cy="1358640"/>
+            <a:ext cx="962640" cy="1358280"/>
           </a:xfrm>
           <a:custGeom>
             <a:avLst/>
             <a:gdLst>
-              <a:gd name="textAreaLeft" fmla="*/ 0 w 963000"/>
-              <a:gd name="textAreaRight" fmla="*/ 975960 w 963000"/>
-              <a:gd name="textAreaTop" fmla="*/ 0 h 1358640"/>
-              <a:gd name="textAreaBottom" fmla="*/ 1371600 h 1358640"/>
+              <a:gd name="textAreaLeft" fmla="*/ 0 w 962640"/>
+              <a:gd name="textAreaRight" fmla="*/ 975960 w 962640"/>
+              <a:gd name="textAreaTop" fmla="*/ 0 h 1358280"/>
+              <a:gd name="textAreaBottom" fmla="*/ 1371600 h 1358280"/>
             </a:gdLst>
             <a:ahLst/>
             <a:rect l="textAreaLeft" t="textAreaTop" r="textAreaRight" b="textAreaBottom"/>
@@ -5000,15 +5000,15 @@
         <p:spPr>
           <a:xfrm>
             <a:off x="7724880" y="2103120"/>
-            <a:ext cx="766080" cy="1450080"/>
+            <a:ext cx="765720" cy="1449720"/>
           </a:xfrm>
           <a:custGeom>
             <a:avLst/>
             <a:gdLst>
-              <a:gd name="textAreaLeft" fmla="*/ 0 w 766080"/>
-              <a:gd name="textAreaRight" fmla="*/ 779040 w 766080"/>
-              <a:gd name="textAreaTop" fmla="*/ 0 h 1450080"/>
-              <a:gd name="textAreaBottom" fmla="*/ 1463040 h 1450080"/>
+              <a:gd name="textAreaLeft" fmla="*/ 0 w 765720"/>
+              <a:gd name="textAreaRight" fmla="*/ 779040 w 765720"/>
+              <a:gd name="textAreaTop" fmla="*/ 0 h 1449720"/>
+              <a:gd name="textAreaBottom" fmla="*/ 1463040 h 1449720"/>
             </a:gdLst>
             <a:ahLst/>
             <a:rect l="textAreaLeft" t="textAreaTop" r="textAreaRight" b="textAreaBottom"/>
@@ -5083,7 +5083,7 @@
         <p:spPr>
           <a:xfrm>
             <a:off x="1424160" y="4754880"/>
-            <a:ext cx="848880" cy="169920"/>
+            <a:ext cx="848520" cy="169560"/>
           </a:xfrm>
           <a:prstGeom prst="rect">
             <a:avLst/>
@@ -5137,7 +5137,7 @@
         <p:spPr>
           <a:xfrm>
             <a:off x="2887200" y="1300320"/>
-            <a:ext cx="848880" cy="169920"/>
+            <a:ext cx="848520" cy="169560"/>
           </a:xfrm>
           <a:prstGeom prst="rect">
             <a:avLst/>
@@ -5217,9 +5217,9 @@
         <p:grpSpPr>
           <a:xfrm>
             <a:off x="3570480" y="1225440"/>
-            <a:ext cx="5107680" cy="2913120"/>
+            <a:ext cx="5107320" cy="2912760"/>
             <a:chOff x="3570480" y="1225440"/>
-            <a:chExt cx="5107680" cy="2913120"/>
+            <a:chExt cx="5107320" cy="2912760"/>
           </a:xfrm>
         </p:grpSpPr>
         <p:sp>
@@ -5231,7 +5231,7 @@
           <p:spPr>
             <a:xfrm>
               <a:off x="3570480" y="1528200"/>
-              <a:ext cx="4914360" cy="2610360"/>
+              <a:ext cx="4914000" cy="2610000"/>
             </a:xfrm>
             <a:prstGeom prst="rect">
               <a:avLst/>
@@ -5278,7 +5278,7 @@
           <p:spPr>
             <a:xfrm>
               <a:off x="3763800" y="1225440"/>
-              <a:ext cx="4914360" cy="2610360"/>
+              <a:ext cx="4914000" cy="2610000"/>
             </a:xfrm>
             <a:prstGeom prst="rect">
               <a:avLst/>
@@ -5326,10 +5326,10 @@
         </p:nvGrpSpPr>
         <p:grpSpPr>
           <a:xfrm>
-            <a:off x="-2068200" y="-402120"/>
-            <a:ext cx="4907880" cy="8508240"/>
-            <a:chOff x="-2068200" y="-402120"/>
-            <a:chExt cx="4907880" cy="8508240"/>
+            <a:off x="-2067840" y="-402120"/>
+            <a:ext cx="4907160" cy="8507880"/>
+            <a:chOff x="-2067840" y="-402120"/>
+            <a:chExt cx="4907160" cy="8507880"/>
           </a:xfrm>
         </p:grpSpPr>
         <p:sp>
@@ -5341,15 +5341,15 @@
           <p:spPr>
             <a:xfrm>
               <a:off x="-893160" y="4486680"/>
-              <a:ext cx="1060200" cy="753480"/>
+              <a:ext cx="1059840" cy="753120"/>
             </a:xfrm>
             <a:custGeom>
               <a:avLst/>
               <a:gdLst>
-                <a:gd name="textAreaLeft" fmla="*/ 278280 w 1060200"/>
-                <a:gd name="textAreaRight" fmla="*/ 794880 w 1060200"/>
-                <a:gd name="textAreaTop" fmla="*/ 258840 h 753480"/>
-                <a:gd name="textAreaBottom" fmla="*/ 507600 h 753480"/>
+                <a:gd name="textAreaLeft" fmla="*/ 278280 w 1059840"/>
+                <a:gd name="textAreaRight" fmla="*/ 794880 w 1059840"/>
+                <a:gd name="textAreaTop" fmla="*/ 258840 h 753120"/>
+                <a:gd name="textAreaBottom" fmla="*/ 507600 h 753120"/>
               </a:gdLst>
               <a:ahLst/>
               <a:rect l="textAreaLeft" t="textAreaTop" r="textAreaRight" b="textAreaBottom"/>
@@ -5744,16 +5744,16 @@
           </p:nvSpPr>
           <p:spPr>
             <a:xfrm rot="5358000">
-              <a:off x="-871920" y="5140440"/>
-              <a:ext cx="1055880" cy="753480"/>
+              <a:off x="-871560" y="5140080"/>
+              <a:ext cx="1055520" cy="753120"/>
             </a:xfrm>
             <a:custGeom>
               <a:avLst/>
               <a:gdLst>
-                <a:gd name="textAreaLeft" fmla="*/ 277200 w 1055880"/>
-                <a:gd name="textAreaRight" fmla="*/ 792000 w 1055880"/>
-                <a:gd name="textAreaTop" fmla="*/ 258840 h 753480"/>
-                <a:gd name="textAreaBottom" fmla="*/ 507600 h 753480"/>
+                <a:gd name="textAreaLeft" fmla="*/ 277200 w 1055520"/>
+                <a:gd name="textAreaRight" fmla="*/ 792000 w 1055520"/>
+                <a:gd name="textAreaTop" fmla="*/ 258840 h 753120"/>
+                <a:gd name="textAreaBottom" fmla="*/ 507600 h 753120"/>
               </a:gdLst>
               <a:ahLst/>
               <a:rect l="textAreaLeft" t="textAreaTop" r="textAreaRight" b="textAreaBottom"/>
@@ -6149,15 +6149,15 @@
           <p:spPr>
             <a:xfrm>
               <a:off x="-228960" y="5161680"/>
-              <a:ext cx="1060200" cy="753480"/>
+              <a:ext cx="1059840" cy="753120"/>
             </a:xfrm>
             <a:custGeom>
               <a:avLst/>
               <a:gdLst>
-                <a:gd name="textAreaLeft" fmla="*/ 278280 w 1060200"/>
-                <a:gd name="textAreaRight" fmla="*/ 794880 w 1060200"/>
-                <a:gd name="textAreaTop" fmla="*/ 258840 h 753480"/>
-                <a:gd name="textAreaBottom" fmla="*/ 507600 h 753480"/>
+                <a:gd name="textAreaLeft" fmla="*/ 278280 w 1059840"/>
+                <a:gd name="textAreaRight" fmla="*/ 794880 w 1059840"/>
+                <a:gd name="textAreaTop" fmla="*/ 258840 h 753120"/>
+                <a:gd name="textAreaBottom" fmla="*/ 507600 h 753120"/>
               </a:gdLst>
               <a:ahLst/>
               <a:rect l="textAreaLeft" t="textAreaTop" r="textAreaRight" b="textAreaBottom"/>
@@ -6552,16 +6552,16 @@
           </p:nvSpPr>
           <p:spPr>
             <a:xfrm rot="5358000">
-              <a:off x="-206640" y="4488840"/>
-              <a:ext cx="1055520" cy="753480"/>
+              <a:off x="-205920" y="4488840"/>
+              <a:ext cx="1055160" cy="753120"/>
             </a:xfrm>
             <a:custGeom>
               <a:avLst/>
               <a:gdLst>
-                <a:gd name="textAreaLeft" fmla="*/ 276840 w 1055520"/>
-                <a:gd name="textAreaRight" fmla="*/ 791640 w 1055520"/>
-                <a:gd name="textAreaTop" fmla="*/ 258840 h 753480"/>
-                <a:gd name="textAreaBottom" fmla="*/ 507600 h 753480"/>
+                <a:gd name="textAreaLeft" fmla="*/ 276840 w 1055160"/>
+                <a:gd name="textAreaRight" fmla="*/ 791640 w 1055160"/>
+                <a:gd name="textAreaTop" fmla="*/ 258840 h 753120"/>
+                <a:gd name="textAreaBottom" fmla="*/ 507600 h 753120"/>
               </a:gdLst>
               <a:ahLst/>
               <a:rect l="textAreaLeft" t="textAreaTop" r="textAreaRight" b="textAreaBottom"/>
@@ -6957,15 +6957,15 @@
           <p:spPr>
             <a:xfrm>
               <a:off x="-228960" y="3826080"/>
-              <a:ext cx="1060200" cy="753480"/>
+              <a:ext cx="1059840" cy="753120"/>
             </a:xfrm>
             <a:custGeom>
               <a:avLst/>
               <a:gdLst>
-                <a:gd name="textAreaLeft" fmla="*/ 278280 w 1060200"/>
-                <a:gd name="textAreaRight" fmla="*/ 794880 w 1060200"/>
-                <a:gd name="textAreaTop" fmla="*/ 258840 h 753480"/>
-                <a:gd name="textAreaBottom" fmla="*/ 507600 h 753480"/>
+                <a:gd name="textAreaLeft" fmla="*/ 278280 w 1059840"/>
+                <a:gd name="textAreaRight" fmla="*/ 794880 w 1059840"/>
+                <a:gd name="textAreaTop" fmla="*/ 258840 h 753120"/>
+                <a:gd name="textAreaBottom" fmla="*/ 507600 h 753120"/>
               </a:gdLst>
               <a:ahLst/>
               <a:rect l="textAreaLeft" t="textAreaTop" r="textAreaRight" b="textAreaBottom"/>
@@ -7313,7 +7313,7 @@
             <a:blipFill rotWithShape="0">
               <a:blip r:embed="rId2"/>
               <a:srcRect/>
-              <a:tile tx="0" ty="0" sx="62056" sy="62056" algn="ctr"/>
+              <a:tile tx="0" ty="0" sx="61702" sy="61702" algn="ctr"/>
             </a:blipFill>
             <a:ln w="0">
               <a:solidFill>
@@ -7362,16 +7362,16 @@
           </p:nvSpPr>
           <p:spPr>
             <a:xfrm rot="5358000">
-              <a:off x="-1560600" y="4481640"/>
-              <a:ext cx="1055880" cy="753480"/>
+              <a:off x="-1560240" y="4481280"/>
+              <a:ext cx="1055520" cy="753120"/>
             </a:xfrm>
             <a:custGeom>
               <a:avLst/>
               <a:gdLst>
-                <a:gd name="textAreaLeft" fmla="*/ 277200 w 1055880"/>
-                <a:gd name="textAreaRight" fmla="*/ 792000 w 1055880"/>
-                <a:gd name="textAreaTop" fmla="*/ 258840 h 753480"/>
-                <a:gd name="textAreaBottom" fmla="*/ 507600 h 753480"/>
+                <a:gd name="textAreaLeft" fmla="*/ 277200 w 1055520"/>
+                <a:gd name="textAreaRight" fmla="*/ 792000 w 1055520"/>
+                <a:gd name="textAreaTop" fmla="*/ 258840 h 753120"/>
+                <a:gd name="textAreaBottom" fmla="*/ 507600 h 753120"/>
               </a:gdLst>
               <a:ahLst/>
               <a:rect l="textAreaLeft" t="textAreaTop" r="textAreaRight" b="textAreaBottom"/>
@@ -7719,7 +7719,7 @@
             <a:blipFill rotWithShape="0">
               <a:blip r:embed="rId3"/>
               <a:srcRect/>
-              <a:tile tx="0" ty="0" sx="62056" sy="62056" algn="ctr"/>
+              <a:tile tx="0" ty="0" sx="61702" sy="61702" algn="ctr"/>
             </a:blipFill>
             <a:ln w="0">
               <a:solidFill>
@@ -7768,16 +7768,16 @@
           </p:nvSpPr>
           <p:spPr>
             <a:xfrm rot="5358000">
-              <a:off x="-2212920" y="5157720"/>
-              <a:ext cx="1055880" cy="753480"/>
+              <a:off x="-2212560" y="5157360"/>
+              <a:ext cx="1055520" cy="753120"/>
             </a:xfrm>
             <a:custGeom>
               <a:avLst/>
               <a:gdLst>
-                <a:gd name="textAreaLeft" fmla="*/ 277200 w 1055880"/>
-                <a:gd name="textAreaRight" fmla="*/ 792000 w 1055880"/>
-                <a:gd name="textAreaTop" fmla="*/ 258840 h 753480"/>
-                <a:gd name="textAreaBottom" fmla="*/ 507600 h 753480"/>
+                <a:gd name="textAreaLeft" fmla="*/ 277200 w 1055520"/>
+                <a:gd name="textAreaRight" fmla="*/ 792000 w 1055520"/>
+                <a:gd name="textAreaTop" fmla="*/ 258840 h 753120"/>
+                <a:gd name="textAreaBottom" fmla="*/ 507600 h 753120"/>
               </a:gdLst>
               <a:ahLst/>
               <a:rect l="textAreaLeft" t="textAreaTop" r="textAreaRight" b="textAreaBottom"/>
@@ -8172,16 +8172,16 @@
           </p:nvSpPr>
           <p:spPr>
             <a:xfrm rot="5358000">
-              <a:off x="-871560" y="3808440"/>
-              <a:ext cx="1055880" cy="753480"/>
+              <a:off x="-871200" y="3808080"/>
+              <a:ext cx="1055520" cy="753120"/>
             </a:xfrm>
             <a:custGeom>
               <a:avLst/>
               <a:gdLst>
-                <a:gd name="textAreaLeft" fmla="*/ 277200 w 1055880"/>
-                <a:gd name="textAreaRight" fmla="*/ 792000 w 1055880"/>
-                <a:gd name="textAreaTop" fmla="*/ 258840 h 753480"/>
-                <a:gd name="textAreaBottom" fmla="*/ 507600 h 753480"/>
+                <a:gd name="textAreaLeft" fmla="*/ 277200 w 1055520"/>
+                <a:gd name="textAreaRight" fmla="*/ 792000 w 1055520"/>
+                <a:gd name="textAreaTop" fmla="*/ 258840 h 753120"/>
+                <a:gd name="textAreaBottom" fmla="*/ 507600 h 753120"/>
               </a:gdLst>
               <a:ahLst/>
               <a:rect l="textAreaLeft" t="textAreaTop" r="textAreaRight" b="textAreaBottom"/>
@@ -8576,16 +8576,16 @@
           </p:nvSpPr>
           <p:spPr>
             <a:xfrm rot="5358000">
-              <a:off x="-196560" y="3141720"/>
-              <a:ext cx="1055880" cy="753480"/>
+              <a:off x="-196200" y="3141360"/>
+              <a:ext cx="1055520" cy="753120"/>
             </a:xfrm>
             <a:custGeom>
               <a:avLst/>
               <a:gdLst>
-                <a:gd name="textAreaLeft" fmla="*/ 277200 w 1055880"/>
-                <a:gd name="textAreaRight" fmla="*/ 792000 w 1055880"/>
-                <a:gd name="textAreaTop" fmla="*/ 258840 h 753480"/>
-                <a:gd name="textAreaBottom" fmla="*/ 507600 h 753480"/>
+                <a:gd name="textAreaLeft" fmla="*/ 277200 w 1055520"/>
+                <a:gd name="textAreaRight" fmla="*/ 792000 w 1055520"/>
+                <a:gd name="textAreaTop" fmla="*/ 258840 h 753120"/>
+                <a:gd name="textAreaBottom" fmla="*/ 507600 h 753120"/>
               </a:gdLst>
               <a:ahLst/>
               <a:rect l="textAreaLeft" t="textAreaTop" r="textAreaRight" b="textAreaBottom"/>
@@ -8981,15 +8981,15 @@
           <p:spPr>
             <a:xfrm>
               <a:off x="455040" y="4477680"/>
-              <a:ext cx="1060200" cy="753480"/>
+              <a:ext cx="1059840" cy="753120"/>
             </a:xfrm>
             <a:custGeom>
               <a:avLst/>
               <a:gdLst>
-                <a:gd name="textAreaLeft" fmla="*/ 278280 w 1060200"/>
-                <a:gd name="textAreaRight" fmla="*/ 794880 w 1060200"/>
-                <a:gd name="textAreaTop" fmla="*/ 258840 h 753480"/>
-                <a:gd name="textAreaBottom" fmla="*/ 507600 h 753480"/>
+                <a:gd name="textAreaLeft" fmla="*/ 278280 w 1059840"/>
+                <a:gd name="textAreaRight" fmla="*/ 794880 w 1059840"/>
+                <a:gd name="textAreaTop" fmla="*/ 258840 h 753120"/>
+                <a:gd name="textAreaBottom" fmla="*/ 507600 h 753120"/>
               </a:gdLst>
               <a:ahLst/>
               <a:rect l="textAreaLeft" t="textAreaTop" r="textAreaRight" b="textAreaBottom"/>
@@ -9384,16 +9384,16 @@
           </p:nvSpPr>
           <p:spPr>
             <a:xfrm rot="5358000">
-              <a:off x="483120" y="3808440"/>
-              <a:ext cx="1055880" cy="753480"/>
+              <a:off x="483120" y="3808080"/>
+              <a:ext cx="1055520" cy="753120"/>
             </a:xfrm>
             <a:custGeom>
               <a:avLst/>
               <a:gdLst>
-                <a:gd name="textAreaLeft" fmla="*/ 277200 w 1055880"/>
-                <a:gd name="textAreaRight" fmla="*/ 792000 w 1055880"/>
-                <a:gd name="textAreaTop" fmla="*/ 258840 h 753480"/>
-                <a:gd name="textAreaBottom" fmla="*/ 507600 h 753480"/>
+                <a:gd name="textAreaLeft" fmla="*/ 277200 w 1055520"/>
+                <a:gd name="textAreaRight" fmla="*/ 792000 w 1055520"/>
+                <a:gd name="textAreaTop" fmla="*/ 258840 h 753120"/>
+                <a:gd name="textAreaBottom" fmla="*/ 507600 h 753120"/>
               </a:gdLst>
               <a:ahLst/>
               <a:rect l="textAreaLeft" t="textAreaTop" r="textAreaRight" b="textAreaBottom"/>
@@ -9789,15 +9789,15 @@
           <p:spPr>
             <a:xfrm>
               <a:off x="1158840" y="5170680"/>
-              <a:ext cx="1060200" cy="753480"/>
+              <a:ext cx="1059840" cy="753120"/>
             </a:xfrm>
             <a:custGeom>
               <a:avLst/>
               <a:gdLst>
-                <a:gd name="textAreaLeft" fmla="*/ 278280 w 1060200"/>
-                <a:gd name="textAreaRight" fmla="*/ 794880 w 1060200"/>
-                <a:gd name="textAreaTop" fmla="*/ 258840 h 753480"/>
-                <a:gd name="textAreaBottom" fmla="*/ 507600 h 753480"/>
+                <a:gd name="textAreaLeft" fmla="*/ 278280 w 1059840"/>
+                <a:gd name="textAreaRight" fmla="*/ 794880 w 1059840"/>
+                <a:gd name="textAreaTop" fmla="*/ 258840 h 753120"/>
+                <a:gd name="textAreaBottom" fmla="*/ 507600 h 753120"/>
               </a:gdLst>
               <a:ahLst/>
               <a:rect l="textAreaLeft" t="textAreaTop" r="textAreaRight" b="textAreaBottom"/>
@@ -10193,15 +10193,15 @@
           <p:spPr>
             <a:xfrm>
               <a:off x="-1561680" y="5162760"/>
-              <a:ext cx="1060200" cy="753480"/>
+              <a:ext cx="1059840" cy="753120"/>
             </a:xfrm>
             <a:custGeom>
               <a:avLst/>
               <a:gdLst>
-                <a:gd name="textAreaLeft" fmla="*/ 278280 w 1060200"/>
-                <a:gd name="textAreaRight" fmla="*/ 794880 w 1060200"/>
-                <a:gd name="textAreaTop" fmla="*/ 258840 h 753480"/>
-                <a:gd name="textAreaBottom" fmla="*/ 507600 h 753480"/>
+                <a:gd name="textAreaLeft" fmla="*/ 278280 w 1059840"/>
+                <a:gd name="textAreaRight" fmla="*/ 794880 w 1059840"/>
+                <a:gd name="textAreaTop" fmla="*/ 258840 h 753120"/>
+                <a:gd name="textAreaBottom" fmla="*/ 507600 h 753120"/>
               </a:gdLst>
               <a:ahLst/>
               <a:rect l="textAreaLeft" t="textAreaTop" r="textAreaRight" b="textAreaBottom"/>
@@ -10596,16 +10596,16 @@
           </p:nvSpPr>
           <p:spPr>
             <a:xfrm rot="5358000">
-              <a:off x="474120" y="5157720"/>
-              <a:ext cx="1055880" cy="753480"/>
+              <a:off x="474120" y="5157360"/>
+              <a:ext cx="1055520" cy="753120"/>
             </a:xfrm>
             <a:custGeom>
               <a:avLst/>
               <a:gdLst>
-                <a:gd name="textAreaLeft" fmla="*/ 277200 w 1055880"/>
-                <a:gd name="textAreaRight" fmla="*/ 792000 w 1055880"/>
-                <a:gd name="textAreaTop" fmla="*/ 258840 h 753480"/>
-                <a:gd name="textAreaBottom" fmla="*/ 507600 h 753480"/>
+                <a:gd name="textAreaLeft" fmla="*/ 277200 w 1055520"/>
+                <a:gd name="textAreaRight" fmla="*/ 792000 w 1055520"/>
+                <a:gd name="textAreaTop" fmla="*/ 258840 h 753120"/>
+                <a:gd name="textAreaBottom" fmla="*/ 507600 h 753120"/>
               </a:gdLst>
               <a:ahLst/>
               <a:rect l="textAreaLeft" t="textAreaTop" r="textAreaRight" b="textAreaBottom"/>
@@ -11000,16 +11000,16 @@
           </p:nvSpPr>
           <p:spPr>
             <a:xfrm flipH="1" rot="16242000">
-              <a:off x="-219960" y="1780920"/>
-              <a:ext cx="1055880" cy="753480"/>
+              <a:off x="-219600" y="1780560"/>
+              <a:ext cx="1055520" cy="753120"/>
             </a:xfrm>
             <a:custGeom>
               <a:avLst/>
               <a:gdLst>
-                <a:gd name="textAreaLeft" fmla="*/ 270360 w 1055880"/>
-                <a:gd name="textAreaRight" fmla="*/ 785160 w 1055880"/>
-                <a:gd name="textAreaTop" fmla="*/ 258840 h 753480"/>
-                <a:gd name="textAreaBottom" fmla="*/ 507600 h 753480"/>
+                <a:gd name="textAreaLeft" fmla="*/ 270360 w 1055520"/>
+                <a:gd name="textAreaRight" fmla="*/ 785160 w 1055520"/>
+                <a:gd name="textAreaTop" fmla="*/ 258840 h 753120"/>
+                <a:gd name="textAreaBottom" fmla="*/ 507600 h 753120"/>
               </a:gdLst>
               <a:ahLst/>
               <a:rect l="textAreaLeft" t="textAreaTop" r="textAreaRight" b="textAreaBottom"/>
@@ -11404,16 +11404,16 @@
           </p:nvSpPr>
           <p:spPr>
             <a:xfrm flipH="1" rot="16242000">
-              <a:off x="419040" y="2457000"/>
-              <a:ext cx="1055880" cy="753480"/>
+              <a:off x="419040" y="2456640"/>
+              <a:ext cx="1055520" cy="753120"/>
             </a:xfrm>
             <a:custGeom>
               <a:avLst/>
               <a:gdLst>
-                <a:gd name="textAreaLeft" fmla="*/ 270360 w 1055880"/>
-                <a:gd name="textAreaRight" fmla="*/ 785160 w 1055880"/>
-                <a:gd name="textAreaTop" fmla="*/ 258840 h 753480"/>
-                <a:gd name="textAreaBottom" fmla="*/ 507600 h 753480"/>
+                <a:gd name="textAreaLeft" fmla="*/ 270360 w 1055520"/>
+                <a:gd name="textAreaRight" fmla="*/ 785160 w 1055520"/>
+                <a:gd name="textAreaTop" fmla="*/ 258840 h 753120"/>
+                <a:gd name="textAreaBottom" fmla="*/ 507600 h 753120"/>
               </a:gdLst>
               <a:ahLst/>
               <a:rect l="textAreaLeft" t="textAreaTop" r="textAreaRight" b="textAreaBottom"/>
@@ -11809,15 +11809,15 @@
           <p:spPr>
             <a:xfrm flipH="1">
               <a:off x="-259560" y="2462040"/>
-              <a:ext cx="1060200" cy="753480"/>
+              <a:ext cx="1059840" cy="753120"/>
             </a:xfrm>
             <a:custGeom>
               <a:avLst/>
               <a:gdLst>
-                <a:gd name="textAreaLeft" fmla="*/ 284760 w 1060200"/>
-                <a:gd name="textAreaRight" fmla="*/ 801360 w 1060200"/>
-                <a:gd name="textAreaTop" fmla="*/ 258840 h 753480"/>
-                <a:gd name="textAreaBottom" fmla="*/ 507600 h 753480"/>
+                <a:gd name="textAreaLeft" fmla="*/ 285120 w 1059840"/>
+                <a:gd name="textAreaRight" fmla="*/ 801720 w 1059840"/>
+                <a:gd name="textAreaTop" fmla="*/ 258840 h 753120"/>
+                <a:gd name="textAreaBottom" fmla="*/ 507600 h 753120"/>
               </a:gdLst>
               <a:ahLst/>
               <a:rect l="textAreaLeft" t="textAreaTop" r="textAreaRight" b="textAreaBottom"/>
@@ -12213,15 +12213,15 @@
           <p:spPr>
             <a:xfrm>
               <a:off x="1107720" y="1135080"/>
-              <a:ext cx="1060200" cy="753480"/>
+              <a:ext cx="1059840" cy="753120"/>
             </a:xfrm>
             <a:custGeom>
               <a:avLst/>
               <a:gdLst>
-                <a:gd name="textAreaLeft" fmla="*/ 278280 w 1060200"/>
-                <a:gd name="textAreaRight" fmla="*/ 794880 w 1060200"/>
-                <a:gd name="textAreaTop" fmla="*/ 258840 h 753480"/>
-                <a:gd name="textAreaBottom" fmla="*/ 507600 h 753480"/>
+                <a:gd name="textAreaLeft" fmla="*/ 278280 w 1059840"/>
+                <a:gd name="textAreaRight" fmla="*/ 794880 w 1059840"/>
+                <a:gd name="textAreaTop" fmla="*/ 258840 h 753120"/>
+                <a:gd name="textAreaBottom" fmla="*/ 507600 h 753120"/>
               </a:gdLst>
               <a:ahLst/>
               <a:rect l="textAreaLeft" t="textAreaTop" r="textAreaRight" b="textAreaBottom"/>
@@ -12616,16 +12616,16 @@
           </p:nvSpPr>
           <p:spPr>
             <a:xfrm rot="5358000">
-              <a:off x="1115640" y="1788840"/>
-              <a:ext cx="1055880" cy="753480"/>
+              <a:off x="1115640" y="1788480"/>
+              <a:ext cx="1055520" cy="753120"/>
             </a:xfrm>
             <a:custGeom>
               <a:avLst/>
               <a:gdLst>
-                <a:gd name="textAreaLeft" fmla="*/ 277200 w 1055880"/>
-                <a:gd name="textAreaRight" fmla="*/ 792000 w 1055880"/>
-                <a:gd name="textAreaTop" fmla="*/ 258840 h 753480"/>
-                <a:gd name="textAreaBottom" fmla="*/ 507600 h 753480"/>
+                <a:gd name="textAreaLeft" fmla="*/ 277200 w 1055520"/>
+                <a:gd name="textAreaRight" fmla="*/ 792000 w 1055520"/>
+                <a:gd name="textAreaTop" fmla="*/ 258840 h 753120"/>
+                <a:gd name="textAreaBottom" fmla="*/ 507600 h 753120"/>
               </a:gdLst>
               <a:ahLst/>
               <a:rect l="textAreaLeft" t="textAreaTop" r="textAreaRight" b="textAreaBottom"/>
@@ -13020,16 +13020,16 @@
           </p:nvSpPr>
           <p:spPr>
             <a:xfrm rot="5358000">
-              <a:off x="426960" y="1130040"/>
-              <a:ext cx="1055880" cy="753480"/>
+              <a:off x="426960" y="1129680"/>
+              <a:ext cx="1055520" cy="753120"/>
             </a:xfrm>
             <a:custGeom>
               <a:avLst/>
               <a:gdLst>
-                <a:gd name="textAreaLeft" fmla="*/ 277200 w 1055880"/>
-                <a:gd name="textAreaRight" fmla="*/ 792000 w 1055880"/>
-                <a:gd name="textAreaTop" fmla="*/ 258840 h 753480"/>
-                <a:gd name="textAreaBottom" fmla="*/ 507600 h 753480"/>
+                <a:gd name="textAreaLeft" fmla="*/ 277200 w 1055520"/>
+                <a:gd name="textAreaRight" fmla="*/ 792000 w 1055520"/>
+                <a:gd name="textAreaTop" fmla="*/ 258840 h 753120"/>
+                <a:gd name="textAreaBottom" fmla="*/ 507600 h 753120"/>
               </a:gdLst>
               <a:ahLst/>
               <a:rect l="textAreaLeft" t="textAreaTop" r="textAreaRight" b="textAreaBottom"/>
@@ -13377,7 +13377,7 @@
             <a:blipFill rotWithShape="0">
               <a:blip r:embed="rId4"/>
               <a:srcRect/>
-              <a:tile tx="0" ty="0" sx="62056" sy="62056" algn="ctr"/>
+              <a:tile tx="0" ty="0" sx="61702" sy="61702" algn="ctr"/>
             </a:blipFill>
             <a:ln w="0">
               <a:solidFill>
@@ -13427,15 +13427,15 @@
           <p:spPr>
             <a:xfrm>
               <a:off x="439200" y="1811160"/>
-              <a:ext cx="1060200" cy="753480"/>
+              <a:ext cx="1059840" cy="753120"/>
             </a:xfrm>
             <a:custGeom>
               <a:avLst/>
               <a:gdLst>
-                <a:gd name="textAreaLeft" fmla="*/ 278280 w 1060200"/>
-                <a:gd name="textAreaRight" fmla="*/ 794880 w 1060200"/>
-                <a:gd name="textAreaTop" fmla="*/ 258840 h 753480"/>
-                <a:gd name="textAreaBottom" fmla="*/ 507600 h 753480"/>
+                <a:gd name="textAreaLeft" fmla="*/ 278280 w 1059840"/>
+                <a:gd name="textAreaRight" fmla="*/ 794880 w 1059840"/>
+                <a:gd name="textAreaTop" fmla="*/ 258840 h 753120"/>
+                <a:gd name="textAreaBottom" fmla="*/ 507600 h 753120"/>
               </a:gdLst>
               <a:ahLst/>
               <a:rect l="textAreaLeft" t="textAreaTop" r="textAreaRight" b="textAreaBottom"/>
@@ -13831,15 +13831,15 @@
           <p:spPr>
             <a:xfrm>
               <a:off x="423720" y="451080"/>
-              <a:ext cx="1060200" cy="753480"/>
+              <a:ext cx="1059840" cy="753120"/>
             </a:xfrm>
             <a:custGeom>
               <a:avLst/>
               <a:gdLst>
-                <a:gd name="textAreaLeft" fmla="*/ 278280 w 1060200"/>
-                <a:gd name="textAreaRight" fmla="*/ 794880 w 1060200"/>
-                <a:gd name="textAreaTop" fmla="*/ 258840 h 753480"/>
-                <a:gd name="textAreaBottom" fmla="*/ 507600 h 753480"/>
+                <a:gd name="textAreaLeft" fmla="*/ 278280 w 1059840"/>
+                <a:gd name="textAreaRight" fmla="*/ 794880 w 1059840"/>
+                <a:gd name="textAreaTop" fmla="*/ 258840 h 753120"/>
+                <a:gd name="textAreaBottom" fmla="*/ 507600 h 753120"/>
               </a:gdLst>
               <a:ahLst/>
               <a:rect l="textAreaLeft" t="textAreaTop" r="textAreaRight" b="textAreaBottom"/>
@@ -14234,16 +14234,16 @@
           </p:nvSpPr>
           <p:spPr>
             <a:xfrm rot="5358000">
-              <a:off x="-221040" y="425880"/>
-              <a:ext cx="1055880" cy="753480"/>
+              <a:off x="-220680" y="425520"/>
+              <a:ext cx="1055520" cy="753120"/>
             </a:xfrm>
             <a:custGeom>
               <a:avLst/>
               <a:gdLst>
-                <a:gd name="textAreaLeft" fmla="*/ 277200 w 1055880"/>
-                <a:gd name="textAreaRight" fmla="*/ 792000 w 1055880"/>
-                <a:gd name="textAreaTop" fmla="*/ 258840 h 753480"/>
-                <a:gd name="textAreaBottom" fmla="*/ 507600 h 753480"/>
+                <a:gd name="textAreaLeft" fmla="*/ 277200 w 1055520"/>
+                <a:gd name="textAreaRight" fmla="*/ 792000 w 1055520"/>
+                <a:gd name="textAreaTop" fmla="*/ 258840 h 753120"/>
+                <a:gd name="textAreaBottom" fmla="*/ 507600 h 753120"/>
               </a:gdLst>
               <a:ahLst/>
               <a:rect l="textAreaLeft" t="textAreaTop" r="textAreaRight" b="textAreaBottom"/>
@@ -14639,15 +14639,15 @@
           <p:spPr>
             <a:xfrm rot="5358000">
               <a:off x="447480" y="-246240"/>
-              <a:ext cx="1055880" cy="753480"/>
+              <a:ext cx="1055520" cy="753120"/>
             </a:xfrm>
             <a:custGeom>
               <a:avLst/>
               <a:gdLst>
-                <a:gd name="textAreaLeft" fmla="*/ 277200 w 1055880"/>
-                <a:gd name="textAreaRight" fmla="*/ 792000 w 1055880"/>
-                <a:gd name="textAreaTop" fmla="*/ 258840 h 753480"/>
-                <a:gd name="textAreaBottom" fmla="*/ 507600 h 753480"/>
+                <a:gd name="textAreaLeft" fmla="*/ 277200 w 1055520"/>
+                <a:gd name="textAreaRight" fmla="*/ 792000 w 1055520"/>
+                <a:gd name="textAreaTop" fmla="*/ 258840 h 753120"/>
+                <a:gd name="textAreaBottom" fmla="*/ 507600 h 753120"/>
               </a:gdLst>
               <a:ahLst/>
               <a:rect l="textAreaLeft" t="textAreaTop" r="textAreaRight" b="textAreaBottom"/>
@@ -15043,15 +15043,15 @@
           <p:spPr>
             <a:xfrm>
               <a:off x="1779480" y="1794600"/>
-              <a:ext cx="1060200" cy="753480"/>
+              <a:ext cx="1059840" cy="753120"/>
             </a:xfrm>
             <a:custGeom>
               <a:avLst/>
               <a:gdLst>
-                <a:gd name="textAreaLeft" fmla="*/ 278280 w 1060200"/>
-                <a:gd name="textAreaRight" fmla="*/ 794880 w 1060200"/>
-                <a:gd name="textAreaTop" fmla="*/ 258840 h 753480"/>
-                <a:gd name="textAreaBottom" fmla="*/ 507600 h 753480"/>
+                <a:gd name="textAreaLeft" fmla="*/ 278280 w 1059840"/>
+                <a:gd name="textAreaRight" fmla="*/ 794880 w 1059840"/>
+                <a:gd name="textAreaTop" fmla="*/ 258840 h 753120"/>
+                <a:gd name="textAreaBottom" fmla="*/ 507600 h 753120"/>
               </a:gdLst>
               <a:ahLst/>
               <a:rect l="textAreaLeft" t="textAreaTop" r="textAreaRight" b="textAreaBottom"/>
@@ -15447,15 +15447,15 @@
           <p:spPr>
             <a:xfrm>
               <a:off x="1106280" y="-257040"/>
-              <a:ext cx="1060200" cy="753480"/>
+              <a:ext cx="1059840" cy="753120"/>
             </a:xfrm>
             <a:custGeom>
               <a:avLst/>
               <a:gdLst>
-                <a:gd name="textAreaLeft" fmla="*/ 278280 w 1060200"/>
-                <a:gd name="textAreaRight" fmla="*/ 794880 w 1060200"/>
-                <a:gd name="textAreaTop" fmla="*/ 258840 h 753480"/>
-                <a:gd name="textAreaBottom" fmla="*/ 507600 h 753480"/>
+                <a:gd name="textAreaLeft" fmla="*/ 278280 w 1059840"/>
+                <a:gd name="textAreaRight" fmla="*/ 794880 w 1059840"/>
+                <a:gd name="textAreaTop" fmla="*/ 258840 h 753120"/>
+                <a:gd name="textAreaBottom" fmla="*/ 507600 h 753120"/>
               </a:gdLst>
               <a:ahLst/>
               <a:rect l="textAreaLeft" t="textAreaTop" r="textAreaRight" b="textAreaBottom"/>
@@ -15803,7 +15803,7 @@
             <a:blipFill rotWithShape="0">
               <a:blip r:embed="rId5"/>
               <a:srcRect/>
-              <a:tile tx="0" ty="0" sx="62056" sy="62056" algn="ctr"/>
+              <a:tile tx="0" ty="0" sx="61702" sy="61702" algn="ctr"/>
             </a:blipFill>
             <a:ln w="0">
               <a:solidFill>
@@ -15853,15 +15853,15 @@
           <p:spPr>
             <a:xfrm>
               <a:off x="-908280" y="1790640"/>
-              <a:ext cx="1060200" cy="753480"/>
+              <a:ext cx="1059840" cy="753120"/>
             </a:xfrm>
             <a:custGeom>
               <a:avLst/>
               <a:gdLst>
-                <a:gd name="textAreaLeft" fmla="*/ 278280 w 1060200"/>
-                <a:gd name="textAreaRight" fmla="*/ 794880 w 1060200"/>
-                <a:gd name="textAreaTop" fmla="*/ 258840 h 753480"/>
-                <a:gd name="textAreaBottom" fmla="*/ 507600 h 753480"/>
+                <a:gd name="textAreaLeft" fmla="*/ 278280 w 1059840"/>
+                <a:gd name="textAreaRight" fmla="*/ 794880 w 1059840"/>
+                <a:gd name="textAreaTop" fmla="*/ 258840 h 753120"/>
+                <a:gd name="textAreaBottom" fmla="*/ 507600 h 753120"/>
               </a:gdLst>
               <a:ahLst/>
               <a:rect l="textAreaLeft" t="textAreaTop" r="textAreaRight" b="textAreaBottom"/>
@@ -16209,7 +16209,7 @@
             <a:blipFill rotWithShape="0">
               <a:blip r:embed="rId6"/>
               <a:srcRect/>
-              <a:tile tx="0" ty="0" sx="62056" sy="62056" algn="ctr"/>
+              <a:tile tx="0" ty="0" sx="61702" sy="61702" algn="ctr"/>
             </a:blipFill>
             <a:ln w="0">
               <a:solidFill>
@@ -16258,16 +16258,16 @@
           </p:nvSpPr>
           <p:spPr>
             <a:xfrm rot="5358000">
-              <a:off x="-220320" y="5812200"/>
-              <a:ext cx="1055880" cy="753480"/>
+              <a:off x="-219960" y="5811840"/>
+              <a:ext cx="1055520" cy="753120"/>
             </a:xfrm>
             <a:custGeom>
               <a:avLst/>
               <a:gdLst>
-                <a:gd name="textAreaLeft" fmla="*/ 277200 w 1055880"/>
-                <a:gd name="textAreaRight" fmla="*/ 792000 w 1055880"/>
-                <a:gd name="textAreaTop" fmla="*/ 258840 h 753480"/>
-                <a:gd name="textAreaBottom" fmla="*/ 507600 h 753480"/>
+                <a:gd name="textAreaLeft" fmla="*/ 277200 w 1055520"/>
+                <a:gd name="textAreaRight" fmla="*/ 792000 w 1055520"/>
+                <a:gd name="textAreaTop" fmla="*/ 258840 h 753120"/>
+                <a:gd name="textAreaBottom" fmla="*/ 507600 h 753120"/>
               </a:gdLst>
               <a:ahLst/>
               <a:rect l="textAreaLeft" t="textAreaTop" r="textAreaRight" b="textAreaBottom"/>
@@ -16663,15 +16663,15 @@
           <p:spPr>
             <a:xfrm>
               <a:off x="427320" y="5853960"/>
-              <a:ext cx="1060200" cy="753480"/>
+              <a:ext cx="1059840" cy="753120"/>
             </a:xfrm>
             <a:custGeom>
               <a:avLst/>
               <a:gdLst>
-                <a:gd name="textAreaLeft" fmla="*/ 278280 w 1060200"/>
-                <a:gd name="textAreaRight" fmla="*/ 794880 w 1060200"/>
-                <a:gd name="textAreaTop" fmla="*/ 258840 h 753480"/>
-                <a:gd name="textAreaBottom" fmla="*/ 507600 h 753480"/>
+                <a:gd name="textAreaLeft" fmla="*/ 278280 w 1059840"/>
+                <a:gd name="textAreaRight" fmla="*/ 794880 w 1059840"/>
+                <a:gd name="textAreaTop" fmla="*/ 258840 h 753120"/>
+                <a:gd name="textAreaBottom" fmla="*/ 507600 h 753120"/>
               </a:gdLst>
               <a:ahLst/>
               <a:rect l="textAreaLeft" t="textAreaTop" r="textAreaRight" b="textAreaBottom"/>
@@ -17019,7 +17019,7 @@
             <a:blipFill rotWithShape="0">
               <a:blip r:embed="rId7"/>
               <a:srcRect/>
-              <a:tile tx="0" ty="0" sx="62056" sy="62056" algn="ctr"/>
+              <a:tile tx="0" ty="0" sx="61702" sy="61702" algn="ctr"/>
             </a:blipFill>
             <a:ln w="0">
               <a:solidFill>
@@ -17069,15 +17069,15 @@
           <p:spPr>
             <a:xfrm>
               <a:off x="-236880" y="6494040"/>
-              <a:ext cx="1060200" cy="753480"/>
+              <a:ext cx="1059840" cy="753120"/>
             </a:xfrm>
             <a:custGeom>
               <a:avLst/>
               <a:gdLst>
-                <a:gd name="textAreaLeft" fmla="*/ 278280 w 1060200"/>
-                <a:gd name="textAreaRight" fmla="*/ 794880 w 1060200"/>
-                <a:gd name="textAreaTop" fmla="*/ 258840 h 753480"/>
-                <a:gd name="textAreaBottom" fmla="*/ 507600 h 753480"/>
+                <a:gd name="textAreaLeft" fmla="*/ 278280 w 1059840"/>
+                <a:gd name="textAreaRight" fmla="*/ 794880 w 1059840"/>
+                <a:gd name="textAreaTop" fmla="*/ 258840 h 753120"/>
+                <a:gd name="textAreaBottom" fmla="*/ 507600 h 753120"/>
               </a:gdLst>
               <a:ahLst/>
               <a:rect l="textAreaLeft" t="textAreaTop" r="textAreaRight" b="textAreaBottom"/>
@@ -17472,16 +17472,16 @@
           </p:nvSpPr>
           <p:spPr>
             <a:xfrm rot="5358000">
-              <a:off x="-904320" y="6489000"/>
-              <a:ext cx="1055880" cy="753480"/>
+              <a:off x="-903960" y="6488640"/>
+              <a:ext cx="1055520" cy="753120"/>
             </a:xfrm>
             <a:custGeom>
               <a:avLst/>
               <a:gdLst>
-                <a:gd name="textAreaLeft" fmla="*/ 277200 w 1055880"/>
-                <a:gd name="textAreaRight" fmla="*/ 792000 w 1055880"/>
-                <a:gd name="textAreaTop" fmla="*/ 258840 h 753480"/>
-                <a:gd name="textAreaBottom" fmla="*/ 507600 h 753480"/>
+                <a:gd name="textAreaLeft" fmla="*/ 277200 w 1055520"/>
+                <a:gd name="textAreaRight" fmla="*/ 792000 w 1055520"/>
+                <a:gd name="textAreaTop" fmla="*/ 258840 h 753120"/>
+                <a:gd name="textAreaBottom" fmla="*/ 507600 h 753120"/>
               </a:gdLst>
               <a:ahLst/>
               <a:rect l="textAreaLeft" t="textAreaTop" r="textAreaRight" b="textAreaBottom"/>
@@ -17876,16 +17876,16 @@
           </p:nvSpPr>
           <p:spPr>
             <a:xfrm rot="5358000">
-              <a:off x="-233280" y="7197120"/>
-              <a:ext cx="1055520" cy="753480"/>
+              <a:off x="-232560" y="7197120"/>
+              <a:ext cx="1055160" cy="753120"/>
             </a:xfrm>
             <a:custGeom>
               <a:avLst/>
               <a:gdLst>
-                <a:gd name="textAreaLeft" fmla="*/ 276840 w 1055520"/>
-                <a:gd name="textAreaRight" fmla="*/ 791640 w 1055520"/>
-                <a:gd name="textAreaTop" fmla="*/ 258840 h 753480"/>
-                <a:gd name="textAreaBottom" fmla="*/ 507600 h 753480"/>
+                <a:gd name="textAreaLeft" fmla="*/ 276840 w 1055160"/>
+                <a:gd name="textAreaRight" fmla="*/ 791640 w 1055160"/>
+                <a:gd name="textAreaTop" fmla="*/ 258840 h 753120"/>
+                <a:gd name="textAreaBottom" fmla="*/ 507600 h 753120"/>
               </a:gdLst>
               <a:ahLst/>
               <a:rect l="textAreaLeft" t="textAreaTop" r="textAreaRight" b="textAreaBottom"/>
@@ -18280,16 +18280,16 @@
           </p:nvSpPr>
           <p:spPr>
             <a:xfrm rot="5358000">
-              <a:off x="439200" y="6505560"/>
-              <a:ext cx="1055880" cy="753480"/>
+              <a:off x="439200" y="6505200"/>
+              <a:ext cx="1055520" cy="753120"/>
             </a:xfrm>
             <a:custGeom>
               <a:avLst/>
               <a:gdLst>
-                <a:gd name="textAreaLeft" fmla="*/ 277200 w 1055880"/>
-                <a:gd name="textAreaRight" fmla="*/ 792000 w 1055880"/>
-                <a:gd name="textAreaTop" fmla="*/ 258840 h 753480"/>
-                <a:gd name="textAreaBottom" fmla="*/ 507600 h 753480"/>
+                <a:gd name="textAreaLeft" fmla="*/ 277200 w 1055520"/>
+                <a:gd name="textAreaRight" fmla="*/ 792000 w 1055520"/>
+                <a:gd name="textAreaTop" fmla="*/ 258840 h 753120"/>
+                <a:gd name="textAreaBottom" fmla="*/ 507600 h 753120"/>
               </a:gdLst>
               <a:ahLst/>
               <a:rect l="textAreaLeft" t="textAreaTop" r="textAreaRight" b="textAreaBottom"/>
@@ -18685,15 +18685,15 @@
           <p:spPr>
             <a:xfrm>
               <a:off x="1103400" y="6530040"/>
-              <a:ext cx="1060200" cy="753480"/>
+              <a:ext cx="1059840" cy="753120"/>
             </a:xfrm>
             <a:custGeom>
               <a:avLst/>
               <a:gdLst>
-                <a:gd name="textAreaLeft" fmla="*/ 278280 w 1060200"/>
-                <a:gd name="textAreaRight" fmla="*/ 794880 w 1060200"/>
-                <a:gd name="textAreaTop" fmla="*/ 258840 h 753480"/>
-                <a:gd name="textAreaBottom" fmla="*/ 507600 h 753480"/>
+                <a:gd name="textAreaLeft" fmla="*/ 278280 w 1059840"/>
+                <a:gd name="textAreaRight" fmla="*/ 794880 w 1059840"/>
+                <a:gd name="textAreaTop" fmla="*/ 258840 h 753120"/>
+                <a:gd name="textAreaBottom" fmla="*/ 507600 h 753120"/>
               </a:gdLst>
               <a:ahLst/>
               <a:rect l="textAreaLeft" t="textAreaTop" r="textAreaRight" b="textAreaBottom"/>
@@ -19090,7 +19090,7 @@
         <p:spPr>
           <a:xfrm>
             <a:off x="3844800" y="1408320"/>
-            <a:ext cx="1084320" cy="1212840"/>
+            <a:ext cx="1083960" cy="1212480"/>
           </a:xfrm>
           <a:prstGeom prst="rect">
             <a:avLst/>
@@ -19144,7 +19144,7 @@
         <p:spPr>
           <a:xfrm>
             <a:off x="7868160" y="3039840"/>
-            <a:ext cx="1084320" cy="1098720"/>
+            <a:ext cx="1083960" cy="1098360"/>
           </a:xfrm>
           <a:prstGeom prst="rect">
             <a:avLst/>
@@ -19198,15 +19198,15 @@
         <p:spPr>
           <a:xfrm>
             <a:off x="8538120" y="3877200"/>
-            <a:ext cx="963000" cy="1358640"/>
+            <a:ext cx="962640" cy="1358280"/>
           </a:xfrm>
           <a:custGeom>
             <a:avLst/>
             <a:gdLst>
-              <a:gd name="textAreaLeft" fmla="*/ 0 w 963000"/>
-              <a:gd name="textAreaRight" fmla="*/ 975960 w 963000"/>
-              <a:gd name="textAreaTop" fmla="*/ 0 h 1358640"/>
-              <a:gd name="textAreaBottom" fmla="*/ 1371600 h 1358640"/>
+              <a:gd name="textAreaLeft" fmla="*/ 0 w 962640"/>
+              <a:gd name="textAreaRight" fmla="*/ 975960 w 962640"/>
+              <a:gd name="textAreaTop" fmla="*/ 0 h 1358280"/>
+              <a:gd name="textAreaBottom" fmla="*/ 1371600 h 1358280"/>
             </a:gdLst>
             <a:ahLst/>
             <a:rect l="textAreaLeft" t="textAreaTop" r="textAreaRight" b="textAreaBottom"/>
@@ -19281,7 +19281,7 @@
         <p:spPr>
           <a:xfrm>
             <a:off x="7372080" y="4974480"/>
-            <a:ext cx="1671840" cy="1632960"/>
+            <a:ext cx="1671480" cy="1632600"/>
           </a:xfrm>
           <a:prstGeom prst="ellipse">
             <a:avLst/>
@@ -19330,7 +19330,7 @@
         <p:spPr>
           <a:xfrm>
             <a:off x="7868160" y="-329040"/>
-            <a:ext cx="1998720" cy="1998720"/>
+            <a:ext cx="1998360" cy="1998360"/>
           </a:xfrm>
           <a:prstGeom prst="ellipse">
             <a:avLst/>
@@ -19379,7 +19379,7 @@
         <p:spPr>
           <a:xfrm>
             <a:off x="2982960" y="3757320"/>
-            <a:ext cx="1031760" cy="289800"/>
+            <a:ext cx="1031400" cy="289440"/>
           </a:xfrm>
           <a:prstGeom prst="rect">
             <a:avLst/>
@@ -19459,7 +19459,7 @@
         <p:spPr>
           <a:xfrm>
             <a:off x="8266320" y="4115520"/>
-            <a:ext cx="1907280" cy="1907280"/>
+            <a:ext cx="1906920" cy="1906920"/>
           </a:xfrm>
           <a:prstGeom prst="ellipse">
             <a:avLst/>
@@ -19508,7 +19508,7 @@
         <p:spPr>
           <a:xfrm>
             <a:off x="7717680" y="-548280"/>
-            <a:ext cx="1907280" cy="1907280"/>
+            <a:ext cx="1906920" cy="1906920"/>
           </a:xfrm>
           <a:prstGeom prst="ellipse">
             <a:avLst/>
@@ -19556,10 +19556,10 @@
         </p:nvGrpSpPr>
         <p:grpSpPr>
           <a:xfrm>
-            <a:off x="-134640" y="-283320"/>
-            <a:ext cx="889920" cy="1255320"/>
-            <a:chOff x="-134640" y="-283320"/>
-            <a:chExt cx="889920" cy="1255320"/>
+            <a:off x="-134280" y="-282960"/>
+            <a:ext cx="889200" cy="1254600"/>
+            <a:chOff x="-134280" y="-282960"/>
+            <a:chExt cx="889200" cy="1254600"/>
           </a:xfrm>
         </p:grpSpPr>
         <p:sp>
@@ -19570,8 +19570,8 @@
           </p:nvSpPr>
           <p:spPr>
             <a:xfrm flipV="1" rot="5395800">
-              <a:off x="219240" y="801000"/>
-              <a:ext cx="169920" cy="169920"/>
+              <a:off x="219240" y="801360"/>
+              <a:ext cx="169560" cy="169560"/>
             </a:xfrm>
             <a:prstGeom prst="ellipse">
               <a:avLst/>
@@ -19579,7 +19579,7 @@
             <a:blipFill rotWithShape="0">
               <a:blip r:embed="rId2"/>
               <a:srcRect/>
-              <a:tile tx="0" ty="0" sx="62056" sy="62056" algn="ctr"/>
+              <a:tile tx="0" ty="0" sx="61702" sy="61702" algn="ctr"/>
             </a:blipFill>
             <a:ln w="0">
               <a:noFill/>
@@ -19626,8 +19626,8 @@
           </p:nvSpPr>
           <p:spPr>
             <a:xfrm flipV="1" rot="5395800">
-              <a:off x="218880" y="435240"/>
-              <a:ext cx="169920" cy="169920"/>
+              <a:off x="218880" y="435600"/>
+              <a:ext cx="169560" cy="169560"/>
             </a:xfrm>
             <a:prstGeom prst="ellipse">
               <a:avLst/>
@@ -19635,7 +19635,7 @@
             <a:blipFill rotWithShape="0">
               <a:blip r:embed="rId3"/>
               <a:srcRect/>
-              <a:tile tx="0" ty="0" sx="62056" sy="62056" algn="ctr"/>
+              <a:tile tx="0" ty="0" sx="61702" sy="61702" algn="ctr"/>
             </a:blipFill>
             <a:ln w="0">
               <a:noFill/>
@@ -19682,8 +19682,8 @@
           </p:nvSpPr>
           <p:spPr>
             <a:xfrm flipV="1" rot="5395800">
-              <a:off x="218520" y="69840"/>
-              <a:ext cx="169920" cy="169920"/>
+              <a:off x="218520" y="70200"/>
+              <a:ext cx="169560" cy="169560"/>
             </a:xfrm>
             <a:prstGeom prst="ellipse">
               <a:avLst/>
@@ -19691,7 +19691,7 @@
             <a:blipFill rotWithShape="0">
               <a:blip r:embed="rId4"/>
               <a:srcRect/>
-              <a:tile tx="0" ty="0" sx="62056" sy="62056" algn="ctr"/>
+              <a:tile tx="0" ty="0" sx="61702" sy="61702" algn="ctr"/>
             </a:blipFill>
             <a:ln w="0">
               <a:noFill/>
@@ -19738,8 +19738,8 @@
           </p:nvSpPr>
           <p:spPr>
             <a:xfrm flipV="1" rot="5395800">
-              <a:off x="217800" y="-282960"/>
-              <a:ext cx="169920" cy="169920"/>
+              <a:off x="217800" y="-282240"/>
+              <a:ext cx="169560" cy="169560"/>
             </a:xfrm>
             <a:prstGeom prst="ellipse">
               <a:avLst/>
@@ -19747,7 +19747,7 @@
             <a:blipFill rotWithShape="0">
               <a:blip r:embed="rId5"/>
               <a:srcRect/>
-              <a:tile tx="0" ty="0" sx="62056" sy="62056" algn="ctr"/>
+              <a:tile tx="0" ty="0" sx="61702" sy="61702" algn="ctr"/>
             </a:blipFill>
             <a:ln w="0">
               <a:noFill/>
@@ -19794,8 +19794,8 @@
           </p:nvSpPr>
           <p:spPr>
             <a:xfrm flipV="1" rot="5395800">
-              <a:off x="583920" y="-283320"/>
-              <a:ext cx="169920" cy="169920"/>
+              <a:off x="583920" y="-282600"/>
+              <a:ext cx="169560" cy="169560"/>
             </a:xfrm>
             <a:prstGeom prst="ellipse">
               <a:avLst/>
@@ -19803,7 +19803,7 @@
             <a:blipFill rotWithShape="0">
               <a:blip r:embed="rId6"/>
               <a:srcRect/>
-              <a:tile tx="0" ty="0" sx="62056" sy="62056" algn="ctr"/>
+              <a:tile tx="0" ty="0" sx="61702" sy="61702" algn="ctr"/>
             </a:blipFill>
             <a:ln w="0">
               <a:noFill/>
@@ -19850,8 +19850,8 @@
           </p:nvSpPr>
           <p:spPr>
             <a:xfrm flipV="1" rot="5395800">
-              <a:off x="584280" y="69120"/>
-              <a:ext cx="169920" cy="169920"/>
+              <a:off x="584280" y="69480"/>
+              <a:ext cx="169560" cy="169560"/>
             </a:xfrm>
             <a:prstGeom prst="ellipse">
               <a:avLst/>
@@ -19859,7 +19859,7 @@
             <a:blipFill rotWithShape="0">
               <a:blip r:embed="rId7"/>
               <a:srcRect/>
-              <a:tile tx="0" ty="0" sx="62056" sy="62056" algn="ctr"/>
+              <a:tile tx="0" ty="0" sx="61702" sy="61702" algn="ctr"/>
             </a:blipFill>
             <a:ln w="0">
               <a:noFill/>
@@ -19906,8 +19906,8 @@
           </p:nvSpPr>
           <p:spPr>
             <a:xfrm flipV="1" rot="5395800">
-              <a:off x="584280" y="434880"/>
-              <a:ext cx="169920" cy="169920"/>
+              <a:off x="584280" y="435240"/>
+              <a:ext cx="169560" cy="169560"/>
             </a:xfrm>
             <a:prstGeom prst="ellipse">
               <a:avLst/>
@@ -19915,7 +19915,7 @@
             <a:blipFill rotWithShape="0">
               <a:blip r:embed="rId8"/>
               <a:srcRect/>
-              <a:tile tx="0" ty="0" sx="62056" sy="62056" algn="ctr"/>
+              <a:tile tx="0" ty="0" sx="61702" sy="61702" algn="ctr"/>
             </a:blipFill>
             <a:ln w="0">
               <a:noFill/>
@@ -19962,8 +19962,8 @@
           </p:nvSpPr>
           <p:spPr>
             <a:xfrm flipV="1" rot="5395800">
-              <a:off x="585000" y="801000"/>
-              <a:ext cx="169920" cy="169920"/>
+              <a:off x="585000" y="801360"/>
+              <a:ext cx="169560" cy="169560"/>
             </a:xfrm>
             <a:prstGeom prst="ellipse">
               <a:avLst/>
@@ -19971,7 +19971,7 @@
             <a:blipFill rotWithShape="0">
               <a:blip r:embed="rId9"/>
               <a:srcRect/>
-              <a:tile tx="0" ty="0" sx="62056" sy="62056" algn="ctr"/>
+              <a:tile tx="0" ty="0" sx="61702" sy="61702" algn="ctr"/>
             </a:blipFill>
             <a:ln w="0">
               <a:noFill/>
@@ -20018,8 +20018,8 @@
           </p:nvSpPr>
           <p:spPr>
             <a:xfrm flipV="1" rot="5395800">
-              <a:off x="-133200" y="801360"/>
-              <a:ext cx="169920" cy="169920"/>
+              <a:off x="-132840" y="801720"/>
+              <a:ext cx="169560" cy="169560"/>
             </a:xfrm>
             <a:prstGeom prst="ellipse">
               <a:avLst/>
@@ -20027,7 +20027,7 @@
             <a:blipFill rotWithShape="0">
               <a:blip r:embed="rId10"/>
               <a:srcRect/>
-              <a:tile tx="0" ty="0" sx="62056" sy="62056" algn="ctr"/>
+              <a:tile tx="0" ty="0" sx="61702" sy="61702" algn="ctr"/>
             </a:blipFill>
             <a:ln w="0">
               <a:noFill/>
@@ -20074,8 +20074,8 @@
           </p:nvSpPr>
           <p:spPr>
             <a:xfrm flipV="1" rot="5395800">
-              <a:off x="-133920" y="435960"/>
-              <a:ext cx="169920" cy="169920"/>
+              <a:off x="-133560" y="436320"/>
+              <a:ext cx="169560" cy="169560"/>
             </a:xfrm>
             <a:prstGeom prst="ellipse">
               <a:avLst/>
@@ -20083,7 +20083,7 @@
             <a:blipFill rotWithShape="0">
               <a:blip r:embed="rId11"/>
               <a:srcRect/>
-              <a:tile tx="0" ty="0" sx="62056" sy="62056" algn="ctr"/>
+              <a:tile tx="0" ty="0" sx="61702" sy="61702" algn="ctr"/>
             </a:blipFill>
             <a:ln w="0">
               <a:noFill/>
@@ -20130,8 +20130,8 @@
           </p:nvSpPr>
           <p:spPr>
             <a:xfrm flipV="1" rot="5395800">
-              <a:off x="-133920" y="69840"/>
-              <a:ext cx="169920" cy="169920"/>
+              <a:off x="-133560" y="70200"/>
+              <a:ext cx="169560" cy="169560"/>
             </a:xfrm>
             <a:prstGeom prst="ellipse">
               <a:avLst/>
@@ -20139,7 +20139,7 @@
             <a:blipFill rotWithShape="0">
               <a:blip r:embed="rId12"/>
               <a:srcRect/>
-              <a:tile tx="0" ty="0" sx="62056" sy="62056" algn="ctr"/>
+              <a:tile tx="0" ty="0" sx="61702" sy="61702" algn="ctr"/>
             </a:blipFill>
             <a:ln w="0">
               <a:noFill/>
@@ -20186,8 +20186,8 @@
           </p:nvSpPr>
           <p:spPr>
             <a:xfrm flipV="1" rot="5395800">
-              <a:off x="-134280" y="-282600"/>
-              <a:ext cx="169920" cy="169920"/>
+              <a:off x="-133920" y="-281880"/>
+              <a:ext cx="169560" cy="169560"/>
             </a:xfrm>
             <a:prstGeom prst="ellipse">
               <a:avLst/>
@@ -20195,7 +20195,7 @@
             <a:blipFill rotWithShape="0">
               <a:blip r:embed="rId13"/>
               <a:srcRect/>
-              <a:tile tx="0" ty="0" sx="62056" sy="62056" algn="ctr"/>
+              <a:tile tx="0" ty="0" sx="61702" sy="61702" algn="ctr"/>
             </a:blipFill>
             <a:ln w="0">
               <a:noFill/>
@@ -20244,9 +20244,9 @@
         <p:grpSpPr>
           <a:xfrm>
             <a:off x="9545040" y="4645800"/>
-            <a:ext cx="902880" cy="1268280"/>
+            <a:ext cx="902520" cy="1267920"/>
             <a:chOff x="9545040" y="4645800"/>
-            <a:chExt cx="902880" cy="1268280"/>
+            <a:chExt cx="902520" cy="1267920"/>
           </a:xfrm>
         </p:grpSpPr>
         <p:sp>
@@ -20257,8 +20257,8 @@
           </p:nvSpPr>
           <p:spPr>
             <a:xfrm flipV="1" rot="5395800">
-              <a:off x="9911880" y="5743080"/>
-              <a:ext cx="169920" cy="169920"/>
+              <a:off x="9911880" y="5743440"/>
+              <a:ext cx="169560" cy="169560"/>
             </a:xfrm>
             <a:prstGeom prst="ellipse">
               <a:avLst/>
@@ -20266,7 +20266,7 @@
             <a:blipFill rotWithShape="0">
               <a:blip r:embed="rId14"/>
               <a:srcRect/>
-              <a:tile tx="0" ty="0" sx="62056" sy="62056" algn="ctr"/>
+              <a:tile tx="0" ty="0" sx="61702" sy="61702" algn="ctr"/>
             </a:blipFill>
             <a:ln w="0">
               <a:noFill/>
@@ -20313,8 +20313,8 @@
           </p:nvSpPr>
           <p:spPr>
             <a:xfrm flipV="1" rot="5395800">
-              <a:off x="9911520" y="5377320"/>
-              <a:ext cx="169920" cy="169920"/>
+              <a:off x="9911520" y="5377680"/>
+              <a:ext cx="169560" cy="169560"/>
             </a:xfrm>
             <a:prstGeom prst="ellipse">
               <a:avLst/>
@@ -20322,7 +20322,7 @@
             <a:blipFill rotWithShape="0">
               <a:blip r:embed="rId15"/>
               <a:srcRect/>
-              <a:tile tx="0" ty="0" sx="62056" sy="62056" algn="ctr"/>
+              <a:tile tx="0" ty="0" sx="61702" sy="61702" algn="ctr"/>
             </a:blipFill>
             <a:ln w="0">
               <a:noFill/>
@@ -20369,8 +20369,8 @@
           </p:nvSpPr>
           <p:spPr>
             <a:xfrm flipV="1" rot="5395800">
-              <a:off x="9911160" y="5011920"/>
-              <a:ext cx="169920" cy="169920"/>
+              <a:off x="9911160" y="5012280"/>
+              <a:ext cx="169560" cy="169560"/>
             </a:xfrm>
             <a:prstGeom prst="ellipse">
               <a:avLst/>
@@ -20378,7 +20378,7 @@
             <a:blipFill rotWithShape="0">
               <a:blip r:embed="rId16"/>
               <a:srcRect/>
-              <a:tile tx="0" ty="0" sx="62056" sy="62056" algn="ctr"/>
+              <a:tile tx="0" ty="0" sx="61702" sy="61702" algn="ctr"/>
             </a:blipFill>
             <a:ln w="0">
               <a:noFill/>
@@ -20425,8 +20425,8 @@
           </p:nvSpPr>
           <p:spPr>
             <a:xfrm flipV="1" rot="5395800">
-              <a:off x="9910440" y="4645800"/>
-              <a:ext cx="169920" cy="169920"/>
+              <a:off x="9910440" y="4646160"/>
+              <a:ext cx="169560" cy="169560"/>
             </a:xfrm>
             <a:prstGeom prst="ellipse">
               <a:avLst/>
@@ -20434,7 +20434,7 @@
             <a:blipFill rotWithShape="0">
               <a:blip r:embed="rId17"/>
               <a:srcRect/>
-              <a:tile tx="0" ty="0" sx="62056" sy="62056" algn="ctr"/>
+              <a:tile tx="0" ty="0" sx="61702" sy="61702" algn="ctr"/>
             </a:blipFill>
             <a:ln w="0">
               <a:noFill/>
@@ -20481,8 +20481,8 @@
           </p:nvSpPr>
           <p:spPr>
             <a:xfrm flipV="1" rot="5395800">
-              <a:off x="10276560" y="4645440"/>
-              <a:ext cx="169920" cy="169920"/>
+              <a:off x="10276560" y="4645800"/>
+              <a:ext cx="169560" cy="169560"/>
             </a:xfrm>
             <a:prstGeom prst="ellipse">
               <a:avLst/>
@@ -20490,7 +20490,7 @@
             <a:blipFill rotWithShape="0">
               <a:blip r:embed="rId18"/>
               <a:srcRect/>
-              <a:tile tx="0" ty="0" sx="62056" sy="62056" algn="ctr"/>
+              <a:tile tx="0" ty="0" sx="61702" sy="61702" algn="ctr"/>
             </a:blipFill>
             <a:ln w="0">
               <a:noFill/>
@@ -20537,8 +20537,8 @@
           </p:nvSpPr>
           <p:spPr>
             <a:xfrm flipV="1" rot="5395800">
-              <a:off x="10276920" y="5011200"/>
-              <a:ext cx="169920" cy="169920"/>
+              <a:off x="10276920" y="5011560"/>
+              <a:ext cx="169560" cy="169560"/>
             </a:xfrm>
             <a:prstGeom prst="ellipse">
               <a:avLst/>
@@ -20546,7 +20546,7 @@
             <a:blipFill rotWithShape="0">
               <a:blip r:embed="rId19"/>
               <a:srcRect/>
-              <a:tile tx="0" ty="0" sx="62056" sy="62056" algn="ctr"/>
+              <a:tile tx="0" ty="0" sx="61702" sy="61702" algn="ctr"/>
             </a:blipFill>
             <a:ln w="0">
               <a:noFill/>
@@ -20593,8 +20593,8 @@
           </p:nvSpPr>
           <p:spPr>
             <a:xfrm flipV="1" rot="5395800">
-              <a:off x="10276920" y="5376960"/>
-              <a:ext cx="169920" cy="169920"/>
+              <a:off x="10276920" y="5377320"/>
+              <a:ext cx="169560" cy="169560"/>
             </a:xfrm>
             <a:prstGeom prst="ellipse">
               <a:avLst/>
@@ -20602,7 +20602,7 @@
             <a:blipFill rotWithShape="0">
               <a:blip r:embed="rId20"/>
               <a:srcRect/>
-              <a:tile tx="0" ty="0" sx="62056" sy="62056" algn="ctr"/>
+              <a:tile tx="0" ty="0" sx="61702" sy="61702" algn="ctr"/>
             </a:blipFill>
             <a:ln w="0">
               <a:noFill/>
@@ -20649,8 +20649,8 @@
           </p:nvSpPr>
           <p:spPr>
             <a:xfrm flipV="1" rot="5395800">
-              <a:off x="10277640" y="5743080"/>
-              <a:ext cx="169920" cy="169920"/>
+              <a:off x="10277640" y="5743440"/>
+              <a:ext cx="169560" cy="169560"/>
             </a:xfrm>
             <a:prstGeom prst="ellipse">
               <a:avLst/>
@@ -20658,7 +20658,7 @@
             <a:blipFill rotWithShape="0">
               <a:blip r:embed="rId21"/>
               <a:srcRect/>
-              <a:tile tx="0" ty="0" sx="62056" sy="62056" algn="ctr"/>
+              <a:tile tx="0" ty="0" sx="61702" sy="61702" algn="ctr"/>
             </a:blipFill>
             <a:ln w="0">
               <a:noFill/>
@@ -20705,8 +20705,8 @@
           </p:nvSpPr>
           <p:spPr>
             <a:xfrm flipV="1" rot="5395800">
-              <a:off x="9546120" y="5743440"/>
-              <a:ext cx="169920" cy="169920"/>
+              <a:off x="9546120" y="5743800"/>
+              <a:ext cx="169560" cy="169560"/>
             </a:xfrm>
             <a:prstGeom prst="ellipse">
               <a:avLst/>
@@ -20714,7 +20714,7 @@
             <a:blipFill rotWithShape="0">
               <a:blip r:embed="rId22"/>
               <a:srcRect/>
-              <a:tile tx="0" ty="0" sx="62056" sy="62056" algn="ctr"/>
+              <a:tile tx="0" ty="0" sx="61702" sy="61702" algn="ctr"/>
             </a:blipFill>
             <a:ln w="0">
               <a:noFill/>
@@ -20761,8 +20761,8 @@
           </p:nvSpPr>
           <p:spPr>
             <a:xfrm flipV="1" rot="5395800">
-              <a:off x="9545400" y="5378040"/>
-              <a:ext cx="169920" cy="169920"/>
+              <a:off x="9545400" y="5378400"/>
+              <a:ext cx="169560" cy="169560"/>
             </a:xfrm>
             <a:prstGeom prst="ellipse">
               <a:avLst/>
@@ -20770,7 +20770,7 @@
             <a:blipFill rotWithShape="0">
               <a:blip r:embed="rId23"/>
               <a:srcRect/>
-              <a:tile tx="0" ty="0" sx="62056" sy="62056" algn="ctr"/>
+              <a:tile tx="0" ty="0" sx="61702" sy="61702" algn="ctr"/>
             </a:blipFill>
             <a:ln w="0">
               <a:noFill/>
@@ -20817,8 +20817,8 @@
           </p:nvSpPr>
           <p:spPr>
             <a:xfrm flipV="1" rot="5395800">
-              <a:off x="9545400" y="5011920"/>
-              <a:ext cx="169920" cy="169920"/>
+              <a:off x="9545400" y="5012280"/>
+              <a:ext cx="169560" cy="169560"/>
             </a:xfrm>
             <a:prstGeom prst="ellipse">
               <a:avLst/>
@@ -20826,7 +20826,7 @@
             <a:blipFill rotWithShape="0">
               <a:blip r:embed="rId24"/>
               <a:srcRect/>
-              <a:tile tx="0" ty="0" sx="62056" sy="62056" algn="ctr"/>
+              <a:tile tx="0" ty="0" sx="61702" sy="61702" algn="ctr"/>
             </a:blipFill>
             <a:ln w="0">
               <a:noFill/>
@@ -20873,8 +20873,8 @@
           </p:nvSpPr>
           <p:spPr>
             <a:xfrm flipV="1" rot="5395800">
-              <a:off x="9545040" y="4646160"/>
-              <a:ext cx="169920" cy="169920"/>
+              <a:off x="9545040" y="4646520"/>
+              <a:ext cx="169560" cy="169560"/>
             </a:xfrm>
             <a:prstGeom prst="ellipse">
               <a:avLst/>
@@ -20882,7 +20882,7 @@
             <a:blipFill rotWithShape="0">
               <a:blip r:embed="rId25"/>
               <a:srcRect/>
-              <a:tile tx="0" ty="0" sx="62056" sy="62056" algn="ctr"/>
+              <a:tile tx="0" ty="0" sx="61702" sy="61702" algn="ctr"/>
             </a:blipFill>
             <a:ln w="0">
               <a:noFill/>
@@ -20931,7 +20931,7 @@
         <p:spPr>
           <a:xfrm>
             <a:off x="-146160" y="3109320"/>
-            <a:ext cx="1907280" cy="1907280"/>
+            <a:ext cx="1906920" cy="1906920"/>
           </a:xfrm>
           <a:prstGeom prst="ellipse">
             <a:avLst/>
@@ -21005,8 +21005,8 @@
         </p:nvSpPr>
         <p:spPr>
           <a:xfrm rot="18876000">
-            <a:off x="8636760" y="-392760"/>
-            <a:ext cx="2882520" cy="2882520"/>
+            <a:off x="8636400" y="-392400"/>
+            <a:ext cx="2882160" cy="2882160"/>
           </a:xfrm>
           <a:prstGeom prst="rect">
             <a:avLst/>
@@ -21052,8 +21052,8 @@
         </p:nvSpPr>
         <p:spPr>
           <a:xfrm rot="18876000">
-            <a:off x="8656920" y="3983040"/>
-            <a:ext cx="2882520" cy="2882520"/>
+            <a:off x="8656560" y="3983040"/>
+            <a:ext cx="2882160" cy="2882160"/>
           </a:xfrm>
           <a:prstGeom prst="rect">
             <a:avLst/>
@@ -21099,8 +21099,8 @@
         </p:nvSpPr>
         <p:spPr>
           <a:xfrm rot="18964800">
-            <a:off x="984960" y="5915520"/>
-            <a:ext cx="2575800" cy="718560"/>
+            <a:off x="984600" y="5915520"/>
+            <a:ext cx="2575440" cy="718200"/>
           </a:xfrm>
           <a:prstGeom prst="rect">
             <a:avLst/>
@@ -21149,7 +21149,7 @@
         <p:spPr>
           <a:xfrm rot="18964800">
             <a:off x="-1293120" y="5513400"/>
-            <a:ext cx="2575800" cy="718560"/>
+            <a:ext cx="2575440" cy="718200"/>
           </a:xfrm>
           <a:prstGeom prst="rect">
             <a:avLst/>
@@ -21197,8 +21197,8 @@
         </p:nvSpPr>
         <p:spPr>
           <a:xfrm rot="18964800">
-            <a:off x="3673080" y="339120"/>
-            <a:ext cx="3444840" cy="909360"/>
+            <a:off x="3672720" y="339120"/>
+            <a:ext cx="3444480" cy="909000"/>
           </a:xfrm>
           <a:prstGeom prst="rect">
             <a:avLst/>
@@ -21246,8 +21246,8 @@
         </p:nvSpPr>
         <p:spPr>
           <a:xfrm rot="18964800">
-            <a:off x="1436760" y="-745920"/>
-            <a:ext cx="2575800" cy="718560"/>
+            <a:off x="1436400" y="-745560"/>
+            <a:ext cx="2575440" cy="718200"/>
           </a:xfrm>
           <a:prstGeom prst="rect">
             <a:avLst/>
@@ -21296,7 +21296,7 @@
         <p:spPr>
           <a:xfrm rot="18964800">
             <a:off x="-723240" y="3294720"/>
-            <a:ext cx="2575800" cy="500040"/>
+            <a:ext cx="2575440" cy="499680"/>
           </a:xfrm>
           <a:prstGeom prst="rect">
             <a:avLst/>
@@ -21371,7 +21371,7 @@
         <p:spPr>
           <a:xfrm>
             <a:off x="820800" y="4140000"/>
-            <a:ext cx="6186240" cy="1427040"/>
+            <a:ext cx="6185880" cy="1426680"/>
           </a:xfrm>
           <a:prstGeom prst="rect">
             <a:avLst/>
@@ -21431,7 +21431,7 @@
         <p:spPr>
           <a:xfrm>
             <a:off x="7315200" y="4629240"/>
-            <a:ext cx="2364480" cy="481320"/>
+            <a:ext cx="2364120" cy="480960"/>
           </a:xfrm>
           <a:prstGeom prst="rect">
             <a:avLst/>
@@ -21580,7 +21580,7 @@
         <p:spPr>
           <a:xfrm>
             <a:off x="1044000" y="1095120"/>
-            <a:ext cx="8133480" cy="381960"/>
+            <a:ext cx="8133120" cy="381600"/>
           </a:xfrm>
           <a:prstGeom prst="rect">
             <a:avLst/>
@@ -21637,7 +21637,7 @@
         <p:spPr>
           <a:xfrm>
             <a:off x="1086120" y="1635120"/>
-            <a:ext cx="7721280" cy="3610080"/>
+            <a:ext cx="7720920" cy="3609720"/>
           </a:xfrm>
           <a:prstGeom prst="rect">
             <a:avLst/>
@@ -21657,6 +21657,67 @@
           <a:bodyPr lIns="90000" rIns="90000" tIns="45000" bIns="45000" anchor="t">
             <a:noAutofit/>
           </a:bodyPr>
+          <a:p>
+            <a:pPr lvl="1" marL="432000" indent="-216000">
+              <a:lnSpc>
+                <a:spcPct val="100000"/>
+              </a:lnSpc>
+              <a:spcBef>
+                <a:spcPts val="340"/>
+              </a:spcBef>
+              <a:spcAft>
+                <a:spcPts val="283"/>
+              </a:spcAft>
+              <a:buClr>
+                <a:srgbClr val="000000"/>
+              </a:buClr>
+              <a:buSzPct val="45000"/>
+              <a:buFont typeface="Wingdings" charset="2"/>
+              <a:buChar char=""/>
+            </a:pPr>
+            <a:r>
+              <a:rPr b="0" lang="fr-CH" sz="1800" spc="-1" strike="noStrike">
+                <a:solidFill>
+                  <a:srgbClr val="808080"/>
+                </a:solidFill>
+                <a:latin typeface="Noto Sans"/>
+                <a:ea typeface="DejaVu Sans"/>
+              </a:rPr>
+              <a:t>Une couche GlobalAveragePooling2D qui va réduire les dimensions spatiales à 1x1 en utilisant la moyenne de </a:t>
+            </a:r>
+            <a:br>
+              <a:rPr sz="1800"/>
+            </a:br>
+            <a:r>
+              <a:rPr b="0" lang="fr-CH" sz="1800" spc="-1" strike="noStrike">
+                <a:solidFill>
+                  <a:srgbClr val="808080"/>
+                </a:solidFill>
+                <a:latin typeface="Noto Sans"/>
+                <a:ea typeface="DejaVu Sans"/>
+              </a:rPr>
+              <a:t>chaque canal.  Cette couche a un rôle similaire à une</a:t>
+            </a:r>
+            <a:br>
+              <a:rPr sz="1800"/>
+            </a:br>
+            <a:r>
+              <a:rPr b="0" lang="fr-CH" sz="1800" spc="-1" strike="noStrike">
+                <a:solidFill>
+                  <a:srgbClr val="808080"/>
+                </a:solidFill>
+                <a:latin typeface="Noto Sans"/>
+                <a:ea typeface="DejaVu Sans"/>
+              </a:rPr>
+              <a:t>couche de type Flatten.</a:t>
+            </a:r>
+            <a:endParaRPr b="0" lang="fr-CH" sz="1800" spc="-1" strike="noStrike">
+              <a:solidFill>
+                <a:srgbClr val="000000"/>
+              </a:solidFill>
+              <a:latin typeface="Arial"/>
+            </a:endParaRPr>
+          </a:p>
           <a:p>
             <a:pPr lvl="1" marL="432000" indent="-216000">
               <a:lnSpc>
@@ -21798,7 +21859,20 @@
                 <a:latin typeface="Noto Sans"/>
                 <a:ea typeface="DejaVu Sans"/>
               </a:rPr>
-              <a:t>. Elle va permettre d’obtenir une probabilité de l’image d’appartenir à chaque classe, ici les races de chiens.</a:t>
+              <a:t>. Elle va permettre d’obtenir une probabilité de l’image d’appartenir à </a:t>
+            </a:r>
+            <a:br>
+              <a:rPr sz="1800"/>
+            </a:br>
+            <a:r>
+              <a:rPr b="0" lang="fr-CH" sz="1800" spc="-1" strike="noStrike">
+                <a:solidFill>
+                  <a:srgbClr val="808080"/>
+                </a:solidFill>
+                <a:latin typeface="Noto Sans"/>
+                <a:ea typeface="DejaVu Sans"/>
+              </a:rPr>
+              <a:t>chaque classe, ici les races de chiens.</a:t>
             </a:r>
             <a:endParaRPr b="0" lang="fr-CH" sz="1800" spc="-1" strike="noStrike">
               <a:solidFill>
@@ -21848,7 +21922,7 @@
         <p:spPr>
           <a:xfrm>
             <a:off x="1044000" y="1095120"/>
-            <a:ext cx="8133480" cy="381960"/>
+            <a:ext cx="8133120" cy="381600"/>
           </a:xfrm>
           <a:prstGeom prst="rect">
             <a:avLst/>
@@ -21905,7 +21979,7 @@
         <p:spPr>
           <a:xfrm>
             <a:off x="1014120" y="1491120"/>
-            <a:ext cx="7721280" cy="3610080"/>
+            <a:ext cx="7720920" cy="3609720"/>
           </a:xfrm>
           <a:prstGeom prst="rect">
             <a:avLst/>
@@ -22266,7 +22340,7 @@
         <p:spPr>
           <a:xfrm>
             <a:off x="1044000" y="1095120"/>
-            <a:ext cx="8133480" cy="381960"/>
+            <a:ext cx="8133120" cy="381600"/>
           </a:xfrm>
           <a:prstGeom prst="rect">
             <a:avLst/>
@@ -22323,7 +22397,7 @@
         <p:spPr>
           <a:xfrm>
             <a:off x="1086120" y="1635120"/>
-            <a:ext cx="7721280" cy="3610080"/>
+            <a:ext cx="7720920" cy="3944880"/>
           </a:xfrm>
           <a:prstGeom prst="rect">
             <a:avLst/>
@@ -22348,12 +22422,6 @@
               <a:lnSpc>
                 <a:spcPct val="100000"/>
               </a:lnSpc>
-              <a:spcBef>
-                <a:spcPts val="340"/>
-              </a:spcBef>
-              <a:spcAft>
-                <a:spcPts val="283"/>
-              </a:spcAft>
               <a:buClr>
                 <a:srgbClr val="000000"/>
               </a:buClr>
@@ -22376,6 +22444,7 @@
                 <a:srgbClr val="000000"/>
               </a:solidFill>
               <a:latin typeface="Arial"/>
+              <a:ea typeface="Noto Sans CJK SC"/>
             </a:endParaRPr>
           </a:p>
           <a:p>
@@ -22383,12 +22452,6 @@
               <a:lnSpc>
                 <a:spcPct val="100000"/>
               </a:lnSpc>
-              <a:spcBef>
-                <a:spcPts val="340"/>
-              </a:spcBef>
-              <a:spcAft>
-                <a:spcPts val="283"/>
-              </a:spcAft>
               <a:buClr>
                 <a:srgbClr val="000000"/>
               </a:buClr>
@@ -22411,6 +22474,7 @@
                 <a:srgbClr val="000000"/>
               </a:solidFill>
               <a:latin typeface="Arial"/>
+              <a:ea typeface="Noto Sans CJK SC"/>
             </a:endParaRPr>
           </a:p>
           <a:p>
@@ -22418,12 +22482,6 @@
               <a:lnSpc>
                 <a:spcPct val="100000"/>
               </a:lnSpc>
-              <a:spcBef>
-                <a:spcPts val="340"/>
-              </a:spcBef>
-              <a:spcAft>
-                <a:spcPts val="283"/>
-              </a:spcAft>
               <a:buClr>
                 <a:srgbClr val="000000"/>
               </a:buClr>
@@ -22446,6 +22504,7 @@
                 <a:srgbClr val="000000"/>
               </a:solidFill>
               <a:latin typeface="Arial"/>
+              <a:ea typeface="Noto Sans CJK SC"/>
             </a:endParaRPr>
           </a:p>
           <a:p>
@@ -22453,12 +22512,6 @@
               <a:lnSpc>
                 <a:spcPct val="100000"/>
               </a:lnSpc>
-              <a:spcBef>
-                <a:spcPts val="340"/>
-              </a:spcBef>
-              <a:spcAft>
-                <a:spcPts val="283"/>
-              </a:spcAft>
               <a:buClr>
                 <a:srgbClr val="000000"/>
               </a:buClr>
@@ -22481,6 +22534,7 @@
                 <a:srgbClr val="000000"/>
               </a:solidFill>
               <a:latin typeface="Arial"/>
+              <a:ea typeface="Noto Sans CJK SC"/>
             </a:endParaRPr>
           </a:p>
           <a:p>
@@ -22488,12 +22542,6 @@
               <a:lnSpc>
                 <a:spcPct val="100000"/>
               </a:lnSpc>
-              <a:spcBef>
-                <a:spcPts val="340"/>
-              </a:spcBef>
-              <a:spcAft>
-                <a:spcPts val="283"/>
-              </a:spcAft>
               <a:buClr>
                 <a:srgbClr val="000000"/>
               </a:buClr>
@@ -22516,6 +22564,7 @@
                 <a:srgbClr val="000000"/>
               </a:solidFill>
               <a:latin typeface="Arial"/>
+              <a:ea typeface="Noto Sans CJK SC"/>
             </a:endParaRPr>
           </a:p>
           <a:p>
@@ -22523,12 +22572,6 @@
               <a:lnSpc>
                 <a:spcPct val="100000"/>
               </a:lnSpc>
-              <a:spcBef>
-                <a:spcPts val="340"/>
-              </a:spcBef>
-              <a:spcAft>
-                <a:spcPts val="283"/>
-              </a:spcAft>
               <a:buClr>
                 <a:srgbClr val="000000"/>
               </a:buClr>
@@ -22555,7 +22598,6 @@
                   <a:srgbClr val="808080"/>
                 </a:solidFill>
                 <a:latin typeface="Noto Sans"/>
-                <a:ea typeface="DejaVu Sans"/>
               </a:rPr>
               <a:t> </a:t>
             </a:r>
@@ -22564,19 +22606,14 @@
                 <a:srgbClr val="000000"/>
               </a:solidFill>
               <a:latin typeface="Arial"/>
+              <a:ea typeface="Noto Sans CJK SC"/>
             </a:endParaRPr>
           </a:p>
           <a:p>
-            <a:pPr marL="216000" indent="-215640">
+            <a:pPr marL="216000" indent="-216000">
               <a:lnSpc>
                 <a:spcPct val="100000"/>
               </a:lnSpc>
-              <a:spcBef>
-                <a:spcPts val="340"/>
-              </a:spcBef>
-              <a:spcAft>
-                <a:spcPts val="283"/>
-              </a:spcAft>
               <a:buClr>
                 <a:srgbClr val="000000"/>
               </a:buClr>
@@ -22592,13 +22629,14 @@
                 <a:latin typeface="Noto Sans"/>
                 <a:ea typeface="DejaVu Sans"/>
               </a:rPr>
-              <a:t>Le meilleur hyperparamètre va être utilisé dans chaque future exécution. On finira donc avec les meilleurs paramètres.</a:t>
+              <a:t>Le meilleur hyperparamètre va être utilisé dans chaque future optimisation. On finira donc avec les meilleurs paramètres.</a:t>
             </a:r>
             <a:endParaRPr b="0" lang="fr-CH" sz="1800" spc="-1" strike="noStrike">
               <a:solidFill>
                 <a:srgbClr val="000000"/>
               </a:solidFill>
               <a:latin typeface="Arial"/>
+              <a:ea typeface="Noto Sans CJK SC"/>
             </a:endParaRPr>
           </a:p>
         </p:txBody>
@@ -22646,7 +22684,7 @@
         <p:spPr>
           <a:xfrm>
             <a:off x="1296000" y="864000"/>
-            <a:ext cx="3369960" cy="2303640"/>
+            <a:ext cx="3369600" cy="2303280"/>
           </a:xfrm>
           <a:prstGeom prst="rect">
             <a:avLst/>
@@ -22669,7 +22707,7 @@
         <p:spPr>
           <a:xfrm>
             <a:off x="5112000" y="828000"/>
-            <a:ext cx="3419640" cy="2266560"/>
+            <a:ext cx="3419280" cy="2266200"/>
           </a:xfrm>
           <a:prstGeom prst="rect">
             <a:avLst/>
@@ -22692,7 +22730,7 @@
         <p:spPr>
           <a:xfrm>
             <a:off x="1224000" y="3166200"/>
-            <a:ext cx="3527640" cy="2396160"/>
+            <a:ext cx="3527280" cy="2395800"/>
           </a:xfrm>
           <a:prstGeom prst="rect">
             <a:avLst/>
@@ -22715,7 +22753,7 @@
         <p:spPr>
           <a:xfrm>
             <a:off x="5040000" y="3168000"/>
-            <a:ext cx="3542760" cy="2346120"/>
+            <a:ext cx="3542400" cy="2345760"/>
           </a:xfrm>
           <a:prstGeom prst="rect">
             <a:avLst/>
@@ -22768,7 +22806,7 @@
         <p:spPr>
           <a:xfrm>
             <a:off x="1080000" y="792000"/>
-            <a:ext cx="3489840" cy="2267640"/>
+            <a:ext cx="3489480" cy="2267280"/>
           </a:xfrm>
           <a:prstGeom prst="rect">
             <a:avLst/>
@@ -22791,7 +22829,7 @@
         <p:spPr>
           <a:xfrm>
             <a:off x="1008000" y="3164400"/>
-            <a:ext cx="3635640" cy="2361960"/>
+            <a:ext cx="3635280" cy="2361600"/>
           </a:xfrm>
           <a:prstGeom prst="rect">
             <a:avLst/>
@@ -22814,7 +22852,7 @@
         <p:spPr>
           <a:xfrm>
             <a:off x="5112000" y="721440"/>
-            <a:ext cx="3542760" cy="2454480"/>
+            <a:ext cx="3542400" cy="2454120"/>
           </a:xfrm>
           <a:prstGeom prst="rect">
             <a:avLst/>
@@ -22837,7 +22875,7 @@
         <p:spPr>
           <a:xfrm>
             <a:off x="5076000" y="3140280"/>
-            <a:ext cx="3599640" cy="2477520"/>
+            <a:ext cx="3599280" cy="2477160"/>
           </a:xfrm>
           <a:prstGeom prst="rect">
             <a:avLst/>
@@ -22890,7 +22928,7 @@
         <p:spPr>
           <a:xfrm>
             <a:off x="1008000" y="684000"/>
-            <a:ext cx="3658320" cy="2480040"/>
+            <a:ext cx="3657960" cy="2479680"/>
           </a:xfrm>
           <a:prstGeom prst="rect">
             <a:avLst/>
@@ -22913,7 +22951,7 @@
         <p:spPr>
           <a:xfrm>
             <a:off x="1008000" y="3132000"/>
-            <a:ext cx="3634200" cy="2447640"/>
+            <a:ext cx="3633840" cy="2447280"/>
           </a:xfrm>
           <a:prstGeom prst="rect">
             <a:avLst/>
@@ -22936,7 +22974,7 @@
         <p:spPr>
           <a:xfrm>
             <a:off x="5040000" y="684000"/>
-            <a:ext cx="3651120" cy="2339640"/>
+            <a:ext cx="3650760" cy="2339280"/>
           </a:xfrm>
           <a:prstGeom prst="rect">
             <a:avLst/>
@@ -22959,7 +22997,7 @@
         <p:spPr>
           <a:xfrm>
             <a:off x="5072760" y="3102840"/>
-            <a:ext cx="3638880" cy="2316600"/>
+            <a:ext cx="3638520" cy="2316240"/>
           </a:xfrm>
           <a:prstGeom prst="rect">
             <a:avLst/>
@@ -23008,7 +23046,7 @@
         <p:spPr>
           <a:xfrm>
             <a:off x="1044000" y="1095120"/>
-            <a:ext cx="8133480" cy="381960"/>
+            <a:ext cx="8133120" cy="381600"/>
           </a:xfrm>
           <a:prstGeom prst="rect">
             <a:avLst/>
@@ -23065,7 +23103,7 @@
         <p:spPr>
           <a:xfrm>
             <a:off x="1086120" y="1635120"/>
-            <a:ext cx="7721280" cy="3610080"/>
+            <a:ext cx="7720920" cy="3609720"/>
           </a:xfrm>
           <a:prstGeom prst="rect">
             <a:avLst/>
@@ -23266,7 +23304,7 @@
         <p:spPr>
           <a:xfrm>
             <a:off x="1044000" y="1095120"/>
-            <a:ext cx="8133480" cy="381960"/>
+            <a:ext cx="8133120" cy="381600"/>
           </a:xfrm>
           <a:prstGeom prst="rect">
             <a:avLst/>
@@ -23323,7 +23361,7 @@
         <p:spPr>
           <a:xfrm>
             <a:off x="1086120" y="1635120"/>
-            <a:ext cx="7721280" cy="3610080"/>
+            <a:ext cx="7720920" cy="3609720"/>
           </a:xfrm>
           <a:prstGeom prst="rect">
             <a:avLst/>
@@ -23629,7 +23667,7 @@
         <p:spPr>
           <a:xfrm>
             <a:off x="1044000" y="1095120"/>
-            <a:ext cx="7415640" cy="381960"/>
+            <a:ext cx="7415280" cy="381600"/>
           </a:xfrm>
           <a:prstGeom prst="rect">
             <a:avLst/>
@@ -23690,7 +23728,7 @@
         <p:spPr>
           <a:xfrm>
             <a:off x="1457280" y="1512000"/>
-            <a:ext cx="6584760" cy="3671640"/>
+            <a:ext cx="6584400" cy="3671280"/>
           </a:xfrm>
           <a:prstGeom prst="rect">
             <a:avLst/>
@@ -23739,7 +23777,7 @@
         <p:spPr>
           <a:xfrm>
             <a:off x="1044000" y="1095120"/>
-            <a:ext cx="7415640" cy="381960"/>
+            <a:ext cx="7415280" cy="381600"/>
           </a:xfrm>
           <a:prstGeom prst="rect">
             <a:avLst/>
@@ -23800,7 +23838,7 @@
         <p:spPr>
           <a:xfrm>
             <a:off x="1313280" y="1512000"/>
-            <a:ext cx="6822360" cy="3753360"/>
+            <a:ext cx="6822000" cy="3753000"/>
           </a:xfrm>
           <a:prstGeom prst="rect">
             <a:avLst/>
@@ -23849,7 +23887,7 @@
         <p:spPr>
           <a:xfrm>
             <a:off x="1121760" y="1748880"/>
-            <a:ext cx="6821280" cy="3108960"/>
+            <a:ext cx="6820920" cy="3108600"/>
           </a:xfrm>
           <a:prstGeom prst="rect">
             <a:avLst/>
@@ -24112,7 +24150,7 @@
         <p:spPr>
           <a:xfrm>
             <a:off x="1080000" y="1080000"/>
-            <a:ext cx="3852720" cy="381960"/>
+            <a:ext cx="3852360" cy="381600"/>
           </a:xfrm>
           <a:prstGeom prst="rect">
             <a:avLst/>
@@ -24196,7 +24234,7 @@
         <p:spPr>
           <a:xfrm>
             <a:off x="1044000" y="1095120"/>
-            <a:ext cx="7415640" cy="381960"/>
+            <a:ext cx="7415280" cy="381600"/>
           </a:xfrm>
           <a:prstGeom prst="rect">
             <a:avLst/>
@@ -24257,7 +24295,7 @@
         <p:spPr>
           <a:xfrm>
             <a:off x="1349280" y="1538640"/>
-            <a:ext cx="6756840" cy="3717000"/>
+            <a:ext cx="6756480" cy="3716640"/>
           </a:xfrm>
           <a:prstGeom prst="rect">
             <a:avLst/>
@@ -24306,7 +24344,7 @@
         <p:spPr>
           <a:xfrm>
             <a:off x="1080000" y="1080000"/>
-            <a:ext cx="8447400" cy="381960"/>
+            <a:ext cx="8447040" cy="381600"/>
           </a:xfrm>
           <a:prstGeom prst="rect">
             <a:avLst/>
@@ -24360,7 +24398,7 @@
         <p:spPr>
           <a:xfrm>
             <a:off x="1086120" y="1635120"/>
-            <a:ext cx="7721280" cy="3610080"/>
+            <a:ext cx="7720920" cy="3609720"/>
           </a:xfrm>
           <a:prstGeom prst="rect">
             <a:avLst/>
@@ -24398,14 +24436,14 @@
               <a:buChar char=""/>
             </a:pPr>
             <a:r>
-              <a:rPr b="0" lang="de-DE" sz="1800" spc="-1" strike="noStrike">
+              <a:rPr b="0" lang="fr-CH" sz="1800" spc="-1" strike="noStrike">
                 <a:solidFill>
                   <a:srgbClr val="808080"/>
                 </a:solidFill>
                 <a:latin typeface="Noto Sans"/>
                 <a:ea typeface="DejaVu Sans"/>
               </a:rPr>
-              <a:t>Un notebook va charger le set de données de Stanford et choisir 10 images aléatoirement.</a:t>
+              <a:t>Un notebook va charger le set de données de Stanford et choisir dix images aléatoirement.</a:t>
             </a:r>
             <a:endParaRPr b="0" lang="fr-CH" sz="1800" spc="-1" strike="noStrike">
               <a:solidFill>
@@ -24432,14 +24470,14 @@
               <a:buChar char=""/>
             </a:pPr>
             <a:r>
-              <a:rPr b="0" lang="de-DE" sz="1800" spc="-1" strike="noStrike">
+              <a:rPr b="0" lang="fr-CH" sz="1800" spc="-1" strike="noStrike">
                 <a:solidFill>
                   <a:srgbClr val="808080"/>
                 </a:solidFill>
                 <a:latin typeface="Noto Sans"/>
                 <a:ea typeface="DejaVu Sans"/>
               </a:rPr>
-              <a:t>Le meilleur modèle pré-entraîné va ensuite prédire quelle race de chien ces images contiennet pour comparaison.</a:t>
+              <a:t>Le meilleur modèle pré-entraîné va ensuite prédire quelle race de chien ces images contiennent pour comparaison.</a:t>
             </a:r>
             <a:endParaRPr b="0" lang="fr-CH" sz="1800" spc="-1" strike="noStrike">
               <a:solidFill>
@@ -24489,7 +24527,7 @@
         <p:spPr>
           <a:xfrm>
             <a:off x="1080000" y="1080000"/>
-            <a:ext cx="8447400" cy="381960"/>
+            <a:ext cx="8447040" cy="381600"/>
           </a:xfrm>
           <a:prstGeom prst="rect">
             <a:avLst/>
@@ -24573,7 +24611,7 @@
         <p:spPr>
           <a:xfrm>
             <a:off x="1080000" y="1080000"/>
-            <a:ext cx="4488840" cy="381960"/>
+            <a:ext cx="4488480" cy="381600"/>
           </a:xfrm>
           <a:prstGeom prst="rect">
             <a:avLst/>
@@ -24627,7 +24665,7 @@
         <p:spPr>
           <a:xfrm>
             <a:off x="1086120" y="1609560"/>
-            <a:ext cx="7721280" cy="3244680"/>
+            <a:ext cx="7720920" cy="3244320"/>
           </a:xfrm>
           <a:prstGeom prst="rect">
             <a:avLst/>
@@ -24828,7 +24866,7 @@
         <p:spPr>
           <a:xfrm>
             <a:off x="1044000" y="1095120"/>
-            <a:ext cx="8133480" cy="381960"/>
+            <a:ext cx="8133120" cy="381600"/>
           </a:xfrm>
           <a:prstGeom prst="rect">
             <a:avLst/>
@@ -24885,7 +24923,7 @@
         <p:spPr>
           <a:xfrm>
             <a:off x="1086120" y="1635120"/>
-            <a:ext cx="7721280" cy="3610080"/>
+            <a:ext cx="7720920" cy="3609720"/>
           </a:xfrm>
           <a:prstGeom prst="rect">
             <a:avLst/>
@@ -25150,7 +25188,7 @@
         <p:spPr>
           <a:xfrm>
             <a:off x="1044000" y="1095120"/>
-            <a:ext cx="8133480" cy="381960"/>
+            <a:ext cx="8133120" cy="381600"/>
           </a:xfrm>
           <a:prstGeom prst="rect">
             <a:avLst/>
@@ -25211,7 +25249,7 @@
         <p:spPr>
           <a:xfrm>
             <a:off x="377280" y="1821600"/>
-            <a:ext cx="5922360" cy="3253680"/>
+            <a:ext cx="5922000" cy="3253320"/>
           </a:xfrm>
           <a:prstGeom prst="rect">
             <a:avLst/>
@@ -25234,7 +25272,7 @@
         <p:spPr>
           <a:xfrm>
             <a:off x="6480000" y="2570760"/>
-            <a:ext cx="2339640" cy="1388880"/>
+            <a:ext cx="2339280" cy="1388520"/>
           </a:xfrm>
           <a:prstGeom prst="rect">
             <a:avLst/>
@@ -25283,7 +25321,7 @@
         <p:spPr>
           <a:xfrm>
             <a:off x="1044000" y="1095120"/>
-            <a:ext cx="7235640" cy="381960"/>
+            <a:ext cx="7235280" cy="381600"/>
           </a:xfrm>
           <a:prstGeom prst="rect">
             <a:avLst/>
@@ -25344,7 +25382,7 @@
         <p:spPr>
           <a:xfrm>
             <a:off x="1605960" y="1620000"/>
-            <a:ext cx="6061680" cy="3814200"/>
+            <a:ext cx="6061320" cy="3813840"/>
           </a:xfrm>
           <a:prstGeom prst="rect">
             <a:avLst/>
@@ -25393,7 +25431,7 @@
         <p:spPr>
           <a:xfrm>
             <a:off x="1044000" y="1095120"/>
-            <a:ext cx="7235640" cy="381960"/>
+            <a:ext cx="7235280" cy="381600"/>
           </a:xfrm>
           <a:prstGeom prst="rect">
             <a:avLst/>
@@ -25454,7 +25492,7 @@
         <p:spPr>
           <a:xfrm>
             <a:off x="1620000" y="1548720"/>
-            <a:ext cx="6119640" cy="3850920"/>
+            <a:ext cx="6119280" cy="3850560"/>
           </a:xfrm>
           <a:prstGeom prst="rect">
             <a:avLst/>
@@ -25503,7 +25541,7 @@
         <p:spPr>
           <a:xfrm>
             <a:off x="1044000" y="1095120"/>
-            <a:ext cx="8133480" cy="381960"/>
+            <a:ext cx="8133120" cy="381600"/>
           </a:xfrm>
           <a:prstGeom prst="rect">
             <a:avLst/>
@@ -25560,7 +25598,7 @@
         <p:spPr>
           <a:xfrm>
             <a:off x="1086120" y="1635120"/>
-            <a:ext cx="7721280" cy="3610080"/>
+            <a:ext cx="7720920" cy="3609720"/>
           </a:xfrm>
           <a:prstGeom prst="rect">
             <a:avLst/>
@@ -25580,6 +25618,102 @@
           <a:bodyPr lIns="90000" rIns="90000" tIns="45000" bIns="45000" anchor="t">
             <a:noAutofit/>
           </a:bodyPr>
+          <a:p>
+            <a:pPr marL="216000" indent="-215640">
+              <a:lnSpc>
+                <a:spcPct val="100000"/>
+              </a:lnSpc>
+              <a:buClr>
+                <a:srgbClr val="000000"/>
+              </a:buClr>
+              <a:buSzPct val="45000"/>
+              <a:buFont typeface="Wingdings" charset="2"/>
+              <a:buChar char=""/>
+            </a:pPr>
+            <a:r>
+              <a:rPr b="0" lang="fr-CH" sz="1800" spc="-1" strike="noStrike">
+                <a:solidFill>
+                  <a:srgbClr val="808080"/>
+                </a:solidFill>
+                <a:latin typeface="Noto Sans"/>
+                <a:ea typeface="DejaVu Sans"/>
+              </a:rPr>
+              <a:t>Seulement trois races de chien seront utilisées vu les ressources </a:t>
+            </a:r>
+            <a:br>
+              <a:rPr sz="1800"/>
+            </a:br>
+            <a:r>
+              <a:rPr b="0" lang="fr-CH" sz="1800" spc="-1" strike="noStrike">
+                <a:solidFill>
+                  <a:srgbClr val="808080"/>
+                </a:solidFill>
+                <a:latin typeface="Noto Sans"/>
+                <a:ea typeface="DejaVu Sans"/>
+              </a:rPr>
+              <a:t>requises.</a:t>
+            </a:r>
+            <a:endParaRPr b="0" lang="fr-CH" sz="1800" spc="-1" strike="noStrike">
+              <a:solidFill>
+                <a:srgbClr val="000000"/>
+              </a:solidFill>
+              <a:latin typeface="Arial"/>
+            </a:endParaRPr>
+          </a:p>
+          <a:p>
+            <a:pPr marL="216000" indent="-215640">
+              <a:lnSpc>
+                <a:spcPct val="100000"/>
+              </a:lnSpc>
+              <a:buClr>
+                <a:srgbClr val="000000"/>
+              </a:buClr>
+              <a:buSzPct val="45000"/>
+              <a:buFont typeface="Wingdings" charset="2"/>
+              <a:buChar char=""/>
+            </a:pPr>
+            <a:r>
+              <a:rPr b="0" lang="fr-CH" sz="1800" spc="-1" strike="noStrike">
+                <a:solidFill>
+                  <a:srgbClr val="808080"/>
+                </a:solidFill>
+                <a:latin typeface="Noto Sans"/>
+                <a:ea typeface="DejaVu Sans"/>
+              </a:rPr>
+              <a:t>La préparation des images hors dimensionnement </a:t>
+            </a:r>
+            <a:br>
+              <a:rPr sz="1800"/>
+            </a:br>
+            <a:r>
+              <a:rPr b="0" lang="fr-CH" sz="1800" spc="-1" strike="noStrike">
+                <a:solidFill>
+                  <a:srgbClr val="808080"/>
+                </a:solidFill>
+                <a:latin typeface="Noto Sans"/>
+                <a:ea typeface="DejaVu Sans"/>
+              </a:rPr>
+              <a:t>n’influencent pas les résultats.</a:t>
+            </a:r>
+            <a:br>
+              <a:rPr sz="1800"/>
+            </a:br>
+            <a:r>
+              <a:rPr b="0" lang="fr-CH" sz="1800" spc="-1" strike="noStrike">
+                <a:solidFill>
+                  <a:srgbClr val="808080"/>
+                </a:solidFill>
+                <a:latin typeface="Noto Sans"/>
+              </a:rPr>
+              <a:t> </a:t>
+            </a:r>
+            <a:endParaRPr b="0" lang="fr-CH" sz="1800" spc="-1" strike="noStrike">
+              <a:solidFill>
+                <a:srgbClr val="000000"/>
+              </a:solidFill>
+              <a:latin typeface="Arial"/>
+            </a:endParaRPr>
+          </a:p>
           <a:p>
             <a:pPr marL="216000" indent="-215640">
               <a:lnSpc>
@@ -25755,6 +25889,124 @@
               <a:latin typeface="Arial"/>
             </a:endParaRPr>
           </a:p>
+        </p:txBody>
+      </p:sp>
+    </p:spTree>
+  </p:cSld>
+  <mc:AlternateContent>
+    <mc:Choice Requires="p14">
+      <p:transition spd="slow" p14:dur="2000"/>
+    </mc:Choice>
+    <mc:Fallback>
+      <p:transition spd="slow"/>
+    </mc:Fallback>
+  </mc:AlternateContent>
+</p:sld>
+</file>
+
+<file path=ppt/slides/slide9.xml><?xml version="1.0" encoding="utf-8"?>
+<p:sld xmlns:a="http://schemas.openxmlformats.org/drawingml/2006/main" xmlns:p="http://schemas.openxmlformats.org/presentationml/2006/main" xmlns:r="http://schemas.openxmlformats.org/officeDocument/2006/relationships" xmlns:p14="http://schemas.microsoft.com/office/powerpoint/2010/main" xmlns:p15="http://schemas.microsoft.com/office/powerpoint/2012/main" xmlns:mc="http://schemas.openxmlformats.org/markup-compatibility/2006">
+  <p:cSld>
+    <p:spTree>
+      <p:nvGrpSpPr>
+        <p:cNvPr id="1" name=""/>
+        <p:cNvGrpSpPr/>
+        <p:nvPr/>
+      </p:nvGrpSpPr>
+      <p:grpSpPr>
+        <a:xfrm>
+          <a:off x="0" y="0"/>
+          <a:ext cx="0" cy="0"/>
+          <a:chOff x="0" y="0"/>
+          <a:chExt cx="0" cy="0"/>
+        </a:xfrm>
+      </p:grpSpPr>
+      <p:sp>
+        <p:nvSpPr>
+          <p:cNvPr id="187" name="TextShape 14"/>
+          <p:cNvSpPr/>
+          <p:nvPr/>
+        </p:nvSpPr>
+        <p:spPr>
+          <a:xfrm>
+            <a:off x="1044000" y="1095120"/>
+            <a:ext cx="8133120" cy="381600"/>
+          </a:xfrm>
+          <a:prstGeom prst="rect">
+            <a:avLst/>
+          </a:prstGeom>
+          <a:noFill/>
+          <a:ln w="0">
+            <a:noFill/>
+          </a:ln>
+        </p:spPr>
+        <p:style>
+          <a:lnRef idx="0"/>
+          <a:fillRef idx="0"/>
+          <a:effectRef idx="0"/>
+          <a:fontRef idx="minor"/>
+        </p:style>
+        <p:txBody>
+          <a:bodyPr lIns="90000" rIns="90000" tIns="45000" bIns="45000" anchor="t">
+            <a:noAutofit/>
+          </a:bodyPr>
+          <a:p>
+            <a:pPr algn="just">
+              <a:lnSpc>
+                <a:spcPct val="100000"/>
+              </a:lnSpc>
+              <a:spcBef>
+                <a:spcPts val="720"/>
+              </a:spcBef>
+            </a:pPr>
+            <a:r>
+              <a:rPr b="1" lang="de-DE" sz="2400" spc="-1" strike="noStrike">
+                <a:solidFill>
+                  <a:srgbClr val="000000"/>
+                </a:solidFill>
+                <a:latin typeface="Noto Sans"/>
+                <a:ea typeface="DejaVu Sans"/>
+              </a:rPr>
+              <a:t>Modélisation personnelle</a:t>
+            </a:r>
+            <a:endParaRPr b="0" lang="fr-CH" sz="2400" spc="-1" strike="noStrike">
+              <a:solidFill>
+                <a:srgbClr val="000000"/>
+              </a:solidFill>
+              <a:latin typeface="Arial"/>
+            </a:endParaRPr>
+          </a:p>
+        </p:txBody>
+      </p:sp>
+      <p:sp>
+        <p:nvSpPr>
+          <p:cNvPr id="188" name="TextShape 15"/>
+          <p:cNvSpPr/>
+          <p:nvPr/>
+        </p:nvSpPr>
+        <p:spPr>
+          <a:xfrm>
+            <a:off x="1086120" y="1635120"/>
+            <a:ext cx="7720920" cy="3609720"/>
+          </a:xfrm>
+          <a:prstGeom prst="rect">
+            <a:avLst/>
+          </a:prstGeom>
+          <a:noFill/>
+          <a:ln w="0">
+            <a:noFill/>
+          </a:ln>
+        </p:spPr>
+        <p:style>
+          <a:lnRef idx="0"/>
+          <a:fillRef idx="0"/>
+          <a:effectRef idx="0"/>
+          <a:fontRef idx="minor"/>
+        </p:style>
+        <p:txBody>
+          <a:bodyPr lIns="90000" rIns="90000" tIns="45000" bIns="45000" anchor="t">
+            <a:noAutofit/>
+          </a:bodyPr>
           <a:p>
             <a:pPr lvl="1" marL="432000" indent="-216000">
               <a:lnSpc>
@@ -25836,160 +26088,7 @@
                 <a:latin typeface="Noto Sans"/>
                 <a:ea typeface="DejaVu Sans"/>
               </a:rPr>
-              <a:t> des images.</a:t>
-            </a:r>
-            <a:endParaRPr b="0" lang="fr-CH" sz="1800" spc="-1" strike="noStrike">
-              <a:solidFill>
-                <a:srgbClr val="000000"/>
-              </a:solidFill>
-              <a:latin typeface="Arial"/>
-            </a:endParaRPr>
-          </a:p>
-        </p:txBody>
-      </p:sp>
-    </p:spTree>
-  </p:cSld>
-  <mc:AlternateContent>
-    <mc:Choice Requires="p14">
-      <p:transition spd="slow" p14:dur="2000"/>
-    </mc:Choice>
-    <mc:Fallback>
-      <p:transition spd="slow"/>
-    </mc:Fallback>
-  </mc:AlternateContent>
-</p:sld>
-</file>
-
-<file path=ppt/slides/slide9.xml><?xml version="1.0" encoding="utf-8"?>
-<p:sld xmlns:a="http://schemas.openxmlformats.org/drawingml/2006/main" xmlns:p="http://schemas.openxmlformats.org/presentationml/2006/main" xmlns:r="http://schemas.openxmlformats.org/officeDocument/2006/relationships" xmlns:p14="http://schemas.microsoft.com/office/powerpoint/2010/main" xmlns:p15="http://schemas.microsoft.com/office/powerpoint/2012/main" xmlns:mc="http://schemas.openxmlformats.org/markup-compatibility/2006">
-  <p:cSld>
-    <p:spTree>
-      <p:nvGrpSpPr>
-        <p:cNvPr id="1" name=""/>
-        <p:cNvGrpSpPr/>
-        <p:nvPr/>
-      </p:nvGrpSpPr>
-      <p:grpSpPr>
-        <a:xfrm>
-          <a:off x="0" y="0"/>
-          <a:ext cx="0" cy="0"/>
-          <a:chOff x="0" y="0"/>
-          <a:chExt cx="0" cy="0"/>
-        </a:xfrm>
-      </p:grpSpPr>
-      <p:sp>
-        <p:nvSpPr>
-          <p:cNvPr id="187" name="TextShape 14"/>
-          <p:cNvSpPr/>
-          <p:nvPr/>
-        </p:nvSpPr>
-        <p:spPr>
-          <a:xfrm>
-            <a:off x="1044000" y="1095120"/>
-            <a:ext cx="8133480" cy="381960"/>
-          </a:xfrm>
-          <a:prstGeom prst="rect">
-            <a:avLst/>
-          </a:prstGeom>
-          <a:noFill/>
-          <a:ln w="0">
-            <a:noFill/>
-          </a:ln>
-        </p:spPr>
-        <p:style>
-          <a:lnRef idx="0"/>
-          <a:fillRef idx="0"/>
-          <a:effectRef idx="0"/>
-          <a:fontRef idx="minor"/>
-        </p:style>
-        <p:txBody>
-          <a:bodyPr lIns="90000" rIns="90000" tIns="45000" bIns="45000" anchor="t">
-            <a:noAutofit/>
-          </a:bodyPr>
-          <a:p>
-            <a:pPr algn="just">
-              <a:lnSpc>
-                <a:spcPct val="100000"/>
-              </a:lnSpc>
-              <a:spcBef>
-                <a:spcPts val="720"/>
-              </a:spcBef>
-            </a:pPr>
-            <a:r>
-              <a:rPr b="1" lang="de-DE" sz="2400" spc="-1" strike="noStrike">
-                <a:solidFill>
-                  <a:srgbClr val="000000"/>
-                </a:solidFill>
-                <a:latin typeface="Noto Sans"/>
-                <a:ea typeface="DejaVu Sans"/>
-              </a:rPr>
-              <a:t>Modélisation personnelle</a:t>
-            </a:r>
-            <a:endParaRPr b="0" lang="fr-CH" sz="2400" spc="-1" strike="noStrike">
-              <a:solidFill>
-                <a:srgbClr val="000000"/>
-              </a:solidFill>
-              <a:latin typeface="Arial"/>
-            </a:endParaRPr>
-          </a:p>
-        </p:txBody>
-      </p:sp>
-      <p:sp>
-        <p:nvSpPr>
-          <p:cNvPr id="188" name="TextShape 15"/>
-          <p:cNvSpPr/>
-          <p:nvPr/>
-        </p:nvSpPr>
-        <p:spPr>
-          <a:xfrm>
-            <a:off x="1086120" y="1635120"/>
-            <a:ext cx="7721280" cy="3610080"/>
-          </a:xfrm>
-          <a:prstGeom prst="rect">
-            <a:avLst/>
-          </a:prstGeom>
-          <a:noFill/>
-          <a:ln w="0">
-            <a:noFill/>
-          </a:ln>
-        </p:spPr>
-        <p:style>
-          <a:lnRef idx="0"/>
-          <a:fillRef idx="0"/>
-          <a:effectRef idx="0"/>
-          <a:fontRef idx="minor"/>
-        </p:style>
-        <p:txBody>
-          <a:bodyPr lIns="90000" rIns="90000" tIns="45000" bIns="45000" anchor="t">
-            <a:noAutofit/>
-          </a:bodyPr>
-          <a:p>
-            <a:pPr lvl="2" marL="648000" indent="-216000">
-              <a:lnSpc>
-                <a:spcPct val="100000"/>
-              </a:lnSpc>
-              <a:spcBef>
-                <a:spcPts val="340"/>
-              </a:spcBef>
-              <a:spcAft>
-                <a:spcPts val="283"/>
-              </a:spcAft>
-              <a:buClr>
-                <a:srgbClr val="000000"/>
-              </a:buClr>
-              <a:buSzPct val="45000"/>
-              <a:buFont typeface="Wingdings" charset="2"/>
-              <a:buChar char=""/>
-            </a:pPr>
-            <a:r>
-              <a:rPr b="0" lang="fr-CH" sz="1800" spc="-1" strike="noStrike">
-                <a:solidFill>
-                  <a:srgbClr val="808080"/>
-                </a:solidFill>
-                <a:latin typeface="Noto Sans"/>
-                <a:ea typeface="DejaVu Sans"/>
-              </a:rPr>
-              <a:t>Une couche BatchNormalization qui va normaliser les valeurs entrantes permettant un apprentissage plus rapide et un </a:t>
+              <a:t> des images.Une couche BatchNormalization qui va normaliser les valeurs entrantes permettant un apprentissage plus rapide et un </a:t>
             </a:r>
             <a:r>
               <a:rPr b="0" i="1" lang="fr-CH" sz="1800" spc="-1" strike="noStrike">
@@ -26100,67 +26199,6 @@
                 <a:ea typeface="DejaVu Sans"/>
               </a:rPr>
               <a:t> et donc les ressources nécessaire à entraîner notre modèle.</a:t>
-            </a:r>
-            <a:endParaRPr b="0" lang="fr-CH" sz="1800" spc="-1" strike="noStrike">
-              <a:solidFill>
-                <a:srgbClr val="000000"/>
-              </a:solidFill>
-              <a:latin typeface="Arial"/>
-            </a:endParaRPr>
-          </a:p>
-          <a:p>
-            <a:pPr lvl="1" marL="432000" indent="-216000">
-              <a:lnSpc>
-                <a:spcPct val="100000"/>
-              </a:lnSpc>
-              <a:spcBef>
-                <a:spcPts val="340"/>
-              </a:spcBef>
-              <a:spcAft>
-                <a:spcPts val="283"/>
-              </a:spcAft>
-              <a:buClr>
-                <a:srgbClr val="000000"/>
-              </a:buClr>
-              <a:buSzPct val="45000"/>
-              <a:buFont typeface="Wingdings" charset="2"/>
-              <a:buChar char=""/>
-            </a:pPr>
-            <a:r>
-              <a:rPr b="0" lang="fr-CH" sz="1800" spc="-1" strike="noStrike">
-                <a:solidFill>
-                  <a:srgbClr val="808080"/>
-                </a:solidFill>
-                <a:latin typeface="Noto Sans"/>
-                <a:ea typeface="DejaVu Sans"/>
-              </a:rPr>
-              <a:t>Une couche GlobalAveragePooling2D qui va réduire les dimensions spatiales à 1x1 en utilisant la moyenne de </a:t>
-            </a:r>
-            <a:br>
-              <a:rPr sz="1800"/>
-            </a:br>
-            <a:r>
-              <a:rPr b="0" lang="fr-CH" sz="1800" spc="-1" strike="noStrike">
-                <a:solidFill>
-                  <a:srgbClr val="808080"/>
-                </a:solidFill>
-                <a:latin typeface="Noto Sans"/>
-                <a:ea typeface="DejaVu Sans"/>
-              </a:rPr>
-              <a:t>chaque canal.  Cette couche a un rôle similaire à une</a:t>
-            </a:r>
-            <a:br>
-              <a:rPr sz="1800"/>
-            </a:br>
-            <a:r>
-              <a:rPr b="0" lang="fr-CH" sz="1800" spc="-1" strike="noStrike">
-                <a:solidFill>
-                  <a:srgbClr val="808080"/>
-                </a:solidFill>
-                <a:latin typeface="Noto Sans"/>
-                <a:ea typeface="DejaVu Sans"/>
-              </a:rPr>
-              <a:t>couche de type Flatten.</a:t>
             </a:r>
             <a:endParaRPr b="0" lang="fr-CH" sz="1800" spc="-1" strike="noStrike">
               <a:solidFill>

</xml_diff>

<commit_message>
Final commit, small typos in presentation
</commit_message>
<xml_diff>
--- a/Barrelet_Xavier_5_presentation_092024.pptx
+++ b/Barrelet_Xavier_5_presentation_092024.pptx
@@ -345,7 +345,7 @@
         <p:spPr>
           <a:xfrm>
             <a:off x="0" y="4114800"/>
-            <a:ext cx="10066680" cy="1541880"/>
+            <a:ext cx="10066320" cy="1541520"/>
           </a:xfrm>
           <a:prstGeom prst="rect">
             <a:avLst/>
@@ -392,9 +392,9 @@
         <p:grpSpPr>
           <a:xfrm>
             <a:off x="0" y="0"/>
-            <a:ext cx="10067400" cy="4101480"/>
+            <a:ext cx="10067040" cy="4101120"/>
             <a:chOff x="0" y="0"/>
-            <a:chExt cx="10067400" cy="4101480"/>
+            <a:chExt cx="10067040" cy="4101120"/>
           </a:xfrm>
         </p:grpSpPr>
         <p:sp>
@@ -406,7 +406,7 @@
           <p:spPr>
             <a:xfrm>
               <a:off x="0" y="0"/>
-              <a:ext cx="10067400" cy="4101480"/>
+              <a:ext cx="10067040" cy="4101120"/>
             </a:xfrm>
             <a:prstGeom prst="rect">
               <a:avLst/>
@@ -453,7 +453,7 @@
           <p:spPr>
             <a:xfrm>
               <a:off x="0" y="1280160"/>
-              <a:ext cx="1541160" cy="626760"/>
+              <a:ext cx="1540800" cy="626400"/>
             </a:xfrm>
             <a:prstGeom prst="rect">
               <a:avLst/>
@@ -502,7 +502,7 @@
           <p:spPr>
             <a:xfrm>
               <a:off x="914400" y="1920240"/>
-              <a:ext cx="1266840" cy="1815480"/>
+              <a:ext cx="1266480" cy="1815120"/>
             </a:xfrm>
             <a:prstGeom prst="rect">
               <a:avLst/>
@@ -549,7 +549,7 @@
           <p:spPr>
             <a:xfrm>
               <a:off x="2194560" y="548640"/>
-              <a:ext cx="1266840" cy="1815480"/>
+              <a:ext cx="1266480" cy="1815120"/>
             </a:xfrm>
             <a:prstGeom prst="rect">
               <a:avLst/>
@@ -596,7 +596,7 @@
           <p:spPr>
             <a:xfrm>
               <a:off x="3474720" y="1188720"/>
-              <a:ext cx="352440" cy="352440"/>
+              <a:ext cx="352080" cy="352080"/>
             </a:xfrm>
             <a:prstGeom prst="rect">
               <a:avLst/>
@@ -643,7 +643,7 @@
           <p:spPr>
             <a:xfrm>
               <a:off x="4206240" y="0"/>
-              <a:ext cx="1449720" cy="901080"/>
+              <a:ext cx="1449360" cy="900720"/>
             </a:xfrm>
             <a:prstGeom prst="rect">
               <a:avLst/>
@@ -690,7 +690,7 @@
           <p:spPr>
             <a:xfrm>
               <a:off x="4663440" y="914400"/>
-              <a:ext cx="992520" cy="443880"/>
+              <a:ext cx="992160" cy="443520"/>
             </a:xfrm>
             <a:prstGeom prst="rect">
               <a:avLst/>
@@ -737,7 +737,7 @@
           <p:spPr>
             <a:xfrm>
               <a:off x="3474720" y="1737360"/>
-              <a:ext cx="3095640" cy="992520"/>
+              <a:ext cx="3095280" cy="992160"/>
             </a:xfrm>
             <a:prstGeom prst="rect">
               <a:avLst/>
@@ -784,7 +784,7 @@
           <p:spPr>
             <a:xfrm>
               <a:off x="4114800" y="2743200"/>
-              <a:ext cx="1449720" cy="992520"/>
+              <a:ext cx="1449360" cy="992160"/>
             </a:xfrm>
             <a:prstGeom prst="rect">
               <a:avLst/>
@@ -831,7 +831,7 @@
           <p:spPr>
             <a:xfrm>
               <a:off x="6583680" y="1463040"/>
-              <a:ext cx="1541160" cy="443880"/>
+              <a:ext cx="1540800" cy="443520"/>
             </a:xfrm>
             <a:prstGeom prst="rect">
               <a:avLst/>
@@ -880,7 +880,7 @@
           <p:spPr>
             <a:xfrm>
               <a:off x="7315200" y="1920240"/>
-              <a:ext cx="1449720" cy="1632600"/>
+              <a:ext cx="1449360" cy="1632240"/>
             </a:xfrm>
             <a:prstGeom prst="rect">
               <a:avLst/>
@@ -929,7 +929,7 @@
           <p:spPr>
             <a:xfrm>
               <a:off x="2743200" y="2377440"/>
-              <a:ext cx="535320" cy="809640"/>
+              <a:ext cx="534960" cy="809280"/>
             </a:xfrm>
             <a:prstGeom prst="rect">
               <a:avLst/>
@@ -976,7 +976,7 @@
           <p:spPr>
             <a:xfrm>
               <a:off x="8595360" y="0"/>
-              <a:ext cx="1472040" cy="1449720"/>
+              <a:ext cx="1471680" cy="1449360"/>
             </a:xfrm>
             <a:prstGeom prst="rect">
               <a:avLst/>
@@ -1023,7 +1023,7 @@
           <p:spPr>
             <a:xfrm>
               <a:off x="6766560" y="0"/>
-              <a:ext cx="261000" cy="992520"/>
+              <a:ext cx="260640" cy="992160"/>
             </a:xfrm>
             <a:prstGeom prst="rect">
               <a:avLst/>
@@ -1072,7 +1072,7 @@
           <p:spPr>
             <a:xfrm>
               <a:off x="1554480" y="0"/>
-              <a:ext cx="169560" cy="901080"/>
+              <a:ext cx="169200" cy="900720"/>
             </a:xfrm>
             <a:prstGeom prst="rect">
               <a:avLst/>
@@ -1119,7 +1119,7 @@
           <p:spPr>
             <a:xfrm>
               <a:off x="0" y="3017520"/>
-              <a:ext cx="352440" cy="1083960"/>
+              <a:ext cx="352080" cy="1083600"/>
             </a:xfrm>
             <a:prstGeom prst="rect">
               <a:avLst/>
@@ -1166,7 +1166,7 @@
           <p:spPr>
             <a:xfrm>
               <a:off x="9601200" y="2560320"/>
-              <a:ext cx="352440" cy="1541160"/>
+              <a:ext cx="352080" cy="1540800"/>
             </a:xfrm>
             <a:prstGeom prst="rect">
               <a:avLst/>
@@ -1213,7 +1213,7 @@
           <p:spPr>
             <a:xfrm>
               <a:off x="8778240" y="1828800"/>
-              <a:ext cx="352440" cy="352440"/>
+              <a:ext cx="352080" cy="352080"/>
             </a:xfrm>
             <a:prstGeom prst="rect">
               <a:avLst/>
@@ -1560,10 +1560,10 @@
         </p:nvGrpSpPr>
         <p:grpSpPr>
           <a:xfrm>
-            <a:off x="8540280" y="5052600"/>
-            <a:ext cx="1267200" cy="901440"/>
-            <a:chOff x="8540280" y="5052600"/>
-            <a:chExt cx="1267200" cy="901440"/>
+            <a:off x="8540280" y="5052240"/>
+            <a:ext cx="1266840" cy="901080"/>
+            <a:chOff x="8540280" y="5052240"/>
+            <a:chExt cx="1266840" cy="901080"/>
           </a:xfrm>
         </p:grpSpPr>
         <p:grpSp>
@@ -1574,10 +1574,10 @@
           </p:nvGrpSpPr>
           <p:grpSpPr>
             <a:xfrm>
-              <a:off x="8540280" y="5052600"/>
-              <a:ext cx="1267200" cy="901440"/>
-              <a:chOff x="8540280" y="5052600"/>
-              <a:chExt cx="1267200" cy="901440"/>
+              <a:off x="8540280" y="5052240"/>
+              <a:ext cx="1266840" cy="901080"/>
+              <a:chOff x="8540280" y="5052240"/>
+              <a:chExt cx="1266840" cy="901080"/>
             </a:xfrm>
           </p:grpSpPr>
           <p:sp>
@@ -1589,7 +1589,7 @@
             <p:spPr>
               <a:xfrm flipV="1" rot="21598800">
                 <a:off x="9637560" y="5418000"/>
-                <a:ext cx="169560" cy="169560"/>
+                <a:ext cx="169200" cy="169200"/>
               </a:xfrm>
               <a:prstGeom prst="ellipse">
                 <a:avLst/>
@@ -1597,7 +1597,7 @@
               <a:blipFill rotWithShape="0">
                 <a:blip r:embed="rId2"/>
                 <a:srcRect/>
-                <a:tile tx="0" ty="0" sx="61702" sy="61702" algn="ctr"/>
+                <a:tile tx="0" ty="0" sx="61347" sy="61347" algn="ctr"/>
               </a:blipFill>
               <a:ln w="0">
                 <a:noFill/>
@@ -1645,7 +1645,7 @@
             <p:spPr>
               <a:xfrm flipV="1" rot="21598800">
                 <a:off x="9271800" y="5418000"/>
-                <a:ext cx="169560" cy="169560"/>
+                <a:ext cx="169200" cy="169200"/>
               </a:xfrm>
               <a:prstGeom prst="ellipse">
                 <a:avLst/>
@@ -1653,7 +1653,7 @@
               <a:blipFill rotWithShape="0">
                 <a:blip r:embed="rId3"/>
                 <a:srcRect/>
-                <a:tile tx="0" ty="0" sx="61702" sy="61702" algn="ctr"/>
+                <a:tile tx="0" ty="0" sx="61347" sy="61347" algn="ctr"/>
               </a:blipFill>
               <a:ln w="0">
                 <a:noFill/>
@@ -1701,7 +1701,7 @@
             <p:spPr>
               <a:xfrm flipV="1" rot="21598800">
                 <a:off x="8906400" y="5418000"/>
-                <a:ext cx="169560" cy="169560"/>
+                <a:ext cx="169200" cy="169200"/>
               </a:xfrm>
               <a:prstGeom prst="ellipse">
                 <a:avLst/>
@@ -1709,7 +1709,7 @@
               <a:blipFill rotWithShape="0">
                 <a:blip r:embed="rId4"/>
                 <a:srcRect/>
-                <a:tile tx="0" ty="0" sx="61702" sy="61702" algn="ctr"/>
+                <a:tile tx="0" ty="0" sx="61347" sy="61347" algn="ctr"/>
               </a:blipFill>
               <a:ln w="0">
                 <a:noFill/>
@@ -1757,7 +1757,7 @@
             <p:spPr>
               <a:xfrm flipV="1" rot="21598800">
                 <a:off x="8540280" y="5418360"/>
-                <a:ext cx="169560" cy="169560"/>
+                <a:ext cx="169200" cy="169200"/>
               </a:xfrm>
               <a:prstGeom prst="ellipse">
                 <a:avLst/>
@@ -1765,7 +1765,7 @@
               <a:blipFill rotWithShape="0">
                 <a:blip r:embed="rId5"/>
                 <a:srcRect/>
-                <a:tile tx="0" ty="0" sx="61702" sy="61702" algn="ctr"/>
+                <a:tile tx="0" ty="0" sx="61347" sy="61347" algn="ctr"/>
               </a:blipFill>
               <a:ln w="0">
                 <a:noFill/>
@@ -1813,7 +1813,7 @@
             <p:spPr>
               <a:xfrm flipV="1" rot="21598800">
                 <a:off x="8540280" y="5052240"/>
-                <a:ext cx="169560" cy="169560"/>
+                <a:ext cx="169200" cy="169200"/>
               </a:xfrm>
               <a:prstGeom prst="ellipse">
                 <a:avLst/>
@@ -1821,7 +1821,7 @@
               <a:blipFill rotWithShape="0">
                 <a:blip r:embed="rId6"/>
                 <a:srcRect/>
-                <a:tile tx="0" ty="0" sx="61702" sy="61702" algn="ctr"/>
+                <a:tile tx="0" ty="0" sx="61347" sy="61347" algn="ctr"/>
               </a:blipFill>
               <a:ln w="0">
                 <a:noFill/>
@@ -1869,7 +1869,7 @@
             <p:spPr>
               <a:xfrm flipV="1" rot="21598800">
                 <a:off x="8906040" y="5052240"/>
-                <a:ext cx="169560" cy="169560"/>
+                <a:ext cx="169200" cy="169200"/>
               </a:xfrm>
               <a:prstGeom prst="ellipse">
                 <a:avLst/>
@@ -1877,7 +1877,7 @@
               <a:blipFill rotWithShape="0">
                 <a:blip r:embed="rId7"/>
                 <a:srcRect/>
-                <a:tile tx="0" ty="0" sx="61702" sy="61702" algn="ctr"/>
+                <a:tile tx="0" ty="0" sx="61347" sy="61347" algn="ctr"/>
               </a:blipFill>
               <a:ln w="0">
                 <a:noFill/>
@@ -1925,7 +1925,7 @@
             <p:spPr>
               <a:xfrm flipV="1" rot="21598800">
                 <a:off x="9271800" y="5052600"/>
-                <a:ext cx="169560" cy="169560"/>
+                <a:ext cx="169200" cy="169200"/>
               </a:xfrm>
               <a:prstGeom prst="ellipse">
                 <a:avLst/>
@@ -1933,7 +1933,7 @@
               <a:blipFill rotWithShape="0">
                 <a:blip r:embed="rId8"/>
                 <a:srcRect/>
-                <a:tile tx="0" ty="0" sx="61702" sy="61702" algn="ctr"/>
+                <a:tile tx="0" ty="0" sx="61347" sy="61347" algn="ctr"/>
               </a:blipFill>
               <a:ln w="0">
                 <a:noFill/>
@@ -1981,7 +1981,7 @@
             <p:spPr>
               <a:xfrm flipV="1" rot="21598800">
                 <a:off x="9637920" y="5052240"/>
-                <a:ext cx="169560" cy="169560"/>
+                <a:ext cx="169200" cy="169200"/>
               </a:xfrm>
               <a:prstGeom prst="ellipse">
                 <a:avLst/>
@@ -1989,7 +1989,7 @@
               <a:blipFill rotWithShape="0">
                 <a:blip r:embed="rId9"/>
                 <a:srcRect/>
-                <a:tile tx="0" ty="0" sx="61702" sy="61702" algn="ctr"/>
+                <a:tile tx="0" ty="0" sx="61347" sy="61347" algn="ctr"/>
               </a:blipFill>
               <a:ln w="0">
                 <a:noFill/>
@@ -2037,7 +2037,7 @@
             <p:spPr>
               <a:xfrm flipV="1" rot="21598800">
                 <a:off x="9637560" y="5783760"/>
-                <a:ext cx="169560" cy="169560"/>
+                <a:ext cx="169200" cy="169200"/>
               </a:xfrm>
               <a:prstGeom prst="ellipse">
                 <a:avLst/>
@@ -2045,7 +2045,7 @@
               <a:blipFill rotWithShape="0">
                 <a:blip r:embed="rId10"/>
                 <a:srcRect/>
-                <a:tile tx="0" ty="0" sx="61702" sy="61702" algn="ctr"/>
+                <a:tile tx="0" ty="0" sx="61347" sy="61347" algn="ctr"/>
               </a:blipFill>
               <a:ln w="0">
                 <a:noFill/>
@@ -2093,7 +2093,7 @@
             <p:spPr>
               <a:xfrm flipV="1" rot="21598800">
                 <a:off x="9272160" y="5784120"/>
-                <a:ext cx="169560" cy="169560"/>
+                <a:ext cx="169200" cy="169200"/>
               </a:xfrm>
               <a:prstGeom prst="ellipse">
                 <a:avLst/>
@@ -2101,7 +2101,7 @@
               <a:blipFill rotWithShape="0">
                 <a:blip r:embed="rId11"/>
                 <a:srcRect/>
-                <a:tile tx="0" ty="0" sx="61702" sy="61702" algn="ctr"/>
+                <a:tile tx="0" ty="0" sx="61347" sy="61347" algn="ctr"/>
               </a:blipFill>
               <a:ln w="0">
                 <a:noFill/>
@@ -2149,7 +2149,7 @@
             <p:spPr>
               <a:xfrm flipV="1" rot="21598800">
                 <a:off x="8906040" y="5783760"/>
-                <a:ext cx="169560" cy="169560"/>
+                <a:ext cx="169200" cy="169200"/>
               </a:xfrm>
               <a:prstGeom prst="ellipse">
                 <a:avLst/>
@@ -2157,7 +2157,7 @@
               <a:blipFill rotWithShape="0">
                 <a:blip r:embed="rId12"/>
                 <a:srcRect/>
-                <a:tile tx="0" ty="0" sx="61702" sy="61702" algn="ctr"/>
+                <a:tile tx="0" ty="0" sx="61347" sy="61347" algn="ctr"/>
               </a:blipFill>
               <a:ln w="0">
                 <a:noFill/>
@@ -2205,7 +2205,7 @@
             <p:spPr>
               <a:xfrm flipV="1" rot="21598800">
                 <a:off x="8540280" y="5783760"/>
-                <a:ext cx="169560" cy="169560"/>
+                <a:ext cx="169200" cy="169200"/>
               </a:xfrm>
               <a:prstGeom prst="ellipse">
                 <a:avLst/>
@@ -2213,7 +2213,7 @@
               <a:blipFill rotWithShape="0">
                 <a:blip r:embed="rId13"/>
                 <a:srcRect/>
-                <a:tile tx="0" ty="0" sx="61702" sy="61702" algn="ctr"/>
+                <a:tile tx="0" ty="0" sx="61347" sy="61347" algn="ctr"/>
               </a:blipFill>
               <a:ln w="0">
                 <a:noFill/>
@@ -2263,7 +2263,7 @@
         <p:spPr>
           <a:xfrm>
             <a:off x="1499760" y="1774080"/>
-            <a:ext cx="2912760" cy="2912760"/>
+            <a:ext cx="2912400" cy="2912400"/>
           </a:xfrm>
           <a:prstGeom prst="ellipse">
             <a:avLst/>
@@ -2312,7 +2312,7 @@
         <p:spPr>
           <a:xfrm>
             <a:off x="1225080" y="1134360"/>
-            <a:ext cx="1175760" cy="1175040"/>
+            <a:ext cx="1175400" cy="1174680"/>
           </a:xfrm>
           <a:prstGeom prst="ellipse">
             <a:avLst/>
@@ -2361,7 +2361,7 @@
         <p:spPr>
           <a:xfrm>
             <a:off x="3420000" y="4242960"/>
-            <a:ext cx="626760" cy="626760"/>
+            <a:ext cx="626400" cy="626400"/>
           </a:xfrm>
           <a:prstGeom prst="ellipse">
             <a:avLst/>
@@ -2414,7 +2414,7 @@
         <p:spPr>
           <a:xfrm>
             <a:off x="4349520" y="792360"/>
-            <a:ext cx="5512680" cy="4132080"/>
+            <a:ext cx="5512320" cy="4131720"/>
           </a:xfrm>
           <a:prstGeom prst="rect">
             <a:avLst/>
@@ -2433,7 +2433,7 @@
         <p:spPr>
           <a:xfrm>
             <a:off x="4846320" y="4846320"/>
-            <a:ext cx="2119680" cy="229320"/>
+            <a:ext cx="2119320" cy="228960"/>
           </a:xfrm>
           <a:prstGeom prst="rect">
             <a:avLst/>
@@ -2553,9 +2553,9 @@
         <p:grpSpPr>
           <a:xfrm>
             <a:off x="7406640" y="3566160"/>
-            <a:ext cx="2364120" cy="4284360"/>
+            <a:ext cx="2363760" cy="4284000"/>
             <a:chOff x="7406640" y="3566160"/>
-            <a:chExt cx="2364120" cy="4284360"/>
+            <a:chExt cx="2363760" cy="4284000"/>
           </a:xfrm>
         </p:grpSpPr>
         <p:sp>
@@ -2567,7 +2567,7 @@
           <p:spPr>
             <a:xfrm>
               <a:off x="8138160" y="4754880"/>
-              <a:ext cx="443880" cy="2547000"/>
+              <a:ext cx="443520" cy="2546640"/>
             </a:xfrm>
             <a:prstGeom prst="rect">
               <a:avLst/>
@@ -2575,7 +2575,7 @@
             <a:blipFill rotWithShape="0">
               <a:blip r:embed="rId2"/>
               <a:srcRect/>
-              <a:tile tx="0" ty="0" sx="61702" sy="61702" algn="ctr"/>
+              <a:tile tx="0" ty="0" sx="61347" sy="61347" algn="ctr"/>
             </a:blipFill>
             <a:ln w="0">
               <a:noFill/>
@@ -2616,7 +2616,7 @@
           <p:spPr>
             <a:xfrm>
               <a:off x="8961120" y="3566160"/>
-              <a:ext cx="443880" cy="2547000"/>
+              <a:ext cx="443520" cy="2546640"/>
             </a:xfrm>
             <a:prstGeom prst="rect">
               <a:avLst/>
@@ -2624,7 +2624,7 @@
             <a:blipFill rotWithShape="0">
               <a:blip r:embed="rId3"/>
               <a:srcRect/>
-              <a:tile tx="0" ty="0" sx="61702" sy="61702" algn="ctr"/>
+              <a:tile tx="0" ty="0" sx="61347" sy="61347" algn="ctr"/>
             </a:blipFill>
             <a:ln w="0">
               <a:noFill/>
@@ -2665,7 +2665,7 @@
           <p:spPr>
             <a:xfrm>
               <a:off x="8503920" y="5120640"/>
-              <a:ext cx="1266840" cy="78120"/>
+              <a:ext cx="1266480" cy="77760"/>
             </a:xfrm>
             <a:prstGeom prst="rect">
               <a:avLst/>
@@ -2686,7 +2686,7 @@
             <a:fontRef idx="minor"/>
           </p:style>
           <p:txBody>
-            <a:bodyPr wrap="none" lIns="90000" rIns="90000" tIns="39240" bIns="39240" anchor="ctr">
+            <a:bodyPr wrap="none" lIns="90000" rIns="90000" tIns="38880" bIns="38880" anchor="ctr">
               <a:noAutofit/>
             </a:bodyPr>
             <a:p>
@@ -2714,7 +2714,7 @@
           <p:spPr>
             <a:xfrm>
               <a:off x="8321040" y="5303520"/>
-              <a:ext cx="901080" cy="78120"/>
+              <a:ext cx="900720" cy="77760"/>
             </a:xfrm>
             <a:prstGeom prst="rect">
               <a:avLst/>
@@ -2735,7 +2735,7 @@
             <a:fontRef idx="minor"/>
           </p:style>
           <p:txBody>
-            <a:bodyPr wrap="none" lIns="90000" rIns="90000" tIns="39240" bIns="39240" anchor="ctr">
+            <a:bodyPr wrap="none" lIns="90000" rIns="90000" tIns="38880" bIns="38880" anchor="ctr">
               <a:noAutofit/>
             </a:bodyPr>
             <a:p>
@@ -2763,7 +2763,7 @@
           <p:spPr>
             <a:xfrm>
               <a:off x="8869680" y="5486400"/>
-              <a:ext cx="901080" cy="78120"/>
+              <a:ext cx="900720" cy="77760"/>
             </a:xfrm>
             <a:prstGeom prst="rect">
               <a:avLst/>
@@ -2784,7 +2784,7 @@
             <a:fontRef idx="minor"/>
           </p:style>
           <p:txBody>
-            <a:bodyPr wrap="none" lIns="90000" rIns="90000" tIns="39240" bIns="39240" anchor="ctr">
+            <a:bodyPr wrap="none" lIns="90000" rIns="90000" tIns="38880" bIns="38880" anchor="ctr">
               <a:noAutofit/>
             </a:bodyPr>
             <a:p>
@@ -2812,7 +2812,7 @@
           <p:spPr>
             <a:xfrm>
               <a:off x="7406640" y="5303520"/>
-              <a:ext cx="443880" cy="2547000"/>
+              <a:ext cx="443520" cy="2546640"/>
             </a:xfrm>
             <a:prstGeom prst="rect">
               <a:avLst/>
@@ -2820,7 +2820,7 @@
             <a:blipFill rotWithShape="0">
               <a:blip r:embed="rId4"/>
               <a:srcRect/>
-              <a:tile tx="0" ty="0" sx="61702" sy="61702" algn="ctr"/>
+              <a:tile tx="0" ty="0" sx="61347" sy="61347" algn="ctr"/>
             </a:blipFill>
             <a:ln w="0">
               <a:noFill/>
@@ -2861,8 +2861,8 @@
         </p:nvSpPr>
         <p:spPr>
           <a:xfrm flipH="1" flipV="1">
-            <a:off x="1435680" y="-1568160"/>
-            <a:ext cx="443880" cy="2547000"/>
+            <a:off x="1435320" y="-1568160"/>
+            <a:ext cx="443520" cy="2546640"/>
           </a:xfrm>
           <a:prstGeom prst="rect">
             <a:avLst/>
@@ -2870,7 +2870,7 @@
           <a:blipFill rotWithShape="0">
             <a:blip r:embed="rId5"/>
             <a:srcRect/>
-            <a:tile tx="0" ty="0" sx="61702" sy="61702" algn="ctr"/>
+            <a:tile tx="0" ty="0" sx="61347" sy="61347" algn="ctr"/>
           </a:blipFill>
           <a:ln w="0">
             <a:noFill/>
@@ -2910,8 +2910,8 @@
         </p:nvSpPr>
         <p:spPr>
           <a:xfrm flipH="1" flipV="1">
-            <a:off x="612720" y="-365760"/>
-            <a:ext cx="443880" cy="2547000"/>
+            <a:off x="612360" y="-365400"/>
+            <a:ext cx="443520" cy="2546640"/>
           </a:xfrm>
           <a:prstGeom prst="rect">
             <a:avLst/>
@@ -2919,7 +2919,7 @@
           <a:blipFill rotWithShape="0">
             <a:blip r:embed="rId6"/>
             <a:srcRect/>
-            <a:tile tx="0" ty="0" sx="61702" sy="61702" algn="ctr"/>
+            <a:tile tx="0" ty="0" sx="61347" sy="61347" algn="ctr"/>
           </a:blipFill>
           <a:ln w="0">
             <a:noFill/>
@@ -2960,7 +2960,7 @@
         <p:spPr>
           <a:xfrm flipH="1" flipV="1">
             <a:off x="260640" y="534960"/>
-            <a:ext cx="1266840" cy="78120"/>
+            <a:ext cx="1266480" cy="77760"/>
           </a:xfrm>
           <a:prstGeom prst="rect">
             <a:avLst/>
@@ -2981,7 +2981,7 @@
           <a:fontRef idx="minor"/>
         </p:style>
         <p:txBody>
-          <a:bodyPr wrap="none" lIns="90000" rIns="90000" tIns="39240" bIns="39240" anchor="ctr">
+          <a:bodyPr wrap="none" lIns="90000" rIns="90000" tIns="38880" bIns="38880" anchor="ctr">
             <a:noAutofit/>
           </a:bodyPr>
           <a:p>
@@ -3009,7 +3009,7 @@
         <p:spPr>
           <a:xfrm flipH="1" flipV="1">
             <a:off x="809280" y="352080"/>
-            <a:ext cx="901080" cy="78120"/>
+            <a:ext cx="900720" cy="77760"/>
           </a:xfrm>
           <a:prstGeom prst="rect">
             <a:avLst/>
@@ -3030,7 +3030,7 @@
           <a:fontRef idx="minor"/>
         </p:style>
         <p:txBody>
-          <a:bodyPr wrap="none" lIns="90000" rIns="90000" tIns="39240" bIns="39240" anchor="ctr">
+          <a:bodyPr wrap="none" lIns="90000" rIns="90000" tIns="38880" bIns="38880" anchor="ctr">
             <a:noAutofit/>
           </a:bodyPr>
           <a:p>
@@ -3058,7 +3058,7 @@
         <p:spPr>
           <a:xfrm flipH="1" flipV="1">
             <a:off x="260640" y="169200"/>
-            <a:ext cx="901080" cy="78120"/>
+            <a:ext cx="900720" cy="77760"/>
           </a:xfrm>
           <a:prstGeom prst="rect">
             <a:avLst/>
@@ -3079,7 +3079,7 @@
           <a:fontRef idx="minor"/>
         </p:style>
         <p:txBody>
-          <a:bodyPr wrap="none" lIns="90000" rIns="90000" tIns="39240" bIns="39240" anchor="ctr">
+          <a:bodyPr wrap="none" lIns="90000" rIns="90000" tIns="38880" bIns="38880" anchor="ctr">
             <a:noAutofit/>
           </a:bodyPr>
           <a:p>
@@ -3107,7 +3107,7 @@
         <p:spPr>
           <a:xfrm flipH="1" flipV="1">
             <a:off x="2180880" y="-2116800"/>
-            <a:ext cx="443880" cy="2547000"/>
+            <a:ext cx="443520" cy="2546640"/>
           </a:xfrm>
           <a:prstGeom prst="rect">
             <a:avLst/>
@@ -3115,7 +3115,7 @@
           <a:blipFill rotWithShape="0">
             <a:blip r:embed="rId7"/>
             <a:srcRect/>
-            <a:tile tx="0" ty="0" sx="61702" sy="61702" algn="ctr"/>
+            <a:tile tx="0" ty="0" sx="61347" sy="61347" algn="ctr"/>
           </a:blipFill>
           <a:ln w="0">
             <a:noFill/>
@@ -3156,7 +3156,7 @@
         <p:spPr>
           <a:xfrm>
             <a:off x="3474720" y="2560320"/>
-            <a:ext cx="2729880" cy="2729880"/>
+            <a:ext cx="2729520" cy="2729520"/>
           </a:xfrm>
           <a:prstGeom prst="ellipse">
             <a:avLst/>
@@ -3505,7 +3505,7 @@
         <p:spPr>
           <a:xfrm>
             <a:off x="822960" y="2468880"/>
-            <a:ext cx="1449720" cy="1449720"/>
+            <a:ext cx="1449360" cy="1449360"/>
           </a:xfrm>
           <a:prstGeom prst="ellipse">
             <a:avLst/>
@@ -3559,7 +3559,7 @@
         <p:spPr>
           <a:xfrm>
             <a:off x="4480560" y="1554480"/>
-            <a:ext cx="1449720" cy="1449720"/>
+            <a:ext cx="1449360" cy="1449360"/>
           </a:xfrm>
           <a:prstGeom prst="ellipse">
             <a:avLst/>
@@ -3613,7 +3613,7 @@
         <p:spPr>
           <a:xfrm>
             <a:off x="6583680" y="3108960"/>
-            <a:ext cx="1449720" cy="1449720"/>
+            <a:ext cx="1449360" cy="1449360"/>
           </a:xfrm>
           <a:prstGeom prst="ellipse">
             <a:avLst/>
@@ -3667,15 +3667,15 @@
         <p:spPr>
           <a:xfrm>
             <a:off x="1554480" y="4114800"/>
-            <a:ext cx="901080" cy="644040"/>
+            <a:ext cx="900720" cy="643680"/>
           </a:xfrm>
           <a:custGeom>
             <a:avLst/>
             <a:gdLst>
-              <a:gd name="textAreaLeft" fmla="*/ 0 w 901080"/>
-              <a:gd name="textAreaRight" fmla="*/ 914400 w 901080"/>
-              <a:gd name="textAreaTop" fmla="*/ 0 h 644040"/>
-              <a:gd name="textAreaBottom" fmla="*/ 657360 h 644040"/>
+              <a:gd name="textAreaLeft" fmla="*/ 0 w 900720"/>
+              <a:gd name="textAreaRight" fmla="*/ 914400 w 900720"/>
+              <a:gd name="textAreaTop" fmla="*/ 0 h 643680"/>
+              <a:gd name="textAreaBottom" fmla="*/ 657360 h 643680"/>
             </a:gdLst>
             <a:ahLst/>
             <a:rect l="textAreaLeft" t="textAreaTop" r="textAreaRight" b="textAreaBottom"/>
@@ -3738,15 +3738,15 @@
         <p:spPr>
           <a:xfrm>
             <a:off x="3657600" y="1188720"/>
-            <a:ext cx="809640" cy="626760"/>
+            <a:ext cx="809280" cy="626400"/>
           </a:xfrm>
           <a:custGeom>
             <a:avLst/>
             <a:gdLst>
-              <a:gd name="textAreaLeft" fmla="*/ 0 w 809640"/>
-              <a:gd name="textAreaRight" fmla="*/ 822960 w 809640"/>
-              <a:gd name="textAreaTop" fmla="*/ 0 h 626760"/>
-              <a:gd name="textAreaBottom" fmla="*/ 640080 h 626760"/>
+              <a:gd name="textAreaLeft" fmla="*/ 0 w 809280"/>
+              <a:gd name="textAreaRight" fmla="*/ 822960 w 809280"/>
+              <a:gd name="textAreaTop" fmla="*/ 0 h 626400"/>
+              <a:gd name="textAreaBottom" fmla="*/ 640080 h 626400"/>
             </a:gdLst>
             <a:ahLst/>
             <a:rect l="textAreaLeft" t="textAreaTop" r="textAreaRight" b="textAreaBottom"/>
@@ -3809,15 +3809,15 @@
         <p:spPr>
           <a:xfrm>
             <a:off x="7955280" y="2011680"/>
-            <a:ext cx="1450800" cy="1175400"/>
+            <a:ext cx="1450440" cy="1175040"/>
           </a:xfrm>
           <a:custGeom>
             <a:avLst/>
             <a:gdLst>
-              <a:gd name="textAreaLeft" fmla="*/ 0 w 1450800"/>
-              <a:gd name="textAreaRight" fmla="*/ 1464120 w 1450800"/>
-              <a:gd name="textAreaTop" fmla="*/ 0 h 1175400"/>
-              <a:gd name="textAreaBottom" fmla="*/ 1188720 h 1175400"/>
+              <a:gd name="textAreaLeft" fmla="*/ 0 w 1450440"/>
+              <a:gd name="textAreaRight" fmla="*/ 1464120 w 1450440"/>
+              <a:gd name="textAreaTop" fmla="*/ 0 h 1175040"/>
+              <a:gd name="textAreaBottom" fmla="*/ 1188720 h 1175040"/>
             </a:gdLst>
             <a:ahLst/>
             <a:rect l="textAreaLeft" t="textAreaTop" r="textAreaRight" b="textAreaBottom"/>
@@ -3885,7 +3885,7 @@
         <p:spPr>
           <a:xfrm>
             <a:off x="2468880" y="822960"/>
-            <a:ext cx="1397160" cy="1358280"/>
+            <a:ext cx="1396800" cy="1357920"/>
           </a:xfrm>
           <a:prstGeom prst="ellipse">
             <a:avLst/>
@@ -3934,7 +3934,7 @@
         <p:spPr>
           <a:xfrm>
             <a:off x="3931920" y="4663440"/>
-            <a:ext cx="1671480" cy="1632600"/>
+            <a:ext cx="1671120" cy="1632240"/>
           </a:xfrm>
           <a:prstGeom prst="ellipse">
             <a:avLst/>
@@ -3983,7 +3983,7 @@
         <p:spPr>
           <a:xfrm>
             <a:off x="8412480" y="1280160"/>
-            <a:ext cx="1083960" cy="992520"/>
+            <a:ext cx="1083600" cy="992160"/>
           </a:xfrm>
           <a:prstGeom prst="ellipse">
             <a:avLst/>
@@ -4058,7 +4058,7 @@
         <p:spPr>
           <a:xfrm>
             <a:off x="2103480" y="3658320"/>
-            <a:ext cx="1632600" cy="1632600"/>
+            <a:ext cx="1632240" cy="1632240"/>
           </a:xfrm>
           <a:prstGeom prst="ellipse">
             <a:avLst/>
@@ -4107,7 +4107,7 @@
         <p:spPr>
           <a:xfrm>
             <a:off x="823320" y="-273240"/>
-            <a:ext cx="2181240" cy="2181240"/>
+            <a:ext cx="2180880" cy="2180880"/>
           </a:xfrm>
           <a:prstGeom prst="ellipse">
             <a:avLst/>
@@ -4156,7 +4156,7 @@
         <p:spPr>
           <a:xfrm>
             <a:off x="7955640" y="3109680"/>
-            <a:ext cx="2181240" cy="2181240"/>
+            <a:ext cx="2180880" cy="2180880"/>
           </a:xfrm>
           <a:prstGeom prst="ellipse">
             <a:avLst/>
@@ -4205,7 +4205,7 @@
         <p:spPr>
           <a:xfrm>
             <a:off x="9601560" y="915120"/>
-            <a:ext cx="1632600" cy="1632600"/>
+            <a:ext cx="1632240" cy="1632240"/>
           </a:xfrm>
           <a:prstGeom prst="ellipse">
             <a:avLst/>
@@ -4253,10 +4253,10 @@
         </p:nvGrpSpPr>
         <p:grpSpPr>
           <a:xfrm>
-            <a:off x="3908520" y="750600"/>
-            <a:ext cx="2423160" cy="4325400"/>
-            <a:chOff x="3908520" y="750600"/>
-            <a:chExt cx="2423160" cy="4325400"/>
+            <a:off x="3908160" y="749880"/>
+            <a:ext cx="2422800" cy="4325040"/>
+            <a:chOff x="3908160" y="749880"/>
+            <a:chExt cx="2422800" cy="4325040"/>
           </a:xfrm>
         </p:grpSpPr>
         <p:sp>
@@ -4267,8 +4267,8 @@
           </p:nvSpPr>
           <p:spPr>
             <a:xfrm flipH="1" flipV="1" rot="5330400">
-              <a:off x="4845240" y="3351240"/>
-              <a:ext cx="1358280" cy="1452960"/>
+              <a:off x="4845240" y="3350880"/>
+              <a:ext cx="1357920" cy="1452600"/>
             </a:xfrm>
             <a:prstGeom prst="parallelogram">
               <a:avLst>
@@ -4316,8 +4316,8 @@
           </p:nvSpPr>
           <p:spPr>
             <a:xfrm flipH="1" flipV="1" rot="5330400">
-              <a:off x="4014720" y="2313000"/>
-              <a:ext cx="1358280" cy="1452960"/>
+              <a:off x="4014720" y="2312640"/>
+              <a:ext cx="1357920" cy="1452600"/>
             </a:xfrm>
             <a:prstGeom prst="parallelogram">
               <a:avLst>
@@ -4365,8 +4365,8 @@
           </p:nvSpPr>
           <p:spPr>
             <a:xfrm flipH="1" flipV="1" rot="5330400">
-              <a:off x="4911840" y="2048760"/>
-              <a:ext cx="1358280" cy="1452960"/>
+              <a:off x="4911840" y="2048400"/>
+              <a:ext cx="1357920" cy="1452600"/>
             </a:xfrm>
             <a:prstGeom prst="parallelogram">
               <a:avLst>
@@ -4414,8 +4414,8 @@
           </p:nvSpPr>
           <p:spPr>
             <a:xfrm flipH="1" flipV="1" rot="5330400">
-              <a:off x="3968640" y="955080"/>
-              <a:ext cx="1358280" cy="1452960"/>
+              <a:off x="3968640" y="954720"/>
+              <a:ext cx="1357920" cy="1452600"/>
             </a:xfrm>
             <a:prstGeom prst="parallelogram">
               <a:avLst>
@@ -4463,8 +4463,8 @@
           </p:nvSpPr>
           <p:spPr>
             <a:xfrm flipH="1" flipV="1" rot="5330400">
-              <a:off x="4902840" y="717120"/>
-              <a:ext cx="1358280" cy="1452960"/>
+              <a:off x="4902840" y="716760"/>
+              <a:ext cx="1357920" cy="1452600"/>
             </a:xfrm>
             <a:prstGeom prst="parallelogram">
               <a:avLst>
@@ -4512,8 +4512,8 @@
           </p:nvSpPr>
           <p:spPr>
             <a:xfrm flipH="1" flipV="1" rot="5330400">
-              <a:off x="4023360" y="3655440"/>
-              <a:ext cx="1358280" cy="1452960"/>
+              <a:off x="4023360" y="3655080"/>
+              <a:ext cx="1357920" cy="1452600"/>
             </a:xfrm>
             <a:prstGeom prst="parallelogram">
               <a:avLst>
@@ -4589,7 +4589,7 @@
         <p:spPr>
           <a:xfrm>
             <a:off x="6411960" y="1300320"/>
-            <a:ext cx="848520" cy="169560"/>
+            <a:ext cx="848160" cy="169200"/>
           </a:xfrm>
           <a:prstGeom prst="rect">
             <a:avLst/>
@@ -4643,7 +4643,7 @@
         <p:spPr>
           <a:xfrm>
             <a:off x="5813280" y="3854880"/>
-            <a:ext cx="848520" cy="169560"/>
+            <a:ext cx="848160" cy="169200"/>
           </a:xfrm>
           <a:prstGeom prst="rect">
             <a:avLst/>
@@ -4697,7 +4697,7 @@
         <p:spPr>
           <a:xfrm>
             <a:off x="7589520" y="2560320"/>
-            <a:ext cx="2181240" cy="2181240"/>
+            <a:ext cx="2180880" cy="2180880"/>
           </a:xfrm>
           <a:prstGeom prst="ellipse">
             <a:avLst/>
@@ -4746,7 +4746,7 @@
         <p:spPr>
           <a:xfrm>
             <a:off x="3200400" y="731520"/>
-            <a:ext cx="1671480" cy="1632600"/>
+            <a:ext cx="1671120" cy="1632240"/>
           </a:xfrm>
           <a:prstGeom prst="ellipse">
             <a:avLst/>
@@ -4795,7 +4795,7 @@
         <p:spPr>
           <a:xfrm>
             <a:off x="1424160" y="3489120"/>
-            <a:ext cx="1671480" cy="1632600"/>
+            <a:ext cx="1671120" cy="1632240"/>
           </a:xfrm>
           <a:prstGeom prst="ellipse">
             <a:avLst/>
@@ -4844,15 +4844,15 @@
         <p:spPr>
           <a:xfrm>
             <a:off x="700920" y="1900080"/>
-            <a:ext cx="1388880" cy="1835640"/>
+            <a:ext cx="1388520" cy="1835280"/>
           </a:xfrm>
           <a:custGeom>
             <a:avLst/>
             <a:gdLst>
-              <a:gd name="textAreaLeft" fmla="*/ 0 w 1388880"/>
-              <a:gd name="textAreaRight" fmla="*/ 1402200 w 1388880"/>
-              <a:gd name="textAreaTop" fmla="*/ 0 h 1835640"/>
-              <a:gd name="textAreaBottom" fmla="*/ 1848960 h 1835640"/>
+              <a:gd name="textAreaLeft" fmla="*/ 0 w 1388520"/>
+              <a:gd name="textAreaRight" fmla="*/ 1402200 w 1388520"/>
+              <a:gd name="textAreaTop" fmla="*/ 0 h 1835280"/>
+              <a:gd name="textAreaBottom" fmla="*/ 1848960 h 1835280"/>
             </a:gdLst>
             <a:ahLst/>
             <a:rect l="textAreaLeft" t="textAreaTop" r="textAreaRight" b="textAreaBottom"/>
@@ -4917,15 +4917,15 @@
         <p:spPr>
           <a:xfrm>
             <a:off x="3931920" y="2011680"/>
-            <a:ext cx="962640" cy="1358280"/>
+            <a:ext cx="962280" cy="1357920"/>
           </a:xfrm>
           <a:custGeom>
             <a:avLst/>
             <a:gdLst>
-              <a:gd name="textAreaLeft" fmla="*/ 0 w 962640"/>
-              <a:gd name="textAreaRight" fmla="*/ 975960 w 962640"/>
-              <a:gd name="textAreaTop" fmla="*/ 0 h 1358280"/>
-              <a:gd name="textAreaBottom" fmla="*/ 1371600 h 1358280"/>
+              <a:gd name="textAreaLeft" fmla="*/ 0 w 962280"/>
+              <a:gd name="textAreaRight" fmla="*/ 975960 w 962280"/>
+              <a:gd name="textAreaTop" fmla="*/ 0 h 1357920"/>
+              <a:gd name="textAreaBottom" fmla="*/ 1371600 h 1357920"/>
             </a:gdLst>
             <a:ahLst/>
             <a:rect l="textAreaLeft" t="textAreaTop" r="textAreaRight" b="textAreaBottom"/>
@@ -5000,15 +5000,15 @@
         <p:spPr>
           <a:xfrm>
             <a:off x="7724880" y="2103120"/>
-            <a:ext cx="765720" cy="1449720"/>
+            <a:ext cx="765360" cy="1449360"/>
           </a:xfrm>
           <a:custGeom>
             <a:avLst/>
             <a:gdLst>
-              <a:gd name="textAreaLeft" fmla="*/ 0 w 765720"/>
-              <a:gd name="textAreaRight" fmla="*/ 779040 w 765720"/>
-              <a:gd name="textAreaTop" fmla="*/ 0 h 1449720"/>
-              <a:gd name="textAreaBottom" fmla="*/ 1463040 h 1449720"/>
+              <a:gd name="textAreaLeft" fmla="*/ 0 w 765360"/>
+              <a:gd name="textAreaRight" fmla="*/ 779040 w 765360"/>
+              <a:gd name="textAreaTop" fmla="*/ 0 h 1449360"/>
+              <a:gd name="textAreaBottom" fmla="*/ 1463040 h 1449360"/>
             </a:gdLst>
             <a:ahLst/>
             <a:rect l="textAreaLeft" t="textAreaTop" r="textAreaRight" b="textAreaBottom"/>
@@ -5083,7 +5083,7 @@
         <p:spPr>
           <a:xfrm>
             <a:off x="1424160" y="4754880"/>
-            <a:ext cx="848520" cy="169560"/>
+            <a:ext cx="848160" cy="169200"/>
           </a:xfrm>
           <a:prstGeom prst="rect">
             <a:avLst/>
@@ -5137,7 +5137,7 @@
         <p:spPr>
           <a:xfrm>
             <a:off x="2887200" y="1300320"/>
-            <a:ext cx="848520" cy="169560"/>
+            <a:ext cx="848160" cy="169200"/>
           </a:xfrm>
           <a:prstGeom prst="rect">
             <a:avLst/>
@@ -5217,9 +5217,9 @@
         <p:grpSpPr>
           <a:xfrm>
             <a:off x="3570480" y="1225440"/>
-            <a:ext cx="5107320" cy="2912760"/>
+            <a:ext cx="5106960" cy="2912400"/>
             <a:chOff x="3570480" y="1225440"/>
-            <a:chExt cx="5107320" cy="2912760"/>
+            <a:chExt cx="5106960" cy="2912400"/>
           </a:xfrm>
         </p:grpSpPr>
         <p:sp>
@@ -5231,7 +5231,7 @@
           <p:spPr>
             <a:xfrm>
               <a:off x="3570480" y="1528200"/>
-              <a:ext cx="4914000" cy="2610000"/>
+              <a:ext cx="4913640" cy="2609640"/>
             </a:xfrm>
             <a:prstGeom prst="rect">
               <a:avLst/>
@@ -5278,7 +5278,7 @@
           <p:spPr>
             <a:xfrm>
               <a:off x="3763800" y="1225440"/>
-              <a:ext cx="4914000" cy="2610000"/>
+              <a:ext cx="4913640" cy="2609640"/>
             </a:xfrm>
             <a:prstGeom prst="rect">
               <a:avLst/>
@@ -5326,10 +5326,10 @@
         </p:nvGrpSpPr>
         <p:grpSpPr>
           <a:xfrm>
-            <a:off x="-2067840" y="-402120"/>
-            <a:ext cx="4907160" cy="8507880"/>
-            <a:chOff x="-2067840" y="-402120"/>
-            <a:chExt cx="4907160" cy="8507880"/>
+            <a:off x="-2067480" y="-402120"/>
+            <a:ext cx="4906440" cy="8507520"/>
+            <a:chOff x="-2067480" y="-402120"/>
+            <a:chExt cx="4906440" cy="8507520"/>
           </a:xfrm>
         </p:grpSpPr>
         <p:sp>
@@ -5341,15 +5341,15 @@
           <p:spPr>
             <a:xfrm>
               <a:off x="-893160" y="4486680"/>
-              <a:ext cx="1059840" cy="753120"/>
+              <a:ext cx="1059480" cy="752760"/>
             </a:xfrm>
             <a:custGeom>
               <a:avLst/>
               <a:gdLst>
-                <a:gd name="textAreaLeft" fmla="*/ 278280 w 1059840"/>
-                <a:gd name="textAreaRight" fmla="*/ 794880 w 1059840"/>
-                <a:gd name="textAreaTop" fmla="*/ 258840 h 753120"/>
-                <a:gd name="textAreaBottom" fmla="*/ 507600 h 753120"/>
+                <a:gd name="textAreaLeft" fmla="*/ 278280 w 1059480"/>
+                <a:gd name="textAreaRight" fmla="*/ 794880 w 1059480"/>
+                <a:gd name="textAreaTop" fmla="*/ 258840 h 752760"/>
+                <a:gd name="textAreaBottom" fmla="*/ 507600 h 752760"/>
               </a:gdLst>
               <a:ahLst/>
               <a:rect l="textAreaLeft" t="textAreaTop" r="textAreaRight" b="textAreaBottom"/>
@@ -5744,16 +5744,16 @@
           </p:nvSpPr>
           <p:spPr>
             <a:xfrm rot="5358000">
-              <a:off x="-871560" y="5140080"/>
-              <a:ext cx="1055520" cy="753120"/>
+              <a:off x="-871200" y="5139720"/>
+              <a:ext cx="1055160" cy="752760"/>
             </a:xfrm>
             <a:custGeom>
               <a:avLst/>
               <a:gdLst>
-                <a:gd name="textAreaLeft" fmla="*/ 277200 w 1055520"/>
-                <a:gd name="textAreaRight" fmla="*/ 792000 w 1055520"/>
-                <a:gd name="textAreaTop" fmla="*/ 258840 h 753120"/>
-                <a:gd name="textAreaBottom" fmla="*/ 507600 h 753120"/>
+                <a:gd name="textAreaLeft" fmla="*/ 277200 w 1055160"/>
+                <a:gd name="textAreaRight" fmla="*/ 792000 w 1055160"/>
+                <a:gd name="textAreaTop" fmla="*/ 258840 h 752760"/>
+                <a:gd name="textAreaBottom" fmla="*/ 507600 h 752760"/>
               </a:gdLst>
               <a:ahLst/>
               <a:rect l="textAreaLeft" t="textAreaTop" r="textAreaRight" b="textAreaBottom"/>
@@ -6149,15 +6149,15 @@
           <p:spPr>
             <a:xfrm>
               <a:off x="-228960" y="5161680"/>
-              <a:ext cx="1059840" cy="753120"/>
+              <a:ext cx="1059480" cy="752760"/>
             </a:xfrm>
             <a:custGeom>
               <a:avLst/>
               <a:gdLst>
-                <a:gd name="textAreaLeft" fmla="*/ 278280 w 1059840"/>
-                <a:gd name="textAreaRight" fmla="*/ 794880 w 1059840"/>
-                <a:gd name="textAreaTop" fmla="*/ 258840 h 753120"/>
-                <a:gd name="textAreaBottom" fmla="*/ 507600 h 753120"/>
+                <a:gd name="textAreaLeft" fmla="*/ 278280 w 1059480"/>
+                <a:gd name="textAreaRight" fmla="*/ 794880 w 1059480"/>
+                <a:gd name="textAreaTop" fmla="*/ 258840 h 752760"/>
+                <a:gd name="textAreaBottom" fmla="*/ 507600 h 752760"/>
               </a:gdLst>
               <a:ahLst/>
               <a:rect l="textAreaLeft" t="textAreaTop" r="textAreaRight" b="textAreaBottom"/>
@@ -6552,16 +6552,16 @@
           </p:nvSpPr>
           <p:spPr>
             <a:xfrm rot="5358000">
-              <a:off x="-205920" y="4488840"/>
-              <a:ext cx="1055160" cy="753120"/>
+              <a:off x="-205200" y="4488840"/>
+              <a:ext cx="1054800" cy="752760"/>
             </a:xfrm>
             <a:custGeom>
               <a:avLst/>
               <a:gdLst>
-                <a:gd name="textAreaLeft" fmla="*/ 276840 w 1055160"/>
-                <a:gd name="textAreaRight" fmla="*/ 791640 w 1055160"/>
-                <a:gd name="textAreaTop" fmla="*/ 258840 h 753120"/>
-                <a:gd name="textAreaBottom" fmla="*/ 507600 h 753120"/>
+                <a:gd name="textAreaLeft" fmla="*/ 276840 w 1054800"/>
+                <a:gd name="textAreaRight" fmla="*/ 791640 w 1054800"/>
+                <a:gd name="textAreaTop" fmla="*/ 258840 h 752760"/>
+                <a:gd name="textAreaBottom" fmla="*/ 507600 h 752760"/>
               </a:gdLst>
               <a:ahLst/>
               <a:rect l="textAreaLeft" t="textAreaTop" r="textAreaRight" b="textAreaBottom"/>
@@ -6957,15 +6957,15 @@
           <p:spPr>
             <a:xfrm>
               <a:off x="-228960" y="3826080"/>
-              <a:ext cx="1059840" cy="753120"/>
+              <a:ext cx="1059480" cy="752760"/>
             </a:xfrm>
             <a:custGeom>
               <a:avLst/>
               <a:gdLst>
-                <a:gd name="textAreaLeft" fmla="*/ 278280 w 1059840"/>
-                <a:gd name="textAreaRight" fmla="*/ 794880 w 1059840"/>
-                <a:gd name="textAreaTop" fmla="*/ 258840 h 753120"/>
-                <a:gd name="textAreaBottom" fmla="*/ 507600 h 753120"/>
+                <a:gd name="textAreaLeft" fmla="*/ 278280 w 1059480"/>
+                <a:gd name="textAreaRight" fmla="*/ 794880 w 1059480"/>
+                <a:gd name="textAreaTop" fmla="*/ 258840 h 752760"/>
+                <a:gd name="textAreaBottom" fmla="*/ 507600 h 752760"/>
               </a:gdLst>
               <a:ahLst/>
               <a:rect l="textAreaLeft" t="textAreaTop" r="textAreaRight" b="textAreaBottom"/>
@@ -7313,7 +7313,7 @@
             <a:blipFill rotWithShape="0">
               <a:blip r:embed="rId2"/>
               <a:srcRect/>
-              <a:tile tx="0" ty="0" sx="61702" sy="61702" algn="ctr"/>
+              <a:tile tx="0" ty="0" sx="61347" sy="61347" algn="ctr"/>
             </a:blipFill>
             <a:ln w="0">
               <a:solidFill>
@@ -7362,16 +7362,16 @@
           </p:nvSpPr>
           <p:spPr>
             <a:xfrm rot="5358000">
-              <a:off x="-1560240" y="4481280"/>
-              <a:ext cx="1055520" cy="753120"/>
+              <a:off x="-1559880" y="4480920"/>
+              <a:ext cx="1055160" cy="752760"/>
             </a:xfrm>
             <a:custGeom>
               <a:avLst/>
               <a:gdLst>
-                <a:gd name="textAreaLeft" fmla="*/ 277200 w 1055520"/>
-                <a:gd name="textAreaRight" fmla="*/ 792000 w 1055520"/>
-                <a:gd name="textAreaTop" fmla="*/ 258840 h 753120"/>
-                <a:gd name="textAreaBottom" fmla="*/ 507600 h 753120"/>
+                <a:gd name="textAreaLeft" fmla="*/ 277200 w 1055160"/>
+                <a:gd name="textAreaRight" fmla="*/ 792000 w 1055160"/>
+                <a:gd name="textAreaTop" fmla="*/ 258840 h 752760"/>
+                <a:gd name="textAreaBottom" fmla="*/ 507600 h 752760"/>
               </a:gdLst>
               <a:ahLst/>
               <a:rect l="textAreaLeft" t="textAreaTop" r="textAreaRight" b="textAreaBottom"/>
@@ -7719,7 +7719,7 @@
             <a:blipFill rotWithShape="0">
               <a:blip r:embed="rId3"/>
               <a:srcRect/>
-              <a:tile tx="0" ty="0" sx="61702" sy="61702" algn="ctr"/>
+              <a:tile tx="0" ty="0" sx="61347" sy="61347" algn="ctr"/>
             </a:blipFill>
             <a:ln w="0">
               <a:solidFill>
@@ -7768,16 +7768,16 @@
           </p:nvSpPr>
           <p:spPr>
             <a:xfrm rot="5358000">
-              <a:off x="-2212560" y="5157360"/>
-              <a:ext cx="1055520" cy="753120"/>
+              <a:off x="-2212200" y="5157000"/>
+              <a:ext cx="1055160" cy="752760"/>
             </a:xfrm>
             <a:custGeom>
               <a:avLst/>
               <a:gdLst>
-                <a:gd name="textAreaLeft" fmla="*/ 277200 w 1055520"/>
-                <a:gd name="textAreaRight" fmla="*/ 792000 w 1055520"/>
-                <a:gd name="textAreaTop" fmla="*/ 258840 h 753120"/>
-                <a:gd name="textAreaBottom" fmla="*/ 507600 h 753120"/>
+                <a:gd name="textAreaLeft" fmla="*/ 277200 w 1055160"/>
+                <a:gd name="textAreaRight" fmla="*/ 792000 w 1055160"/>
+                <a:gd name="textAreaTop" fmla="*/ 258840 h 752760"/>
+                <a:gd name="textAreaBottom" fmla="*/ 507600 h 752760"/>
               </a:gdLst>
               <a:ahLst/>
               <a:rect l="textAreaLeft" t="textAreaTop" r="textAreaRight" b="textAreaBottom"/>
@@ -8172,16 +8172,16 @@
           </p:nvSpPr>
           <p:spPr>
             <a:xfrm rot="5358000">
-              <a:off x="-871200" y="3808080"/>
-              <a:ext cx="1055520" cy="753120"/>
+              <a:off x="-870840" y="3807720"/>
+              <a:ext cx="1055160" cy="752760"/>
             </a:xfrm>
             <a:custGeom>
               <a:avLst/>
               <a:gdLst>
-                <a:gd name="textAreaLeft" fmla="*/ 277200 w 1055520"/>
-                <a:gd name="textAreaRight" fmla="*/ 792000 w 1055520"/>
-                <a:gd name="textAreaTop" fmla="*/ 258840 h 753120"/>
-                <a:gd name="textAreaBottom" fmla="*/ 507600 h 753120"/>
+                <a:gd name="textAreaLeft" fmla="*/ 277200 w 1055160"/>
+                <a:gd name="textAreaRight" fmla="*/ 792000 w 1055160"/>
+                <a:gd name="textAreaTop" fmla="*/ 258840 h 752760"/>
+                <a:gd name="textAreaBottom" fmla="*/ 507600 h 752760"/>
               </a:gdLst>
               <a:ahLst/>
               <a:rect l="textAreaLeft" t="textAreaTop" r="textAreaRight" b="textAreaBottom"/>
@@ -8576,16 +8576,16 @@
           </p:nvSpPr>
           <p:spPr>
             <a:xfrm rot="5358000">
-              <a:off x="-196200" y="3141360"/>
-              <a:ext cx="1055520" cy="753120"/>
+              <a:off x="-195840" y="3141000"/>
+              <a:ext cx="1055160" cy="752760"/>
             </a:xfrm>
             <a:custGeom>
               <a:avLst/>
               <a:gdLst>
-                <a:gd name="textAreaLeft" fmla="*/ 277200 w 1055520"/>
-                <a:gd name="textAreaRight" fmla="*/ 792000 w 1055520"/>
-                <a:gd name="textAreaTop" fmla="*/ 258840 h 753120"/>
-                <a:gd name="textAreaBottom" fmla="*/ 507600 h 753120"/>
+                <a:gd name="textAreaLeft" fmla="*/ 277200 w 1055160"/>
+                <a:gd name="textAreaRight" fmla="*/ 792000 w 1055160"/>
+                <a:gd name="textAreaTop" fmla="*/ 258840 h 752760"/>
+                <a:gd name="textAreaBottom" fmla="*/ 507600 h 752760"/>
               </a:gdLst>
               <a:ahLst/>
               <a:rect l="textAreaLeft" t="textAreaTop" r="textAreaRight" b="textAreaBottom"/>
@@ -8981,15 +8981,15 @@
           <p:spPr>
             <a:xfrm>
               <a:off x="455040" y="4477680"/>
-              <a:ext cx="1059840" cy="753120"/>
+              <a:ext cx="1059480" cy="752760"/>
             </a:xfrm>
             <a:custGeom>
               <a:avLst/>
               <a:gdLst>
-                <a:gd name="textAreaLeft" fmla="*/ 278280 w 1059840"/>
-                <a:gd name="textAreaRight" fmla="*/ 794880 w 1059840"/>
-                <a:gd name="textAreaTop" fmla="*/ 258840 h 753120"/>
-                <a:gd name="textAreaBottom" fmla="*/ 507600 h 753120"/>
+                <a:gd name="textAreaLeft" fmla="*/ 278280 w 1059480"/>
+                <a:gd name="textAreaRight" fmla="*/ 794880 w 1059480"/>
+                <a:gd name="textAreaTop" fmla="*/ 258840 h 752760"/>
+                <a:gd name="textAreaBottom" fmla="*/ 507600 h 752760"/>
               </a:gdLst>
               <a:ahLst/>
               <a:rect l="textAreaLeft" t="textAreaTop" r="textAreaRight" b="textAreaBottom"/>
@@ -9384,16 +9384,16 @@
           </p:nvSpPr>
           <p:spPr>
             <a:xfrm rot="5358000">
-              <a:off x="483120" y="3808080"/>
-              <a:ext cx="1055520" cy="753120"/>
+              <a:off x="483120" y="3807720"/>
+              <a:ext cx="1055160" cy="752760"/>
             </a:xfrm>
             <a:custGeom>
               <a:avLst/>
               <a:gdLst>
-                <a:gd name="textAreaLeft" fmla="*/ 277200 w 1055520"/>
-                <a:gd name="textAreaRight" fmla="*/ 792000 w 1055520"/>
-                <a:gd name="textAreaTop" fmla="*/ 258840 h 753120"/>
-                <a:gd name="textAreaBottom" fmla="*/ 507600 h 753120"/>
+                <a:gd name="textAreaLeft" fmla="*/ 277200 w 1055160"/>
+                <a:gd name="textAreaRight" fmla="*/ 792000 w 1055160"/>
+                <a:gd name="textAreaTop" fmla="*/ 258840 h 752760"/>
+                <a:gd name="textAreaBottom" fmla="*/ 507600 h 752760"/>
               </a:gdLst>
               <a:ahLst/>
               <a:rect l="textAreaLeft" t="textAreaTop" r="textAreaRight" b="textAreaBottom"/>
@@ -9789,15 +9789,15 @@
           <p:spPr>
             <a:xfrm>
               <a:off x="1158840" y="5170680"/>
-              <a:ext cx="1059840" cy="753120"/>
+              <a:ext cx="1059480" cy="752760"/>
             </a:xfrm>
             <a:custGeom>
               <a:avLst/>
               <a:gdLst>
-                <a:gd name="textAreaLeft" fmla="*/ 278280 w 1059840"/>
-                <a:gd name="textAreaRight" fmla="*/ 794880 w 1059840"/>
-                <a:gd name="textAreaTop" fmla="*/ 258840 h 753120"/>
-                <a:gd name="textAreaBottom" fmla="*/ 507600 h 753120"/>
+                <a:gd name="textAreaLeft" fmla="*/ 278280 w 1059480"/>
+                <a:gd name="textAreaRight" fmla="*/ 794880 w 1059480"/>
+                <a:gd name="textAreaTop" fmla="*/ 258840 h 752760"/>
+                <a:gd name="textAreaBottom" fmla="*/ 507600 h 752760"/>
               </a:gdLst>
               <a:ahLst/>
               <a:rect l="textAreaLeft" t="textAreaTop" r="textAreaRight" b="textAreaBottom"/>
@@ -10193,15 +10193,15 @@
           <p:spPr>
             <a:xfrm>
               <a:off x="-1561680" y="5162760"/>
-              <a:ext cx="1059840" cy="753120"/>
+              <a:ext cx="1059480" cy="752760"/>
             </a:xfrm>
             <a:custGeom>
               <a:avLst/>
               <a:gdLst>
-                <a:gd name="textAreaLeft" fmla="*/ 278280 w 1059840"/>
-                <a:gd name="textAreaRight" fmla="*/ 794880 w 1059840"/>
-                <a:gd name="textAreaTop" fmla="*/ 258840 h 753120"/>
-                <a:gd name="textAreaBottom" fmla="*/ 507600 h 753120"/>
+                <a:gd name="textAreaLeft" fmla="*/ 278280 w 1059480"/>
+                <a:gd name="textAreaRight" fmla="*/ 794880 w 1059480"/>
+                <a:gd name="textAreaTop" fmla="*/ 258840 h 752760"/>
+                <a:gd name="textAreaBottom" fmla="*/ 507600 h 752760"/>
               </a:gdLst>
               <a:ahLst/>
               <a:rect l="textAreaLeft" t="textAreaTop" r="textAreaRight" b="textAreaBottom"/>
@@ -10596,16 +10596,16 @@
           </p:nvSpPr>
           <p:spPr>
             <a:xfrm rot="5358000">
-              <a:off x="474120" y="5157360"/>
-              <a:ext cx="1055520" cy="753120"/>
+              <a:off x="474120" y="5157000"/>
+              <a:ext cx="1055160" cy="752760"/>
             </a:xfrm>
             <a:custGeom>
               <a:avLst/>
               <a:gdLst>
-                <a:gd name="textAreaLeft" fmla="*/ 277200 w 1055520"/>
-                <a:gd name="textAreaRight" fmla="*/ 792000 w 1055520"/>
-                <a:gd name="textAreaTop" fmla="*/ 258840 h 753120"/>
-                <a:gd name="textAreaBottom" fmla="*/ 507600 h 753120"/>
+                <a:gd name="textAreaLeft" fmla="*/ 277200 w 1055160"/>
+                <a:gd name="textAreaRight" fmla="*/ 792000 w 1055160"/>
+                <a:gd name="textAreaTop" fmla="*/ 258840 h 752760"/>
+                <a:gd name="textAreaBottom" fmla="*/ 507600 h 752760"/>
               </a:gdLst>
               <a:ahLst/>
               <a:rect l="textAreaLeft" t="textAreaTop" r="textAreaRight" b="textAreaBottom"/>
@@ -11000,16 +11000,16 @@
           </p:nvSpPr>
           <p:spPr>
             <a:xfrm flipH="1" rot="16242000">
-              <a:off x="-219600" y="1780560"/>
-              <a:ext cx="1055520" cy="753120"/>
+              <a:off x="-219960" y="1780200"/>
+              <a:ext cx="1055160" cy="752760"/>
             </a:xfrm>
             <a:custGeom>
               <a:avLst/>
               <a:gdLst>
-                <a:gd name="textAreaLeft" fmla="*/ 270360 w 1055520"/>
-                <a:gd name="textAreaRight" fmla="*/ 785160 w 1055520"/>
-                <a:gd name="textAreaTop" fmla="*/ 258840 h 753120"/>
-                <a:gd name="textAreaBottom" fmla="*/ 507600 h 753120"/>
+                <a:gd name="textAreaLeft" fmla="*/ 270000 w 1055160"/>
+                <a:gd name="textAreaRight" fmla="*/ 784800 w 1055160"/>
+                <a:gd name="textAreaTop" fmla="*/ 258840 h 752760"/>
+                <a:gd name="textAreaBottom" fmla="*/ 507600 h 752760"/>
               </a:gdLst>
               <a:ahLst/>
               <a:rect l="textAreaLeft" t="textAreaTop" r="textAreaRight" b="textAreaBottom"/>
@@ -11404,16 +11404,16 @@
           </p:nvSpPr>
           <p:spPr>
             <a:xfrm flipH="1" rot="16242000">
-              <a:off x="419040" y="2456640"/>
-              <a:ext cx="1055520" cy="753120"/>
+              <a:off x="418320" y="2456280"/>
+              <a:ext cx="1055160" cy="752760"/>
             </a:xfrm>
             <a:custGeom>
               <a:avLst/>
               <a:gdLst>
-                <a:gd name="textAreaLeft" fmla="*/ 270360 w 1055520"/>
-                <a:gd name="textAreaRight" fmla="*/ 785160 w 1055520"/>
-                <a:gd name="textAreaTop" fmla="*/ 258840 h 753120"/>
-                <a:gd name="textAreaBottom" fmla="*/ 507600 h 753120"/>
+                <a:gd name="textAreaLeft" fmla="*/ 270000 w 1055160"/>
+                <a:gd name="textAreaRight" fmla="*/ 784800 w 1055160"/>
+                <a:gd name="textAreaTop" fmla="*/ 258840 h 752760"/>
+                <a:gd name="textAreaBottom" fmla="*/ 507600 h 752760"/>
               </a:gdLst>
               <a:ahLst/>
               <a:rect l="textAreaLeft" t="textAreaTop" r="textAreaRight" b="textAreaBottom"/>
@@ -11808,16 +11808,16 @@
           </p:nvSpPr>
           <p:spPr>
             <a:xfrm flipH="1">
-              <a:off x="-259560" y="2462040"/>
-              <a:ext cx="1059840" cy="753120"/>
+              <a:off x="-260280" y="2462040"/>
+              <a:ext cx="1059480" cy="752760"/>
             </a:xfrm>
             <a:custGeom>
               <a:avLst/>
               <a:gdLst>
-                <a:gd name="textAreaLeft" fmla="*/ 285120 w 1059840"/>
-                <a:gd name="textAreaRight" fmla="*/ 801720 w 1059840"/>
-                <a:gd name="textAreaTop" fmla="*/ 258840 h 753120"/>
-                <a:gd name="textAreaBottom" fmla="*/ 507600 h 753120"/>
+                <a:gd name="textAreaLeft" fmla="*/ 285120 w 1059480"/>
+                <a:gd name="textAreaRight" fmla="*/ 801720 w 1059480"/>
+                <a:gd name="textAreaTop" fmla="*/ 258840 h 752760"/>
+                <a:gd name="textAreaBottom" fmla="*/ 507600 h 752760"/>
               </a:gdLst>
               <a:ahLst/>
               <a:rect l="textAreaLeft" t="textAreaTop" r="textAreaRight" b="textAreaBottom"/>
@@ -12213,15 +12213,15 @@
           <p:spPr>
             <a:xfrm>
               <a:off x="1107720" y="1135080"/>
-              <a:ext cx="1059840" cy="753120"/>
+              <a:ext cx="1059480" cy="752760"/>
             </a:xfrm>
             <a:custGeom>
               <a:avLst/>
               <a:gdLst>
-                <a:gd name="textAreaLeft" fmla="*/ 278280 w 1059840"/>
-                <a:gd name="textAreaRight" fmla="*/ 794880 w 1059840"/>
-                <a:gd name="textAreaTop" fmla="*/ 258840 h 753120"/>
-                <a:gd name="textAreaBottom" fmla="*/ 507600 h 753120"/>
+                <a:gd name="textAreaLeft" fmla="*/ 278280 w 1059480"/>
+                <a:gd name="textAreaRight" fmla="*/ 794880 w 1059480"/>
+                <a:gd name="textAreaTop" fmla="*/ 258840 h 752760"/>
+                <a:gd name="textAreaBottom" fmla="*/ 507600 h 752760"/>
               </a:gdLst>
               <a:ahLst/>
               <a:rect l="textAreaLeft" t="textAreaTop" r="textAreaRight" b="textAreaBottom"/>
@@ -12616,16 +12616,16 @@
           </p:nvSpPr>
           <p:spPr>
             <a:xfrm rot="5358000">
-              <a:off x="1115640" y="1788480"/>
-              <a:ext cx="1055520" cy="753120"/>
+              <a:off x="1115640" y="1788120"/>
+              <a:ext cx="1055160" cy="752760"/>
             </a:xfrm>
             <a:custGeom>
               <a:avLst/>
               <a:gdLst>
-                <a:gd name="textAreaLeft" fmla="*/ 277200 w 1055520"/>
-                <a:gd name="textAreaRight" fmla="*/ 792000 w 1055520"/>
-                <a:gd name="textAreaTop" fmla="*/ 258840 h 753120"/>
-                <a:gd name="textAreaBottom" fmla="*/ 507600 h 753120"/>
+                <a:gd name="textAreaLeft" fmla="*/ 277200 w 1055160"/>
+                <a:gd name="textAreaRight" fmla="*/ 792000 w 1055160"/>
+                <a:gd name="textAreaTop" fmla="*/ 258840 h 752760"/>
+                <a:gd name="textAreaBottom" fmla="*/ 507600 h 752760"/>
               </a:gdLst>
               <a:ahLst/>
               <a:rect l="textAreaLeft" t="textAreaTop" r="textAreaRight" b="textAreaBottom"/>
@@ -13020,16 +13020,16 @@
           </p:nvSpPr>
           <p:spPr>
             <a:xfrm rot="5358000">
-              <a:off x="426960" y="1129680"/>
-              <a:ext cx="1055520" cy="753120"/>
+              <a:off x="426960" y="1129320"/>
+              <a:ext cx="1055160" cy="752760"/>
             </a:xfrm>
             <a:custGeom>
               <a:avLst/>
               <a:gdLst>
-                <a:gd name="textAreaLeft" fmla="*/ 277200 w 1055520"/>
-                <a:gd name="textAreaRight" fmla="*/ 792000 w 1055520"/>
-                <a:gd name="textAreaTop" fmla="*/ 258840 h 753120"/>
-                <a:gd name="textAreaBottom" fmla="*/ 507600 h 753120"/>
+                <a:gd name="textAreaLeft" fmla="*/ 277200 w 1055160"/>
+                <a:gd name="textAreaRight" fmla="*/ 792000 w 1055160"/>
+                <a:gd name="textAreaTop" fmla="*/ 258840 h 752760"/>
+                <a:gd name="textAreaBottom" fmla="*/ 507600 h 752760"/>
               </a:gdLst>
               <a:ahLst/>
               <a:rect l="textAreaLeft" t="textAreaTop" r="textAreaRight" b="textAreaBottom"/>
@@ -13377,7 +13377,7 @@
             <a:blipFill rotWithShape="0">
               <a:blip r:embed="rId4"/>
               <a:srcRect/>
-              <a:tile tx="0" ty="0" sx="61702" sy="61702" algn="ctr"/>
+              <a:tile tx="0" ty="0" sx="61347" sy="61347" algn="ctr"/>
             </a:blipFill>
             <a:ln w="0">
               <a:solidFill>
@@ -13427,15 +13427,15 @@
           <p:spPr>
             <a:xfrm>
               <a:off x="439200" y="1811160"/>
-              <a:ext cx="1059840" cy="753120"/>
+              <a:ext cx="1059480" cy="752760"/>
             </a:xfrm>
             <a:custGeom>
               <a:avLst/>
               <a:gdLst>
-                <a:gd name="textAreaLeft" fmla="*/ 278280 w 1059840"/>
-                <a:gd name="textAreaRight" fmla="*/ 794880 w 1059840"/>
-                <a:gd name="textAreaTop" fmla="*/ 258840 h 753120"/>
-                <a:gd name="textAreaBottom" fmla="*/ 507600 h 753120"/>
+                <a:gd name="textAreaLeft" fmla="*/ 278280 w 1059480"/>
+                <a:gd name="textAreaRight" fmla="*/ 794880 w 1059480"/>
+                <a:gd name="textAreaTop" fmla="*/ 258840 h 752760"/>
+                <a:gd name="textAreaBottom" fmla="*/ 507600 h 752760"/>
               </a:gdLst>
               <a:ahLst/>
               <a:rect l="textAreaLeft" t="textAreaTop" r="textAreaRight" b="textAreaBottom"/>
@@ -13831,15 +13831,15 @@
           <p:spPr>
             <a:xfrm>
               <a:off x="423720" y="451080"/>
-              <a:ext cx="1059840" cy="753120"/>
+              <a:ext cx="1059480" cy="752760"/>
             </a:xfrm>
             <a:custGeom>
               <a:avLst/>
               <a:gdLst>
-                <a:gd name="textAreaLeft" fmla="*/ 278280 w 1059840"/>
-                <a:gd name="textAreaRight" fmla="*/ 794880 w 1059840"/>
-                <a:gd name="textAreaTop" fmla="*/ 258840 h 753120"/>
-                <a:gd name="textAreaBottom" fmla="*/ 507600 h 753120"/>
+                <a:gd name="textAreaLeft" fmla="*/ 278280 w 1059480"/>
+                <a:gd name="textAreaRight" fmla="*/ 794880 w 1059480"/>
+                <a:gd name="textAreaTop" fmla="*/ 258840 h 752760"/>
+                <a:gd name="textAreaBottom" fmla="*/ 507600 h 752760"/>
               </a:gdLst>
               <a:ahLst/>
               <a:rect l="textAreaLeft" t="textAreaTop" r="textAreaRight" b="textAreaBottom"/>
@@ -14234,16 +14234,16 @@
           </p:nvSpPr>
           <p:spPr>
             <a:xfrm rot="5358000">
-              <a:off x="-220680" y="425520"/>
-              <a:ext cx="1055520" cy="753120"/>
+              <a:off x="-220320" y="425160"/>
+              <a:ext cx="1055160" cy="752760"/>
             </a:xfrm>
             <a:custGeom>
               <a:avLst/>
               <a:gdLst>
-                <a:gd name="textAreaLeft" fmla="*/ 277200 w 1055520"/>
-                <a:gd name="textAreaRight" fmla="*/ 792000 w 1055520"/>
-                <a:gd name="textAreaTop" fmla="*/ 258840 h 753120"/>
-                <a:gd name="textAreaBottom" fmla="*/ 507600 h 753120"/>
+                <a:gd name="textAreaLeft" fmla="*/ 277200 w 1055160"/>
+                <a:gd name="textAreaRight" fmla="*/ 792000 w 1055160"/>
+                <a:gd name="textAreaTop" fmla="*/ 258840 h 752760"/>
+                <a:gd name="textAreaBottom" fmla="*/ 507600 h 752760"/>
               </a:gdLst>
               <a:ahLst/>
               <a:rect l="textAreaLeft" t="textAreaTop" r="textAreaRight" b="textAreaBottom"/>
@@ -14639,15 +14639,15 @@
           <p:spPr>
             <a:xfrm rot="5358000">
               <a:off x="447480" y="-246240"/>
-              <a:ext cx="1055520" cy="753120"/>
+              <a:ext cx="1055160" cy="752760"/>
             </a:xfrm>
             <a:custGeom>
               <a:avLst/>
               <a:gdLst>
-                <a:gd name="textAreaLeft" fmla="*/ 277200 w 1055520"/>
-                <a:gd name="textAreaRight" fmla="*/ 792000 w 1055520"/>
-                <a:gd name="textAreaTop" fmla="*/ 258840 h 753120"/>
-                <a:gd name="textAreaBottom" fmla="*/ 507600 h 753120"/>
+                <a:gd name="textAreaLeft" fmla="*/ 277200 w 1055160"/>
+                <a:gd name="textAreaRight" fmla="*/ 792000 w 1055160"/>
+                <a:gd name="textAreaTop" fmla="*/ 258840 h 752760"/>
+                <a:gd name="textAreaBottom" fmla="*/ 507600 h 752760"/>
               </a:gdLst>
               <a:ahLst/>
               <a:rect l="textAreaLeft" t="textAreaTop" r="textAreaRight" b="textAreaBottom"/>
@@ -15043,15 +15043,15 @@
           <p:spPr>
             <a:xfrm>
               <a:off x="1779480" y="1794600"/>
-              <a:ext cx="1059840" cy="753120"/>
+              <a:ext cx="1059480" cy="752760"/>
             </a:xfrm>
             <a:custGeom>
               <a:avLst/>
               <a:gdLst>
-                <a:gd name="textAreaLeft" fmla="*/ 278280 w 1059840"/>
-                <a:gd name="textAreaRight" fmla="*/ 794880 w 1059840"/>
-                <a:gd name="textAreaTop" fmla="*/ 258840 h 753120"/>
-                <a:gd name="textAreaBottom" fmla="*/ 507600 h 753120"/>
+                <a:gd name="textAreaLeft" fmla="*/ 278280 w 1059480"/>
+                <a:gd name="textAreaRight" fmla="*/ 794880 w 1059480"/>
+                <a:gd name="textAreaTop" fmla="*/ 258840 h 752760"/>
+                <a:gd name="textAreaBottom" fmla="*/ 507600 h 752760"/>
               </a:gdLst>
               <a:ahLst/>
               <a:rect l="textAreaLeft" t="textAreaTop" r="textAreaRight" b="textAreaBottom"/>
@@ -15447,15 +15447,15 @@
           <p:spPr>
             <a:xfrm>
               <a:off x="1106280" y="-257040"/>
-              <a:ext cx="1059840" cy="753120"/>
+              <a:ext cx="1059480" cy="752760"/>
             </a:xfrm>
             <a:custGeom>
               <a:avLst/>
               <a:gdLst>
-                <a:gd name="textAreaLeft" fmla="*/ 278280 w 1059840"/>
-                <a:gd name="textAreaRight" fmla="*/ 794880 w 1059840"/>
-                <a:gd name="textAreaTop" fmla="*/ 258840 h 753120"/>
-                <a:gd name="textAreaBottom" fmla="*/ 507600 h 753120"/>
+                <a:gd name="textAreaLeft" fmla="*/ 278280 w 1059480"/>
+                <a:gd name="textAreaRight" fmla="*/ 794880 w 1059480"/>
+                <a:gd name="textAreaTop" fmla="*/ 258840 h 752760"/>
+                <a:gd name="textAreaBottom" fmla="*/ 507600 h 752760"/>
               </a:gdLst>
               <a:ahLst/>
               <a:rect l="textAreaLeft" t="textAreaTop" r="textAreaRight" b="textAreaBottom"/>
@@ -15803,7 +15803,7 @@
             <a:blipFill rotWithShape="0">
               <a:blip r:embed="rId5"/>
               <a:srcRect/>
-              <a:tile tx="0" ty="0" sx="61702" sy="61702" algn="ctr"/>
+              <a:tile tx="0" ty="0" sx="61347" sy="61347" algn="ctr"/>
             </a:blipFill>
             <a:ln w="0">
               <a:solidFill>
@@ -15853,15 +15853,15 @@
           <p:spPr>
             <a:xfrm>
               <a:off x="-908280" y="1790640"/>
-              <a:ext cx="1059840" cy="753120"/>
+              <a:ext cx="1059480" cy="752760"/>
             </a:xfrm>
             <a:custGeom>
               <a:avLst/>
               <a:gdLst>
-                <a:gd name="textAreaLeft" fmla="*/ 278280 w 1059840"/>
-                <a:gd name="textAreaRight" fmla="*/ 794880 w 1059840"/>
-                <a:gd name="textAreaTop" fmla="*/ 258840 h 753120"/>
-                <a:gd name="textAreaBottom" fmla="*/ 507600 h 753120"/>
+                <a:gd name="textAreaLeft" fmla="*/ 278280 w 1059480"/>
+                <a:gd name="textAreaRight" fmla="*/ 794880 w 1059480"/>
+                <a:gd name="textAreaTop" fmla="*/ 258840 h 752760"/>
+                <a:gd name="textAreaBottom" fmla="*/ 507600 h 752760"/>
               </a:gdLst>
               <a:ahLst/>
               <a:rect l="textAreaLeft" t="textAreaTop" r="textAreaRight" b="textAreaBottom"/>
@@ -16209,7 +16209,7 @@
             <a:blipFill rotWithShape="0">
               <a:blip r:embed="rId6"/>
               <a:srcRect/>
-              <a:tile tx="0" ty="0" sx="61702" sy="61702" algn="ctr"/>
+              <a:tile tx="0" ty="0" sx="61347" sy="61347" algn="ctr"/>
             </a:blipFill>
             <a:ln w="0">
               <a:solidFill>
@@ -16258,16 +16258,16 @@
           </p:nvSpPr>
           <p:spPr>
             <a:xfrm rot="5358000">
-              <a:off x="-219960" y="5811840"/>
-              <a:ext cx="1055520" cy="753120"/>
+              <a:off x="-219600" y="5811480"/>
+              <a:ext cx="1055160" cy="752760"/>
             </a:xfrm>
             <a:custGeom>
               <a:avLst/>
               <a:gdLst>
-                <a:gd name="textAreaLeft" fmla="*/ 277200 w 1055520"/>
-                <a:gd name="textAreaRight" fmla="*/ 792000 w 1055520"/>
-                <a:gd name="textAreaTop" fmla="*/ 258840 h 753120"/>
-                <a:gd name="textAreaBottom" fmla="*/ 507600 h 753120"/>
+                <a:gd name="textAreaLeft" fmla="*/ 277200 w 1055160"/>
+                <a:gd name="textAreaRight" fmla="*/ 792000 w 1055160"/>
+                <a:gd name="textAreaTop" fmla="*/ 258840 h 752760"/>
+                <a:gd name="textAreaBottom" fmla="*/ 507600 h 752760"/>
               </a:gdLst>
               <a:ahLst/>
               <a:rect l="textAreaLeft" t="textAreaTop" r="textAreaRight" b="textAreaBottom"/>
@@ -16663,15 +16663,15 @@
           <p:spPr>
             <a:xfrm>
               <a:off x="427320" y="5853960"/>
-              <a:ext cx="1059840" cy="753120"/>
+              <a:ext cx="1059480" cy="752760"/>
             </a:xfrm>
             <a:custGeom>
               <a:avLst/>
               <a:gdLst>
-                <a:gd name="textAreaLeft" fmla="*/ 278280 w 1059840"/>
-                <a:gd name="textAreaRight" fmla="*/ 794880 w 1059840"/>
-                <a:gd name="textAreaTop" fmla="*/ 258840 h 753120"/>
-                <a:gd name="textAreaBottom" fmla="*/ 507600 h 753120"/>
+                <a:gd name="textAreaLeft" fmla="*/ 278280 w 1059480"/>
+                <a:gd name="textAreaRight" fmla="*/ 794880 w 1059480"/>
+                <a:gd name="textAreaTop" fmla="*/ 258840 h 752760"/>
+                <a:gd name="textAreaBottom" fmla="*/ 507600 h 752760"/>
               </a:gdLst>
               <a:ahLst/>
               <a:rect l="textAreaLeft" t="textAreaTop" r="textAreaRight" b="textAreaBottom"/>
@@ -17019,7 +17019,7 @@
             <a:blipFill rotWithShape="0">
               <a:blip r:embed="rId7"/>
               <a:srcRect/>
-              <a:tile tx="0" ty="0" sx="61702" sy="61702" algn="ctr"/>
+              <a:tile tx="0" ty="0" sx="61347" sy="61347" algn="ctr"/>
             </a:blipFill>
             <a:ln w="0">
               <a:solidFill>
@@ -17069,15 +17069,15 @@
           <p:spPr>
             <a:xfrm>
               <a:off x="-236880" y="6494040"/>
-              <a:ext cx="1059840" cy="753120"/>
+              <a:ext cx="1059480" cy="752760"/>
             </a:xfrm>
             <a:custGeom>
               <a:avLst/>
               <a:gdLst>
-                <a:gd name="textAreaLeft" fmla="*/ 278280 w 1059840"/>
-                <a:gd name="textAreaRight" fmla="*/ 794880 w 1059840"/>
-                <a:gd name="textAreaTop" fmla="*/ 258840 h 753120"/>
-                <a:gd name="textAreaBottom" fmla="*/ 507600 h 753120"/>
+                <a:gd name="textAreaLeft" fmla="*/ 278280 w 1059480"/>
+                <a:gd name="textAreaRight" fmla="*/ 794880 w 1059480"/>
+                <a:gd name="textAreaTop" fmla="*/ 258840 h 752760"/>
+                <a:gd name="textAreaBottom" fmla="*/ 507600 h 752760"/>
               </a:gdLst>
               <a:ahLst/>
               <a:rect l="textAreaLeft" t="textAreaTop" r="textAreaRight" b="textAreaBottom"/>
@@ -17472,16 +17472,16 @@
           </p:nvSpPr>
           <p:spPr>
             <a:xfrm rot="5358000">
-              <a:off x="-903960" y="6488640"/>
-              <a:ext cx="1055520" cy="753120"/>
+              <a:off x="-903600" y="6488280"/>
+              <a:ext cx="1055160" cy="752760"/>
             </a:xfrm>
             <a:custGeom>
               <a:avLst/>
               <a:gdLst>
-                <a:gd name="textAreaLeft" fmla="*/ 277200 w 1055520"/>
-                <a:gd name="textAreaRight" fmla="*/ 792000 w 1055520"/>
-                <a:gd name="textAreaTop" fmla="*/ 258840 h 753120"/>
-                <a:gd name="textAreaBottom" fmla="*/ 507600 h 753120"/>
+                <a:gd name="textAreaLeft" fmla="*/ 277200 w 1055160"/>
+                <a:gd name="textAreaRight" fmla="*/ 792000 w 1055160"/>
+                <a:gd name="textAreaTop" fmla="*/ 258840 h 752760"/>
+                <a:gd name="textAreaBottom" fmla="*/ 507600 h 752760"/>
               </a:gdLst>
               <a:ahLst/>
               <a:rect l="textAreaLeft" t="textAreaTop" r="textAreaRight" b="textAreaBottom"/>
@@ -17876,16 +17876,16 @@
           </p:nvSpPr>
           <p:spPr>
             <a:xfrm rot="5358000">
-              <a:off x="-232560" y="7197120"/>
-              <a:ext cx="1055160" cy="753120"/>
+              <a:off x="-231840" y="7197120"/>
+              <a:ext cx="1054800" cy="752760"/>
             </a:xfrm>
             <a:custGeom>
               <a:avLst/>
               <a:gdLst>
-                <a:gd name="textAreaLeft" fmla="*/ 276840 w 1055160"/>
-                <a:gd name="textAreaRight" fmla="*/ 791640 w 1055160"/>
-                <a:gd name="textAreaTop" fmla="*/ 258840 h 753120"/>
-                <a:gd name="textAreaBottom" fmla="*/ 507600 h 753120"/>
+                <a:gd name="textAreaLeft" fmla="*/ 276840 w 1054800"/>
+                <a:gd name="textAreaRight" fmla="*/ 791640 w 1054800"/>
+                <a:gd name="textAreaTop" fmla="*/ 258840 h 752760"/>
+                <a:gd name="textAreaBottom" fmla="*/ 507600 h 752760"/>
               </a:gdLst>
               <a:ahLst/>
               <a:rect l="textAreaLeft" t="textAreaTop" r="textAreaRight" b="textAreaBottom"/>
@@ -18280,16 +18280,16 @@
           </p:nvSpPr>
           <p:spPr>
             <a:xfrm rot="5358000">
-              <a:off x="439200" y="6505200"/>
-              <a:ext cx="1055520" cy="753120"/>
+              <a:off x="439200" y="6504840"/>
+              <a:ext cx="1055160" cy="752760"/>
             </a:xfrm>
             <a:custGeom>
               <a:avLst/>
               <a:gdLst>
-                <a:gd name="textAreaLeft" fmla="*/ 277200 w 1055520"/>
-                <a:gd name="textAreaRight" fmla="*/ 792000 w 1055520"/>
-                <a:gd name="textAreaTop" fmla="*/ 258840 h 753120"/>
-                <a:gd name="textAreaBottom" fmla="*/ 507600 h 753120"/>
+                <a:gd name="textAreaLeft" fmla="*/ 277200 w 1055160"/>
+                <a:gd name="textAreaRight" fmla="*/ 792000 w 1055160"/>
+                <a:gd name="textAreaTop" fmla="*/ 258840 h 752760"/>
+                <a:gd name="textAreaBottom" fmla="*/ 507600 h 752760"/>
               </a:gdLst>
               <a:ahLst/>
               <a:rect l="textAreaLeft" t="textAreaTop" r="textAreaRight" b="textAreaBottom"/>
@@ -18685,15 +18685,15 @@
           <p:spPr>
             <a:xfrm>
               <a:off x="1103400" y="6530040"/>
-              <a:ext cx="1059840" cy="753120"/>
+              <a:ext cx="1059480" cy="752760"/>
             </a:xfrm>
             <a:custGeom>
               <a:avLst/>
               <a:gdLst>
-                <a:gd name="textAreaLeft" fmla="*/ 278280 w 1059840"/>
-                <a:gd name="textAreaRight" fmla="*/ 794880 w 1059840"/>
-                <a:gd name="textAreaTop" fmla="*/ 258840 h 753120"/>
-                <a:gd name="textAreaBottom" fmla="*/ 507600 h 753120"/>
+                <a:gd name="textAreaLeft" fmla="*/ 278280 w 1059480"/>
+                <a:gd name="textAreaRight" fmla="*/ 794880 w 1059480"/>
+                <a:gd name="textAreaTop" fmla="*/ 258840 h 752760"/>
+                <a:gd name="textAreaBottom" fmla="*/ 507600 h 752760"/>
               </a:gdLst>
               <a:ahLst/>
               <a:rect l="textAreaLeft" t="textAreaTop" r="textAreaRight" b="textAreaBottom"/>
@@ -19090,7 +19090,7 @@
         <p:spPr>
           <a:xfrm>
             <a:off x="3844800" y="1408320"/>
-            <a:ext cx="1083960" cy="1212480"/>
+            <a:ext cx="1083600" cy="1212120"/>
           </a:xfrm>
           <a:prstGeom prst="rect">
             <a:avLst/>
@@ -19144,7 +19144,7 @@
         <p:spPr>
           <a:xfrm>
             <a:off x="7868160" y="3039840"/>
-            <a:ext cx="1083960" cy="1098360"/>
+            <a:ext cx="1083600" cy="1098000"/>
           </a:xfrm>
           <a:prstGeom prst="rect">
             <a:avLst/>
@@ -19198,15 +19198,15 @@
         <p:spPr>
           <a:xfrm>
             <a:off x="8538120" y="3877200"/>
-            <a:ext cx="962640" cy="1358280"/>
+            <a:ext cx="962280" cy="1357920"/>
           </a:xfrm>
           <a:custGeom>
             <a:avLst/>
             <a:gdLst>
-              <a:gd name="textAreaLeft" fmla="*/ 0 w 962640"/>
-              <a:gd name="textAreaRight" fmla="*/ 975960 w 962640"/>
-              <a:gd name="textAreaTop" fmla="*/ 0 h 1358280"/>
-              <a:gd name="textAreaBottom" fmla="*/ 1371600 h 1358280"/>
+              <a:gd name="textAreaLeft" fmla="*/ 0 w 962280"/>
+              <a:gd name="textAreaRight" fmla="*/ 975960 w 962280"/>
+              <a:gd name="textAreaTop" fmla="*/ 0 h 1357920"/>
+              <a:gd name="textAreaBottom" fmla="*/ 1371600 h 1357920"/>
             </a:gdLst>
             <a:ahLst/>
             <a:rect l="textAreaLeft" t="textAreaTop" r="textAreaRight" b="textAreaBottom"/>
@@ -19281,7 +19281,7 @@
         <p:spPr>
           <a:xfrm>
             <a:off x="7372080" y="4974480"/>
-            <a:ext cx="1671480" cy="1632600"/>
+            <a:ext cx="1671120" cy="1632240"/>
           </a:xfrm>
           <a:prstGeom prst="ellipse">
             <a:avLst/>
@@ -19330,7 +19330,7 @@
         <p:spPr>
           <a:xfrm>
             <a:off x="7868160" y="-329040"/>
-            <a:ext cx="1998360" cy="1998360"/>
+            <a:ext cx="1998000" cy="1998000"/>
           </a:xfrm>
           <a:prstGeom prst="ellipse">
             <a:avLst/>
@@ -19379,7 +19379,7 @@
         <p:spPr>
           <a:xfrm>
             <a:off x="2982960" y="3757320"/>
-            <a:ext cx="1031400" cy="289440"/>
+            <a:ext cx="1031040" cy="289080"/>
           </a:xfrm>
           <a:prstGeom prst="rect">
             <a:avLst/>
@@ -19459,7 +19459,7 @@
         <p:spPr>
           <a:xfrm>
             <a:off x="8266320" y="4115520"/>
-            <a:ext cx="1906920" cy="1906920"/>
+            <a:ext cx="1906560" cy="1906560"/>
           </a:xfrm>
           <a:prstGeom prst="ellipse">
             <a:avLst/>
@@ -19508,7 +19508,7 @@
         <p:spPr>
           <a:xfrm>
             <a:off x="7717680" y="-548280"/>
-            <a:ext cx="1906920" cy="1906920"/>
+            <a:ext cx="1906560" cy="1906560"/>
           </a:xfrm>
           <a:prstGeom prst="ellipse">
             <a:avLst/>
@@ -19556,10 +19556,10 @@
         </p:nvGrpSpPr>
         <p:grpSpPr>
           <a:xfrm>
-            <a:off x="-134280" y="-282960"/>
-            <a:ext cx="889200" cy="1254600"/>
-            <a:chOff x="-134280" y="-282960"/>
-            <a:chExt cx="889200" cy="1254600"/>
+            <a:off x="-133920" y="-282600"/>
+            <a:ext cx="888480" cy="1253880"/>
+            <a:chOff x="-133920" y="-282600"/>
+            <a:chExt cx="888480" cy="1253880"/>
           </a:xfrm>
         </p:grpSpPr>
         <p:sp>
@@ -19570,8 +19570,8 @@
           </p:nvSpPr>
           <p:spPr>
             <a:xfrm flipV="1" rot="5395800">
-              <a:off x="219240" y="801360"/>
-              <a:ext cx="169560" cy="169560"/>
+              <a:off x="219240" y="801000"/>
+              <a:ext cx="169200" cy="169200"/>
             </a:xfrm>
             <a:prstGeom prst="ellipse">
               <a:avLst/>
@@ -19579,7 +19579,7 @@
             <a:blipFill rotWithShape="0">
               <a:blip r:embed="rId2"/>
               <a:srcRect/>
-              <a:tile tx="0" ty="0" sx="61702" sy="61702" algn="ctr"/>
+              <a:tile tx="0" ty="0" sx="61347" sy="61347" algn="ctr"/>
             </a:blipFill>
             <a:ln w="0">
               <a:noFill/>
@@ -19626,8 +19626,8 @@
           </p:nvSpPr>
           <p:spPr>
             <a:xfrm flipV="1" rot="5395800">
-              <a:off x="218880" y="435600"/>
-              <a:ext cx="169560" cy="169560"/>
+              <a:off x="218880" y="435240"/>
+              <a:ext cx="169200" cy="169200"/>
             </a:xfrm>
             <a:prstGeom prst="ellipse">
               <a:avLst/>
@@ -19635,7 +19635,7 @@
             <a:blipFill rotWithShape="0">
               <a:blip r:embed="rId3"/>
               <a:srcRect/>
-              <a:tile tx="0" ty="0" sx="61702" sy="61702" algn="ctr"/>
+              <a:tile tx="0" ty="0" sx="61347" sy="61347" algn="ctr"/>
             </a:blipFill>
             <a:ln w="0">
               <a:noFill/>
@@ -19682,8 +19682,8 @@
           </p:nvSpPr>
           <p:spPr>
             <a:xfrm flipV="1" rot="5395800">
-              <a:off x="218520" y="70200"/>
-              <a:ext cx="169560" cy="169560"/>
+              <a:off x="218520" y="69840"/>
+              <a:ext cx="169200" cy="169200"/>
             </a:xfrm>
             <a:prstGeom prst="ellipse">
               <a:avLst/>
@@ -19691,7 +19691,7 @@
             <a:blipFill rotWithShape="0">
               <a:blip r:embed="rId4"/>
               <a:srcRect/>
-              <a:tile tx="0" ty="0" sx="61702" sy="61702" algn="ctr"/>
+              <a:tile tx="0" ty="0" sx="61347" sy="61347" algn="ctr"/>
             </a:blipFill>
             <a:ln w="0">
               <a:noFill/>
@@ -19739,7 +19739,7 @@
           <p:spPr>
             <a:xfrm flipV="1" rot="5395800">
               <a:off x="217800" y="-282240"/>
-              <a:ext cx="169560" cy="169560"/>
+              <a:ext cx="169200" cy="169200"/>
             </a:xfrm>
             <a:prstGeom prst="ellipse">
               <a:avLst/>
@@ -19747,7 +19747,7 @@
             <a:blipFill rotWithShape="0">
               <a:blip r:embed="rId5"/>
               <a:srcRect/>
-              <a:tile tx="0" ty="0" sx="61702" sy="61702" algn="ctr"/>
+              <a:tile tx="0" ty="0" sx="61347" sy="61347" algn="ctr"/>
             </a:blipFill>
             <a:ln w="0">
               <a:noFill/>
@@ -19795,7 +19795,7 @@
           <p:spPr>
             <a:xfrm flipV="1" rot="5395800">
               <a:off x="583920" y="-282600"/>
-              <a:ext cx="169560" cy="169560"/>
+              <a:ext cx="169200" cy="169200"/>
             </a:xfrm>
             <a:prstGeom prst="ellipse">
               <a:avLst/>
@@ -19803,7 +19803,7 @@
             <a:blipFill rotWithShape="0">
               <a:blip r:embed="rId6"/>
               <a:srcRect/>
-              <a:tile tx="0" ty="0" sx="61702" sy="61702" algn="ctr"/>
+              <a:tile tx="0" ty="0" sx="61347" sy="61347" algn="ctr"/>
             </a:blipFill>
             <a:ln w="0">
               <a:noFill/>
@@ -19850,8 +19850,8 @@
           </p:nvSpPr>
           <p:spPr>
             <a:xfrm flipV="1" rot="5395800">
-              <a:off x="584280" y="69480"/>
-              <a:ext cx="169560" cy="169560"/>
+              <a:off x="584280" y="69120"/>
+              <a:ext cx="169200" cy="169200"/>
             </a:xfrm>
             <a:prstGeom prst="ellipse">
               <a:avLst/>
@@ -19859,7 +19859,7 @@
             <a:blipFill rotWithShape="0">
               <a:blip r:embed="rId7"/>
               <a:srcRect/>
-              <a:tile tx="0" ty="0" sx="61702" sy="61702" algn="ctr"/>
+              <a:tile tx="0" ty="0" sx="61347" sy="61347" algn="ctr"/>
             </a:blipFill>
             <a:ln w="0">
               <a:noFill/>
@@ -19906,8 +19906,8 @@
           </p:nvSpPr>
           <p:spPr>
             <a:xfrm flipV="1" rot="5395800">
-              <a:off x="584280" y="435240"/>
-              <a:ext cx="169560" cy="169560"/>
+              <a:off x="584280" y="434880"/>
+              <a:ext cx="169200" cy="169200"/>
             </a:xfrm>
             <a:prstGeom prst="ellipse">
               <a:avLst/>
@@ -19915,7 +19915,7 @@
             <a:blipFill rotWithShape="0">
               <a:blip r:embed="rId8"/>
               <a:srcRect/>
-              <a:tile tx="0" ty="0" sx="61702" sy="61702" algn="ctr"/>
+              <a:tile tx="0" ty="0" sx="61347" sy="61347" algn="ctr"/>
             </a:blipFill>
             <a:ln w="0">
               <a:noFill/>
@@ -19962,8 +19962,8 @@
           </p:nvSpPr>
           <p:spPr>
             <a:xfrm flipV="1" rot="5395800">
-              <a:off x="585000" y="801360"/>
-              <a:ext cx="169560" cy="169560"/>
+              <a:off x="585000" y="801000"/>
+              <a:ext cx="169200" cy="169200"/>
             </a:xfrm>
             <a:prstGeom prst="ellipse">
               <a:avLst/>
@@ -19971,7 +19971,7 @@
             <a:blipFill rotWithShape="0">
               <a:blip r:embed="rId9"/>
               <a:srcRect/>
-              <a:tile tx="0" ty="0" sx="61702" sy="61702" algn="ctr"/>
+              <a:tile tx="0" ty="0" sx="61347" sy="61347" algn="ctr"/>
             </a:blipFill>
             <a:ln w="0">
               <a:noFill/>
@@ -20018,8 +20018,8 @@
           </p:nvSpPr>
           <p:spPr>
             <a:xfrm flipV="1" rot="5395800">
-              <a:off x="-132840" y="801720"/>
-              <a:ext cx="169560" cy="169560"/>
+              <a:off x="-132480" y="801360"/>
+              <a:ext cx="169200" cy="169200"/>
             </a:xfrm>
             <a:prstGeom prst="ellipse">
               <a:avLst/>
@@ -20027,7 +20027,7 @@
             <a:blipFill rotWithShape="0">
               <a:blip r:embed="rId10"/>
               <a:srcRect/>
-              <a:tile tx="0" ty="0" sx="61702" sy="61702" algn="ctr"/>
+              <a:tile tx="0" ty="0" sx="61347" sy="61347" algn="ctr"/>
             </a:blipFill>
             <a:ln w="0">
               <a:noFill/>
@@ -20074,8 +20074,8 @@
           </p:nvSpPr>
           <p:spPr>
             <a:xfrm flipV="1" rot="5395800">
-              <a:off x="-133560" y="436320"/>
-              <a:ext cx="169560" cy="169560"/>
+              <a:off x="-133200" y="435960"/>
+              <a:ext cx="169200" cy="169200"/>
             </a:xfrm>
             <a:prstGeom prst="ellipse">
               <a:avLst/>
@@ -20083,7 +20083,7 @@
             <a:blipFill rotWithShape="0">
               <a:blip r:embed="rId11"/>
               <a:srcRect/>
-              <a:tile tx="0" ty="0" sx="61702" sy="61702" algn="ctr"/>
+              <a:tile tx="0" ty="0" sx="61347" sy="61347" algn="ctr"/>
             </a:blipFill>
             <a:ln w="0">
               <a:noFill/>
@@ -20130,8 +20130,8 @@
           </p:nvSpPr>
           <p:spPr>
             <a:xfrm flipV="1" rot="5395800">
-              <a:off x="-133560" y="70200"/>
-              <a:ext cx="169560" cy="169560"/>
+              <a:off x="-133200" y="69840"/>
+              <a:ext cx="169200" cy="169200"/>
             </a:xfrm>
             <a:prstGeom prst="ellipse">
               <a:avLst/>
@@ -20139,7 +20139,7 @@
             <a:blipFill rotWithShape="0">
               <a:blip r:embed="rId12"/>
               <a:srcRect/>
-              <a:tile tx="0" ty="0" sx="61702" sy="61702" algn="ctr"/>
+              <a:tile tx="0" ty="0" sx="61347" sy="61347" algn="ctr"/>
             </a:blipFill>
             <a:ln w="0">
               <a:noFill/>
@@ -20186,8 +20186,8 @@
           </p:nvSpPr>
           <p:spPr>
             <a:xfrm flipV="1" rot="5395800">
-              <a:off x="-133920" y="-281880"/>
-              <a:ext cx="169560" cy="169560"/>
+              <a:off x="-133560" y="-281880"/>
+              <a:ext cx="169200" cy="169200"/>
             </a:xfrm>
             <a:prstGeom prst="ellipse">
               <a:avLst/>
@@ -20195,7 +20195,7 @@
             <a:blipFill rotWithShape="0">
               <a:blip r:embed="rId13"/>
               <a:srcRect/>
-              <a:tile tx="0" ty="0" sx="61702" sy="61702" algn="ctr"/>
+              <a:tile tx="0" ty="0" sx="61347" sy="61347" algn="ctr"/>
             </a:blipFill>
             <a:ln w="0">
               <a:noFill/>
@@ -20244,9 +20244,9 @@
         <p:grpSpPr>
           <a:xfrm>
             <a:off x="9545040" y="4645800"/>
-            <a:ext cx="902520" cy="1267920"/>
+            <a:ext cx="902160" cy="1267560"/>
             <a:chOff x="9545040" y="4645800"/>
-            <a:chExt cx="902520" cy="1267920"/>
+            <a:chExt cx="902160" cy="1267560"/>
           </a:xfrm>
         </p:grpSpPr>
         <p:sp>
@@ -20257,8 +20257,8 @@
           </p:nvSpPr>
           <p:spPr>
             <a:xfrm flipV="1" rot="5395800">
-              <a:off x="9911880" y="5743440"/>
-              <a:ext cx="169560" cy="169560"/>
+              <a:off x="9911880" y="5743080"/>
+              <a:ext cx="169200" cy="169200"/>
             </a:xfrm>
             <a:prstGeom prst="ellipse">
               <a:avLst/>
@@ -20266,7 +20266,7 @@
             <a:blipFill rotWithShape="0">
               <a:blip r:embed="rId14"/>
               <a:srcRect/>
-              <a:tile tx="0" ty="0" sx="61702" sy="61702" algn="ctr"/>
+              <a:tile tx="0" ty="0" sx="61347" sy="61347" algn="ctr"/>
             </a:blipFill>
             <a:ln w="0">
               <a:noFill/>
@@ -20313,8 +20313,8 @@
           </p:nvSpPr>
           <p:spPr>
             <a:xfrm flipV="1" rot="5395800">
-              <a:off x="9911520" y="5377680"/>
-              <a:ext cx="169560" cy="169560"/>
+              <a:off x="9911520" y="5377320"/>
+              <a:ext cx="169200" cy="169200"/>
             </a:xfrm>
             <a:prstGeom prst="ellipse">
               <a:avLst/>
@@ -20322,7 +20322,7 @@
             <a:blipFill rotWithShape="0">
               <a:blip r:embed="rId15"/>
               <a:srcRect/>
-              <a:tile tx="0" ty="0" sx="61702" sy="61702" algn="ctr"/>
+              <a:tile tx="0" ty="0" sx="61347" sy="61347" algn="ctr"/>
             </a:blipFill>
             <a:ln w="0">
               <a:noFill/>
@@ -20369,8 +20369,8 @@
           </p:nvSpPr>
           <p:spPr>
             <a:xfrm flipV="1" rot="5395800">
-              <a:off x="9911160" y="5012280"/>
-              <a:ext cx="169560" cy="169560"/>
+              <a:off x="9911160" y="5011920"/>
+              <a:ext cx="169200" cy="169200"/>
             </a:xfrm>
             <a:prstGeom prst="ellipse">
               <a:avLst/>
@@ -20378,7 +20378,7 @@
             <a:blipFill rotWithShape="0">
               <a:blip r:embed="rId16"/>
               <a:srcRect/>
-              <a:tile tx="0" ty="0" sx="61702" sy="61702" algn="ctr"/>
+              <a:tile tx="0" ty="0" sx="61347" sy="61347" algn="ctr"/>
             </a:blipFill>
             <a:ln w="0">
               <a:noFill/>
@@ -20425,8 +20425,8 @@
           </p:nvSpPr>
           <p:spPr>
             <a:xfrm flipV="1" rot="5395800">
-              <a:off x="9910440" y="4646160"/>
-              <a:ext cx="169560" cy="169560"/>
+              <a:off x="9910440" y="4645800"/>
+              <a:ext cx="169200" cy="169200"/>
             </a:xfrm>
             <a:prstGeom prst="ellipse">
               <a:avLst/>
@@ -20434,7 +20434,7 @@
             <a:blipFill rotWithShape="0">
               <a:blip r:embed="rId17"/>
               <a:srcRect/>
-              <a:tile tx="0" ty="0" sx="61702" sy="61702" algn="ctr"/>
+              <a:tile tx="0" ty="0" sx="61347" sy="61347" algn="ctr"/>
             </a:blipFill>
             <a:ln w="0">
               <a:noFill/>
@@ -20481,8 +20481,8 @@
           </p:nvSpPr>
           <p:spPr>
             <a:xfrm flipV="1" rot="5395800">
-              <a:off x="10276560" y="4645800"/>
-              <a:ext cx="169560" cy="169560"/>
+              <a:off x="10276560" y="4645440"/>
+              <a:ext cx="169200" cy="169200"/>
             </a:xfrm>
             <a:prstGeom prst="ellipse">
               <a:avLst/>
@@ -20490,7 +20490,7 @@
             <a:blipFill rotWithShape="0">
               <a:blip r:embed="rId18"/>
               <a:srcRect/>
-              <a:tile tx="0" ty="0" sx="61702" sy="61702" algn="ctr"/>
+              <a:tile tx="0" ty="0" sx="61347" sy="61347" algn="ctr"/>
             </a:blipFill>
             <a:ln w="0">
               <a:noFill/>
@@ -20537,8 +20537,8 @@
           </p:nvSpPr>
           <p:spPr>
             <a:xfrm flipV="1" rot="5395800">
-              <a:off x="10276920" y="5011560"/>
-              <a:ext cx="169560" cy="169560"/>
+              <a:off x="10276920" y="5011200"/>
+              <a:ext cx="169200" cy="169200"/>
             </a:xfrm>
             <a:prstGeom prst="ellipse">
               <a:avLst/>
@@ -20546,7 +20546,7 @@
             <a:blipFill rotWithShape="0">
               <a:blip r:embed="rId19"/>
               <a:srcRect/>
-              <a:tile tx="0" ty="0" sx="61702" sy="61702" algn="ctr"/>
+              <a:tile tx="0" ty="0" sx="61347" sy="61347" algn="ctr"/>
             </a:blipFill>
             <a:ln w="0">
               <a:noFill/>
@@ -20593,8 +20593,8 @@
           </p:nvSpPr>
           <p:spPr>
             <a:xfrm flipV="1" rot="5395800">
-              <a:off x="10276920" y="5377320"/>
-              <a:ext cx="169560" cy="169560"/>
+              <a:off x="10276920" y="5376960"/>
+              <a:ext cx="169200" cy="169200"/>
             </a:xfrm>
             <a:prstGeom prst="ellipse">
               <a:avLst/>
@@ -20602,7 +20602,7 @@
             <a:blipFill rotWithShape="0">
               <a:blip r:embed="rId20"/>
               <a:srcRect/>
-              <a:tile tx="0" ty="0" sx="61702" sy="61702" algn="ctr"/>
+              <a:tile tx="0" ty="0" sx="61347" sy="61347" algn="ctr"/>
             </a:blipFill>
             <a:ln w="0">
               <a:noFill/>
@@ -20649,8 +20649,8 @@
           </p:nvSpPr>
           <p:spPr>
             <a:xfrm flipV="1" rot="5395800">
-              <a:off x="10277640" y="5743440"/>
-              <a:ext cx="169560" cy="169560"/>
+              <a:off x="10277640" y="5743080"/>
+              <a:ext cx="169200" cy="169200"/>
             </a:xfrm>
             <a:prstGeom prst="ellipse">
               <a:avLst/>
@@ -20658,7 +20658,7 @@
             <a:blipFill rotWithShape="0">
               <a:blip r:embed="rId21"/>
               <a:srcRect/>
-              <a:tile tx="0" ty="0" sx="61702" sy="61702" algn="ctr"/>
+              <a:tile tx="0" ty="0" sx="61347" sy="61347" algn="ctr"/>
             </a:blipFill>
             <a:ln w="0">
               <a:noFill/>
@@ -20705,8 +20705,8 @@
           </p:nvSpPr>
           <p:spPr>
             <a:xfrm flipV="1" rot="5395800">
-              <a:off x="9546120" y="5743800"/>
-              <a:ext cx="169560" cy="169560"/>
+              <a:off x="9546120" y="5743440"/>
+              <a:ext cx="169200" cy="169200"/>
             </a:xfrm>
             <a:prstGeom prst="ellipse">
               <a:avLst/>
@@ -20714,7 +20714,7 @@
             <a:blipFill rotWithShape="0">
               <a:blip r:embed="rId22"/>
               <a:srcRect/>
-              <a:tile tx="0" ty="0" sx="61702" sy="61702" algn="ctr"/>
+              <a:tile tx="0" ty="0" sx="61347" sy="61347" algn="ctr"/>
             </a:blipFill>
             <a:ln w="0">
               <a:noFill/>
@@ -20761,8 +20761,8 @@
           </p:nvSpPr>
           <p:spPr>
             <a:xfrm flipV="1" rot="5395800">
-              <a:off x="9545400" y="5378400"/>
-              <a:ext cx="169560" cy="169560"/>
+              <a:off x="9545400" y="5378040"/>
+              <a:ext cx="169200" cy="169200"/>
             </a:xfrm>
             <a:prstGeom prst="ellipse">
               <a:avLst/>
@@ -20770,7 +20770,7 @@
             <a:blipFill rotWithShape="0">
               <a:blip r:embed="rId23"/>
               <a:srcRect/>
-              <a:tile tx="0" ty="0" sx="61702" sy="61702" algn="ctr"/>
+              <a:tile tx="0" ty="0" sx="61347" sy="61347" algn="ctr"/>
             </a:blipFill>
             <a:ln w="0">
               <a:noFill/>
@@ -20817,8 +20817,8 @@
           </p:nvSpPr>
           <p:spPr>
             <a:xfrm flipV="1" rot="5395800">
-              <a:off x="9545400" y="5012280"/>
-              <a:ext cx="169560" cy="169560"/>
+              <a:off x="9545400" y="5011920"/>
+              <a:ext cx="169200" cy="169200"/>
             </a:xfrm>
             <a:prstGeom prst="ellipse">
               <a:avLst/>
@@ -20826,7 +20826,7 @@
             <a:blipFill rotWithShape="0">
               <a:blip r:embed="rId24"/>
               <a:srcRect/>
-              <a:tile tx="0" ty="0" sx="61702" sy="61702" algn="ctr"/>
+              <a:tile tx="0" ty="0" sx="61347" sy="61347" algn="ctr"/>
             </a:blipFill>
             <a:ln w="0">
               <a:noFill/>
@@ -20873,8 +20873,8 @@
           </p:nvSpPr>
           <p:spPr>
             <a:xfrm flipV="1" rot="5395800">
-              <a:off x="9545040" y="4646520"/>
-              <a:ext cx="169560" cy="169560"/>
+              <a:off x="9545040" y="4646160"/>
+              <a:ext cx="169200" cy="169200"/>
             </a:xfrm>
             <a:prstGeom prst="ellipse">
               <a:avLst/>
@@ -20882,7 +20882,7 @@
             <a:blipFill rotWithShape="0">
               <a:blip r:embed="rId25"/>
               <a:srcRect/>
-              <a:tile tx="0" ty="0" sx="61702" sy="61702" algn="ctr"/>
+              <a:tile tx="0" ty="0" sx="61347" sy="61347" algn="ctr"/>
             </a:blipFill>
             <a:ln w="0">
               <a:noFill/>
@@ -20931,7 +20931,7 @@
         <p:spPr>
           <a:xfrm>
             <a:off x="-146160" y="3109320"/>
-            <a:ext cx="1906920" cy="1906920"/>
+            <a:ext cx="1906560" cy="1906560"/>
           </a:xfrm>
           <a:prstGeom prst="ellipse">
             <a:avLst/>
@@ -21005,8 +21005,8 @@
         </p:nvSpPr>
         <p:spPr>
           <a:xfrm rot="18876000">
-            <a:off x="8636400" y="-392400"/>
-            <a:ext cx="2882160" cy="2882160"/>
+            <a:off x="8636040" y="-392040"/>
+            <a:ext cx="2881800" cy="2881800"/>
           </a:xfrm>
           <a:prstGeom prst="rect">
             <a:avLst/>
@@ -21052,8 +21052,8 @@
         </p:nvSpPr>
         <p:spPr>
           <a:xfrm rot="18876000">
-            <a:off x="8656560" y="3983040"/>
-            <a:ext cx="2882160" cy="2882160"/>
+            <a:off x="8656200" y="3983040"/>
+            <a:ext cx="2881800" cy="2881800"/>
           </a:xfrm>
           <a:prstGeom prst="rect">
             <a:avLst/>
@@ -21100,7 +21100,7 @@
         <p:spPr>
           <a:xfrm rot="18964800">
             <a:off x="984600" y="5915520"/>
-            <a:ext cx="2575440" cy="718200"/>
+            <a:ext cx="2575080" cy="717840"/>
           </a:xfrm>
           <a:prstGeom prst="rect">
             <a:avLst/>
@@ -21148,8 +21148,8 @@
         </p:nvSpPr>
         <p:spPr>
           <a:xfrm rot="18964800">
-            <a:off x="-1293120" y="5513400"/>
-            <a:ext cx="2575440" cy="718200"/>
+            <a:off x="-1292760" y="5513400"/>
+            <a:ext cx="2575080" cy="717840"/>
           </a:xfrm>
           <a:prstGeom prst="rect">
             <a:avLst/>
@@ -21197,8 +21197,8 @@
         </p:nvSpPr>
         <p:spPr>
           <a:xfrm rot="18964800">
-            <a:off x="3672720" y="339120"/>
-            <a:ext cx="3444480" cy="909000"/>
+            <a:off x="3672360" y="339120"/>
+            <a:ext cx="3444120" cy="908640"/>
           </a:xfrm>
           <a:prstGeom prst="rect">
             <a:avLst/>
@@ -21246,8 +21246,8 @@
         </p:nvSpPr>
         <p:spPr>
           <a:xfrm rot="18964800">
-            <a:off x="1436400" y="-745560"/>
-            <a:ext cx="2575440" cy="718200"/>
+            <a:off x="1436400" y="-745200"/>
+            <a:ext cx="2575080" cy="717840"/>
           </a:xfrm>
           <a:prstGeom prst="rect">
             <a:avLst/>
@@ -21296,7 +21296,7 @@
         <p:spPr>
           <a:xfrm rot="18964800">
             <a:off x="-723240" y="3294720"/>
-            <a:ext cx="2575440" cy="499680"/>
+            <a:ext cx="2575080" cy="499320"/>
           </a:xfrm>
           <a:prstGeom prst="rect">
             <a:avLst/>
@@ -21371,7 +21371,7 @@
         <p:spPr>
           <a:xfrm>
             <a:off x="820800" y="4140000"/>
-            <a:ext cx="6185880" cy="1426680"/>
+            <a:ext cx="6185520" cy="1426320"/>
           </a:xfrm>
           <a:prstGeom prst="rect">
             <a:avLst/>
@@ -21431,7 +21431,7 @@
         <p:spPr>
           <a:xfrm>
             <a:off x="7315200" y="4629240"/>
-            <a:ext cx="2364120" cy="480960"/>
+            <a:ext cx="2363760" cy="480600"/>
           </a:xfrm>
           <a:prstGeom prst="rect">
             <a:avLst/>
@@ -21580,7 +21580,7 @@
         <p:spPr>
           <a:xfrm>
             <a:off x="1044000" y="1095120"/>
-            <a:ext cx="8133120" cy="381600"/>
+            <a:ext cx="8132760" cy="381240"/>
           </a:xfrm>
           <a:prstGeom prst="rect">
             <a:avLst/>
@@ -21637,7 +21637,7 @@
         <p:spPr>
           <a:xfrm>
             <a:off x="1086120" y="1635120"/>
-            <a:ext cx="7720920" cy="3609720"/>
+            <a:ext cx="7720560" cy="3609360"/>
           </a:xfrm>
           <a:prstGeom prst="rect">
             <a:avLst/>
@@ -21922,7 +21922,7 @@
         <p:spPr>
           <a:xfrm>
             <a:off x="1044000" y="1095120"/>
-            <a:ext cx="8133120" cy="381600"/>
+            <a:ext cx="8132760" cy="381240"/>
           </a:xfrm>
           <a:prstGeom prst="rect">
             <a:avLst/>
@@ -21979,7 +21979,7 @@
         <p:spPr>
           <a:xfrm>
             <a:off x="1014120" y="1491120"/>
-            <a:ext cx="7720920" cy="3609720"/>
+            <a:ext cx="7720560" cy="3609360"/>
           </a:xfrm>
           <a:prstGeom prst="rect">
             <a:avLst/>
@@ -22340,7 +22340,7 @@
         <p:spPr>
           <a:xfrm>
             <a:off x="1044000" y="1095120"/>
-            <a:ext cx="8133120" cy="381600"/>
+            <a:ext cx="8132760" cy="381240"/>
           </a:xfrm>
           <a:prstGeom prst="rect">
             <a:avLst/>
@@ -22397,7 +22397,7 @@
         <p:spPr>
           <a:xfrm>
             <a:off x="1086120" y="1635120"/>
-            <a:ext cx="7720920" cy="3944880"/>
+            <a:ext cx="7720560" cy="3944520"/>
           </a:xfrm>
           <a:prstGeom prst="rect">
             <a:avLst/>
@@ -22444,7 +22444,6 @@
                 <a:srgbClr val="000000"/>
               </a:solidFill>
               <a:latin typeface="Arial"/>
-              <a:ea typeface="Noto Sans CJK SC"/>
             </a:endParaRPr>
           </a:p>
           <a:p>
@@ -22467,14 +22466,13 @@
                 <a:latin typeface="Noto Sans"/>
                 <a:ea typeface="DejaVu Sans"/>
               </a:rPr>
-              <a:t>L’optimiser utilisé : Adam, Adamw, Rmsprop, SGD, SGD avec le momentum Nesterov</a:t>
+              <a:t>L’optimiser utilisé : Adam, Adamw, Rmsprop, SGD, SGD avec le momentum Nesterov.</a:t>
             </a:r>
             <a:endParaRPr b="0" lang="fr-CH" sz="1800" spc="-1" strike="noStrike">
               <a:solidFill>
                 <a:srgbClr val="000000"/>
               </a:solidFill>
               <a:latin typeface="Arial"/>
-              <a:ea typeface="Noto Sans CJK SC"/>
             </a:endParaRPr>
           </a:p>
           <a:p>
@@ -22504,7 +22502,6 @@
                 <a:srgbClr val="000000"/>
               </a:solidFill>
               <a:latin typeface="Arial"/>
-              <a:ea typeface="Noto Sans CJK SC"/>
             </a:endParaRPr>
           </a:p>
           <a:p>
@@ -22534,7 +22531,6 @@
                 <a:srgbClr val="000000"/>
               </a:solidFill>
               <a:latin typeface="Arial"/>
-              <a:ea typeface="Noto Sans CJK SC"/>
             </a:endParaRPr>
           </a:p>
           <a:p>
@@ -22564,7 +22560,6 @@
                 <a:srgbClr val="000000"/>
               </a:solidFill>
               <a:latin typeface="Arial"/>
-              <a:ea typeface="Noto Sans CJK SC"/>
             </a:endParaRPr>
           </a:p>
           <a:p>
@@ -22598,6 +22593,7 @@
                   <a:srgbClr val="808080"/>
                 </a:solidFill>
                 <a:latin typeface="Noto Sans"/>
+                <a:ea typeface="DejaVu Sans"/>
               </a:rPr>
               <a:t> </a:t>
             </a:r>
@@ -22606,7 +22602,6 @@
                 <a:srgbClr val="000000"/>
               </a:solidFill>
               <a:latin typeface="Arial"/>
-              <a:ea typeface="Noto Sans CJK SC"/>
             </a:endParaRPr>
           </a:p>
           <a:p>
@@ -22636,7 +22631,6 @@
                 <a:srgbClr val="000000"/>
               </a:solidFill>
               <a:latin typeface="Arial"/>
-              <a:ea typeface="Noto Sans CJK SC"/>
             </a:endParaRPr>
           </a:p>
         </p:txBody>
@@ -22684,7 +22678,7 @@
         <p:spPr>
           <a:xfrm>
             <a:off x="1296000" y="864000"/>
-            <a:ext cx="3369600" cy="2303280"/>
+            <a:ext cx="3369240" cy="2302920"/>
           </a:xfrm>
           <a:prstGeom prst="rect">
             <a:avLst/>
@@ -22707,7 +22701,7 @@
         <p:spPr>
           <a:xfrm>
             <a:off x="5112000" y="828000"/>
-            <a:ext cx="3419280" cy="2266200"/>
+            <a:ext cx="3418920" cy="2265840"/>
           </a:xfrm>
           <a:prstGeom prst="rect">
             <a:avLst/>
@@ -22730,7 +22724,7 @@
         <p:spPr>
           <a:xfrm>
             <a:off x="1224000" y="3166200"/>
-            <a:ext cx="3527280" cy="2395800"/>
+            <a:ext cx="3526920" cy="2395440"/>
           </a:xfrm>
           <a:prstGeom prst="rect">
             <a:avLst/>
@@ -22753,7 +22747,7 @@
         <p:spPr>
           <a:xfrm>
             <a:off x="5040000" y="3168000"/>
-            <a:ext cx="3542400" cy="2345760"/>
+            <a:ext cx="3542040" cy="2345400"/>
           </a:xfrm>
           <a:prstGeom prst="rect">
             <a:avLst/>
@@ -22806,7 +22800,7 @@
         <p:spPr>
           <a:xfrm>
             <a:off x="1080000" y="792000"/>
-            <a:ext cx="3489480" cy="2267280"/>
+            <a:ext cx="3489120" cy="2266920"/>
           </a:xfrm>
           <a:prstGeom prst="rect">
             <a:avLst/>
@@ -22829,7 +22823,7 @@
         <p:spPr>
           <a:xfrm>
             <a:off x="1008000" y="3164400"/>
-            <a:ext cx="3635280" cy="2361600"/>
+            <a:ext cx="3634920" cy="2361240"/>
           </a:xfrm>
           <a:prstGeom prst="rect">
             <a:avLst/>
@@ -22852,7 +22846,7 @@
         <p:spPr>
           <a:xfrm>
             <a:off x="5112000" y="721440"/>
-            <a:ext cx="3542400" cy="2454120"/>
+            <a:ext cx="3542040" cy="2453760"/>
           </a:xfrm>
           <a:prstGeom prst="rect">
             <a:avLst/>
@@ -22875,7 +22869,7 @@
         <p:spPr>
           <a:xfrm>
             <a:off x="5076000" y="3140280"/>
-            <a:ext cx="3599280" cy="2477160"/>
+            <a:ext cx="3598920" cy="2476800"/>
           </a:xfrm>
           <a:prstGeom prst="rect">
             <a:avLst/>
@@ -22928,7 +22922,7 @@
         <p:spPr>
           <a:xfrm>
             <a:off x="1008000" y="684000"/>
-            <a:ext cx="3657960" cy="2479680"/>
+            <a:ext cx="3657600" cy="2479320"/>
           </a:xfrm>
           <a:prstGeom prst="rect">
             <a:avLst/>
@@ -22951,7 +22945,7 @@
         <p:spPr>
           <a:xfrm>
             <a:off x="1008000" y="3132000"/>
-            <a:ext cx="3633840" cy="2447280"/>
+            <a:ext cx="3633480" cy="2446920"/>
           </a:xfrm>
           <a:prstGeom prst="rect">
             <a:avLst/>
@@ -22974,7 +22968,7 @@
         <p:spPr>
           <a:xfrm>
             <a:off x="5040000" y="684000"/>
-            <a:ext cx="3650760" cy="2339280"/>
+            <a:ext cx="3650400" cy="2338920"/>
           </a:xfrm>
           <a:prstGeom prst="rect">
             <a:avLst/>
@@ -22997,7 +22991,7 @@
         <p:spPr>
           <a:xfrm>
             <a:off x="5072760" y="3102840"/>
-            <a:ext cx="3638520" cy="2316240"/>
+            <a:ext cx="3638160" cy="2315880"/>
           </a:xfrm>
           <a:prstGeom prst="rect">
             <a:avLst/>
@@ -23046,7 +23040,7 @@
         <p:spPr>
           <a:xfrm>
             <a:off x="1044000" y="1095120"/>
-            <a:ext cx="8133120" cy="381600"/>
+            <a:ext cx="8132760" cy="381240"/>
           </a:xfrm>
           <a:prstGeom prst="rect">
             <a:avLst/>
@@ -23103,7 +23097,7 @@
         <p:spPr>
           <a:xfrm>
             <a:off x="1086120" y="1635120"/>
-            <a:ext cx="7720920" cy="3609720"/>
+            <a:ext cx="7720560" cy="3609360"/>
           </a:xfrm>
           <a:prstGeom prst="rect">
             <a:avLst/>
@@ -23304,7 +23298,7 @@
         <p:spPr>
           <a:xfrm>
             <a:off x="1044000" y="1095120"/>
-            <a:ext cx="8133120" cy="381600"/>
+            <a:ext cx="8132760" cy="381240"/>
           </a:xfrm>
           <a:prstGeom prst="rect">
             <a:avLst/>
@@ -23361,7 +23355,7 @@
         <p:spPr>
           <a:xfrm>
             <a:off x="1086120" y="1635120"/>
-            <a:ext cx="7720920" cy="3609720"/>
+            <a:ext cx="7720560" cy="3609360"/>
           </a:xfrm>
           <a:prstGeom prst="rect">
             <a:avLst/>
@@ -23667,7 +23661,7 @@
         <p:spPr>
           <a:xfrm>
             <a:off x="1044000" y="1095120"/>
-            <a:ext cx="7415280" cy="381600"/>
+            <a:ext cx="7414920" cy="381240"/>
           </a:xfrm>
           <a:prstGeom prst="rect">
             <a:avLst/>
@@ -23728,7 +23722,7 @@
         <p:spPr>
           <a:xfrm>
             <a:off x="1457280" y="1512000"/>
-            <a:ext cx="6584400" cy="3671280"/>
+            <a:ext cx="6584040" cy="3670920"/>
           </a:xfrm>
           <a:prstGeom prst="rect">
             <a:avLst/>
@@ -23777,7 +23771,7 @@
         <p:spPr>
           <a:xfrm>
             <a:off x="1044000" y="1095120"/>
-            <a:ext cx="7415280" cy="381600"/>
+            <a:ext cx="7414920" cy="381240"/>
           </a:xfrm>
           <a:prstGeom prst="rect">
             <a:avLst/>
@@ -23838,7 +23832,7 @@
         <p:spPr>
           <a:xfrm>
             <a:off x="1313280" y="1512000"/>
-            <a:ext cx="6822000" cy="3753000"/>
+            <a:ext cx="6821640" cy="3752640"/>
           </a:xfrm>
           <a:prstGeom prst="rect">
             <a:avLst/>
@@ -23887,7 +23881,7 @@
         <p:spPr>
           <a:xfrm>
             <a:off x="1121760" y="1748880"/>
-            <a:ext cx="6820920" cy="3108600"/>
+            <a:ext cx="6820560" cy="3108240"/>
           </a:xfrm>
           <a:prstGeom prst="rect">
             <a:avLst/>
@@ -24150,7 +24144,7 @@
         <p:spPr>
           <a:xfrm>
             <a:off x="1080000" y="1080000"/>
-            <a:ext cx="3852360" cy="381600"/>
+            <a:ext cx="3852000" cy="381240"/>
           </a:xfrm>
           <a:prstGeom prst="rect">
             <a:avLst/>
@@ -24234,7 +24228,7 @@
         <p:spPr>
           <a:xfrm>
             <a:off x="1044000" y="1095120"/>
-            <a:ext cx="7415280" cy="381600"/>
+            <a:ext cx="7414920" cy="381240"/>
           </a:xfrm>
           <a:prstGeom prst="rect">
             <a:avLst/>
@@ -24295,7 +24289,7 @@
         <p:spPr>
           <a:xfrm>
             <a:off x="1349280" y="1538640"/>
-            <a:ext cx="6756480" cy="3716640"/>
+            <a:ext cx="6756120" cy="3716280"/>
           </a:xfrm>
           <a:prstGeom prst="rect">
             <a:avLst/>
@@ -24344,7 +24338,7 @@
         <p:spPr>
           <a:xfrm>
             <a:off x="1080000" y="1080000"/>
-            <a:ext cx="8447040" cy="381600"/>
+            <a:ext cx="8446680" cy="381240"/>
           </a:xfrm>
           <a:prstGeom prst="rect">
             <a:avLst/>
@@ -24398,7 +24392,7 @@
         <p:spPr>
           <a:xfrm>
             <a:off x="1086120" y="1635120"/>
-            <a:ext cx="7720920" cy="3609720"/>
+            <a:ext cx="7720560" cy="3609360"/>
           </a:xfrm>
           <a:prstGeom prst="rect">
             <a:avLst/>
@@ -24527,7 +24521,7 @@
         <p:spPr>
           <a:xfrm>
             <a:off x="1080000" y="1080000"/>
-            <a:ext cx="8447040" cy="381600"/>
+            <a:ext cx="8446680" cy="381240"/>
           </a:xfrm>
           <a:prstGeom prst="rect">
             <a:avLst/>
@@ -24611,7 +24605,7 @@
         <p:spPr>
           <a:xfrm>
             <a:off x="1080000" y="1080000"/>
-            <a:ext cx="4488480" cy="381600"/>
+            <a:ext cx="4488120" cy="381240"/>
           </a:xfrm>
           <a:prstGeom prst="rect">
             <a:avLst/>
@@ -24665,7 +24659,7 @@
         <p:spPr>
           <a:xfrm>
             <a:off x="1086120" y="1609560"/>
-            <a:ext cx="7720920" cy="3244320"/>
+            <a:ext cx="7720560" cy="3243960"/>
           </a:xfrm>
           <a:prstGeom prst="rect">
             <a:avLst/>
@@ -24866,7 +24860,7 @@
         <p:spPr>
           <a:xfrm>
             <a:off x="1044000" y="1095120"/>
-            <a:ext cx="8133120" cy="381600"/>
+            <a:ext cx="8132760" cy="381240"/>
           </a:xfrm>
           <a:prstGeom prst="rect">
             <a:avLst/>
@@ -24923,7 +24917,7 @@
         <p:spPr>
           <a:xfrm>
             <a:off x="1086120" y="1635120"/>
-            <a:ext cx="7720920" cy="3609720"/>
+            <a:ext cx="7720560" cy="3609360"/>
           </a:xfrm>
           <a:prstGeom prst="rect">
             <a:avLst/>
@@ -25188,7 +25182,7 @@
         <p:spPr>
           <a:xfrm>
             <a:off x="1044000" y="1095120"/>
-            <a:ext cx="8133120" cy="381600"/>
+            <a:ext cx="8132760" cy="381240"/>
           </a:xfrm>
           <a:prstGeom prst="rect">
             <a:avLst/>
@@ -25249,7 +25243,7 @@
         <p:spPr>
           <a:xfrm>
             <a:off x="377280" y="1821600"/>
-            <a:ext cx="5922000" cy="3253320"/>
+            <a:ext cx="5921640" cy="3252960"/>
           </a:xfrm>
           <a:prstGeom prst="rect">
             <a:avLst/>
@@ -25272,7 +25266,7 @@
         <p:spPr>
           <a:xfrm>
             <a:off x="6480000" y="2570760"/>
-            <a:ext cx="2339280" cy="1388520"/>
+            <a:ext cx="2338920" cy="1388160"/>
           </a:xfrm>
           <a:prstGeom prst="rect">
             <a:avLst/>
@@ -25321,7 +25315,7 @@
         <p:spPr>
           <a:xfrm>
             <a:off x="1044000" y="1095120"/>
-            <a:ext cx="7235280" cy="381600"/>
+            <a:ext cx="7234920" cy="381240"/>
           </a:xfrm>
           <a:prstGeom prst="rect">
             <a:avLst/>
@@ -25382,7 +25376,7 @@
         <p:spPr>
           <a:xfrm>
             <a:off x="1605960" y="1620000"/>
-            <a:ext cx="6061320" cy="3813840"/>
+            <a:ext cx="6060960" cy="3813480"/>
           </a:xfrm>
           <a:prstGeom prst="rect">
             <a:avLst/>
@@ -25431,7 +25425,7 @@
         <p:spPr>
           <a:xfrm>
             <a:off x="1044000" y="1095120"/>
-            <a:ext cx="7235280" cy="381600"/>
+            <a:ext cx="7234920" cy="381240"/>
           </a:xfrm>
           <a:prstGeom prst="rect">
             <a:avLst/>
@@ -25492,7 +25486,7 @@
         <p:spPr>
           <a:xfrm>
             <a:off x="1620000" y="1548720"/>
-            <a:ext cx="6119280" cy="3850560"/>
+            <a:ext cx="6118920" cy="3850200"/>
           </a:xfrm>
           <a:prstGeom prst="rect">
             <a:avLst/>
@@ -25541,7 +25535,7 @@
         <p:spPr>
           <a:xfrm>
             <a:off x="1044000" y="1095120"/>
-            <a:ext cx="8133120" cy="381600"/>
+            <a:ext cx="8132760" cy="381240"/>
           </a:xfrm>
           <a:prstGeom prst="rect">
             <a:avLst/>
@@ -25598,7 +25592,7 @@
         <p:spPr>
           <a:xfrm>
             <a:off x="1086120" y="1635120"/>
-            <a:ext cx="7720920" cy="3609720"/>
+            <a:ext cx="7720560" cy="3609360"/>
           </a:xfrm>
           <a:prstGeom prst="rect">
             <a:avLst/>
@@ -25704,6 +25698,7 @@
                   <a:srgbClr val="808080"/>
                 </a:solidFill>
                 <a:latin typeface="Noto Sans"/>
+                <a:ea typeface="DejaVu Sans"/>
               </a:rPr>
               <a:t> </a:t>
             </a:r>
@@ -25930,7 +25925,7 @@
         <p:spPr>
           <a:xfrm>
             <a:off x="1044000" y="1095120"/>
-            <a:ext cx="8133120" cy="381600"/>
+            <a:ext cx="8132760" cy="381240"/>
           </a:xfrm>
           <a:prstGeom prst="rect">
             <a:avLst/>
@@ -25987,7 +25982,7 @@
         <p:spPr>
           <a:xfrm>
             <a:off x="1086120" y="1635120"/>
-            <a:ext cx="7720920" cy="3609720"/>
+            <a:ext cx="7720560" cy="3609360"/>
           </a:xfrm>
           <a:prstGeom prst="rect">
             <a:avLst/>
@@ -26088,7 +26083,42 @@
                 <a:latin typeface="Noto Sans"/>
                 <a:ea typeface="DejaVu Sans"/>
               </a:rPr>
-              <a:t> des images.Une couche BatchNormalization qui va normaliser les valeurs entrantes permettant un apprentissage plus rapide et un </a:t>
+              <a:t> des images.</a:t>
+            </a:r>
+            <a:endParaRPr b="0" lang="fr-CH" sz="1800" spc="-1" strike="noStrike">
+              <a:solidFill>
+                <a:srgbClr val="000000"/>
+              </a:solidFill>
+              <a:latin typeface="Arial"/>
+            </a:endParaRPr>
+          </a:p>
+          <a:p>
+            <a:pPr lvl="2" marL="648000" indent="-216000">
+              <a:lnSpc>
+                <a:spcPct val="100000"/>
+              </a:lnSpc>
+              <a:spcBef>
+                <a:spcPts val="340"/>
+              </a:spcBef>
+              <a:spcAft>
+                <a:spcPts val="283"/>
+              </a:spcAft>
+              <a:buClr>
+                <a:srgbClr val="000000"/>
+              </a:buClr>
+              <a:buSzPct val="45000"/>
+              <a:buFont typeface="Wingdings" charset="2"/>
+              <a:buChar char=""/>
+            </a:pPr>
+            <a:r>
+              <a:rPr b="0" lang="fr-CH" sz="1800" spc="-1" strike="noStrike">
+                <a:solidFill>
+                  <a:srgbClr val="808080"/>
+                </a:solidFill>
+                <a:latin typeface="Noto Sans"/>
+                <a:ea typeface="DejaVu Sans"/>
+              </a:rPr>
+              <a:t>Une couche BatchNormalization qui va normaliser les valeurs entrantes permettant un apprentissage plus rapide et un </a:t>
             </a:r>
             <a:r>
               <a:rPr b="0" i="1" lang="fr-CH" sz="1800" spc="-1" strike="noStrike">
@@ -26198,7 +26228,20 @@
                 <a:latin typeface="Noto Sans"/>
                 <a:ea typeface="DejaVu Sans"/>
               </a:rPr>
-              <a:t> et donc les ressources nécessaire à entraîner notre modèle.</a:t>
+              <a:t> et donc les ressources nécessaire à entraîner </a:t>
+            </a:r>
+            <a:br>
+              <a:rPr sz="1800"/>
+            </a:br>
+            <a:r>
+              <a:rPr b="0" lang="fr-CH" sz="1800" spc="-1" strike="noStrike">
+                <a:solidFill>
+                  <a:srgbClr val="808080"/>
+                </a:solidFill>
+                <a:latin typeface="Noto Sans"/>
+                <a:ea typeface="DejaVu Sans"/>
+              </a:rPr>
+              <a:t>notre modèle.</a:t>
             </a:r>
             <a:endParaRPr b="0" lang="fr-CH" sz="1800" spc="-1" strike="noStrike">
               <a:solidFill>

</xml_diff>